<commit_message>
Add slides on apt-get and package managers
</commit_message>
<xml_diff>
--- a/slides/introduction_to_linux.pptx
+++ b/slides/introduction_to_linux.pptx
@@ -5,7 +5,7 @@
     <p:sldMasterId id="2147483660" r:id="rId1"/>
   </p:sldMasterIdLst>
   <p:notesMasterIdLst>
-    <p:notesMasterId r:id="rId48"/>
+    <p:notesMasterId r:id="rId58"/>
   </p:notesMasterIdLst>
   <p:sldIdLst>
     <p:sldId id="256" r:id="rId2"/>
@@ -51,9 +51,19 @@
     <p:sldId id="341" r:id="rId42"/>
     <p:sldId id="342" r:id="rId43"/>
     <p:sldId id="332" r:id="rId44"/>
-    <p:sldId id="300" r:id="rId45"/>
-    <p:sldId id="304" r:id="rId46"/>
-    <p:sldId id="299" r:id="rId47"/>
+    <p:sldId id="344" r:id="rId45"/>
+    <p:sldId id="343" r:id="rId46"/>
+    <p:sldId id="345" r:id="rId47"/>
+    <p:sldId id="346" r:id="rId48"/>
+    <p:sldId id="347" r:id="rId49"/>
+    <p:sldId id="348" r:id="rId50"/>
+    <p:sldId id="349" r:id="rId51"/>
+    <p:sldId id="350" r:id="rId52"/>
+    <p:sldId id="351" r:id="rId53"/>
+    <p:sldId id="352" r:id="rId54"/>
+    <p:sldId id="300" r:id="rId55"/>
+    <p:sldId id="304" r:id="rId56"/>
+    <p:sldId id="299" r:id="rId57"/>
   </p:sldIdLst>
   <p:sldSz cx="9144000" cy="6858000" type="screen4x3"/>
   <p:notesSz cx="7099300" cy="10234613"/>
@@ -242,7 +252,7 @@
           <a:p>
             <a:fld id="{7C42333B-93F9-44BD-828D-D8CC89BB8051}" type="datetimeFigureOut">
               <a:rPr lang="en-US" smtClean="0"/>
-              <a:t>9/24/2015</a:t>
+              <a:t>9/25/2015</a:t>
             </a:fld>
             <a:endParaRPr lang="en-US"/>
           </a:p>
@@ -903,7 +913,7 @@
           <a:p>
             <a:fld id="{7FDBF51A-AD7B-48B9-BD6C-0DEFB4E1088B}" type="datetime1">
               <a:rPr lang="en-US" smtClean="0"/>
-              <a:t>9/24/2015</a:t>
+              <a:t>9/25/2015</a:t>
             </a:fld>
             <a:endParaRPr lang="en-US"/>
           </a:p>
@@ -1042,7 +1052,7 @@
           <a:p>
             <a:fld id="{0D5F0973-A24E-4E51-AC53-0AF2185C47AF}" type="datetime1">
               <a:rPr lang="en-US" smtClean="0"/>
-              <a:t>9/24/2015</a:t>
+              <a:t>9/25/2015</a:t>
             </a:fld>
             <a:endParaRPr lang="en-US"/>
           </a:p>
@@ -1158,7 +1168,7 @@
           <a:p>
             <a:fld id="{C3A9A478-9E2E-4842-9E1D-95C5E13356D8}" type="datetime1">
               <a:rPr lang="en-US" smtClean="0"/>
-              <a:t>9/24/2015</a:t>
+              <a:t>9/25/2015</a:t>
             </a:fld>
             <a:endParaRPr lang="en-US"/>
           </a:p>
@@ -1456,7 +1466,7 @@
           <a:p>
             <a:fld id="{D248CA02-C1C1-4368-BDD9-8AD0D4FB83DE}" type="datetime1">
               <a:rPr lang="en-US" smtClean="0"/>
-              <a:t>9/24/2015</a:t>
+              <a:t>9/25/2015</a:t>
             </a:fld>
             <a:endParaRPr lang="en-US"/>
           </a:p>
@@ -1734,7 +1744,7 @@
           <a:p>
             <a:fld id="{C6ED301A-2145-43E1-863D-C0977C11DAC4}" type="datetime1">
               <a:rPr lang="en-US" smtClean="0"/>
-              <a:t>9/24/2015</a:t>
+              <a:t>9/25/2015</a:t>
             </a:fld>
             <a:endParaRPr lang="en-US"/>
           </a:p>
@@ -1925,7 +1935,7 @@
           <a:p>
             <a:fld id="{CEECE4E9-A09C-4A3A-872A-60197681C0E8}" type="datetime1">
               <a:rPr lang="en-US" smtClean="0"/>
-              <a:t>9/24/2015</a:t>
+              <a:t>9/25/2015</a:t>
             </a:fld>
             <a:endParaRPr lang="en-US"/>
           </a:p>
@@ -2126,7 +2136,7 @@
           <a:p>
             <a:fld id="{6E9A05D7-B596-47AE-9553-3890A22995BF}" type="datetime1">
               <a:rPr lang="en-US" smtClean="0"/>
-              <a:t>9/24/2015</a:t>
+              <a:t>9/25/2015</a:t>
             </a:fld>
             <a:endParaRPr lang="en-US"/>
           </a:p>
@@ -2389,7 +2399,7 @@
           <a:p>
             <a:fld id="{625ADD71-1C5F-4F7E-8D78-15C68348C390}" type="datetime1">
               <a:rPr lang="en-US" smtClean="0"/>
-              <a:t>9/24/2015</a:t>
+              <a:t>9/25/2015</a:t>
             </a:fld>
             <a:endParaRPr lang="en-US"/>
           </a:p>
@@ -2580,7 +2590,7 @@
           <a:p>
             <a:fld id="{0B328EE6-6A9B-40B0-A5EF-990F53AEF9DA}" type="datetime1">
               <a:rPr lang="en-US" smtClean="0"/>
-              <a:t>9/24/2015</a:t>
+              <a:t>9/25/2015</a:t>
             </a:fld>
             <a:endParaRPr lang="en-US"/>
           </a:p>
@@ -2776,7 +2786,7 @@
           <a:p>
             <a:fld id="{B4AFEB28-E49B-464B-9FE0-FB4552046618}" type="datetime1">
               <a:rPr lang="en-US" smtClean="0"/>
-              <a:t>9/24/2015</a:t>
+              <a:t>9/25/2015</a:t>
             </a:fld>
             <a:endParaRPr lang="en-US"/>
           </a:p>
@@ -2975,7 +2985,7 @@
           <a:p>
             <a:fld id="{F605F17B-680A-48C5-ADAF-14CE0D16BB75}" type="datetime1">
               <a:rPr lang="en-US" smtClean="0"/>
-              <a:t>9/24/2015</a:t>
+              <a:t>9/25/2015</a:t>
             </a:fld>
             <a:endParaRPr lang="en-US"/>
           </a:p>
@@ -3166,7 +3176,7 @@
           <a:p>
             <a:fld id="{E754C7F4-4B95-4CDF-B24E-B5EE227E4593}" type="datetime1">
               <a:rPr lang="en-US" smtClean="0"/>
-              <a:t>9/24/2015</a:t>
+              <a:t>9/25/2015</a:t>
             </a:fld>
             <a:endParaRPr lang="en-US"/>
           </a:p>
@@ -3433,7 +3443,7 @@
           <a:p>
             <a:fld id="{522D90DD-3F1D-4333-B251-10030ABE1E45}" type="datetime1">
               <a:rPr lang="en-US" smtClean="0"/>
-              <a:t>9/24/2015</a:t>
+              <a:t>9/25/2015</a:t>
             </a:fld>
             <a:endParaRPr lang="en-US"/>
           </a:p>
@@ -3742,7 +3752,7 @@
           <a:p>
             <a:fld id="{0371234B-895E-41E6-ADE7-FEE13FC2EF30}" type="datetime1">
               <a:rPr lang="en-US" smtClean="0"/>
-              <a:t>9/24/2015</a:t>
+              <a:t>9/25/2015</a:t>
             </a:fld>
             <a:endParaRPr lang="en-US"/>
           </a:p>
@@ -4185,7 +4195,7 @@
           <a:p>
             <a:fld id="{CAE48979-8F5D-4C7E-B73F-F6B6BB499E94}" type="datetime1">
               <a:rPr lang="en-US" smtClean="0"/>
-              <a:t>9/24/2015</a:t>
+              <a:t>9/25/2015</a:t>
             </a:fld>
             <a:endParaRPr lang="en-US"/>
           </a:p>
@@ -4442,7 +4452,7 @@
           <a:p>
             <a:fld id="{C63F0295-AD35-4898-97C4-7954EC9DDE31}" type="datetime1">
               <a:rPr lang="en-US" smtClean="0"/>
-              <a:t>9/24/2015</a:t>
+              <a:t>9/25/2015</a:t>
             </a:fld>
             <a:endParaRPr lang="en-US"/>
           </a:p>
@@ -17448,11 +17458,7 @@
                       </a:r>
                       <a:r>
                         <a:rPr lang="en-US" sz="1400" baseline="0" dirty="0" smtClean="0"/>
-                        <a:t> the directory has full control. The customers can 'cd' into the directory but cannot 'ls' to show the content</a:t>
-                      </a:r>
-                      <a:r>
-                        <a:rPr lang="en-US" sz="1400" baseline="0" dirty="0" smtClean="0"/>
-                        <a:t>. They can however create and delete files in the directory.</a:t>
+                        <a:t> the directory has full control. The customers can 'cd' into the directory but cannot 'ls' to show the content. They can however create and delete files in the directory.</a:t>
                       </a:r>
                       <a:r>
                         <a:rPr lang="en-US" sz="1400" baseline="0" dirty="0"/>
@@ -17770,7 +17776,7 @@
 </file>
 
 <file path=ppt/slides/slide44.xml><?xml version="1.0" encoding="utf-8"?>
-<p:sld xmlns:a="http://schemas.openxmlformats.org/drawingml/2006/main" xmlns:r="http://schemas.openxmlformats.org/officeDocument/2006/relationships" xmlns:p="http://schemas.openxmlformats.org/presentationml/2006/main" show="0">
+<p:sld xmlns:a="http://schemas.openxmlformats.org/drawingml/2006/main" xmlns:r="http://schemas.openxmlformats.org/officeDocument/2006/relationships" xmlns:p="http://schemas.openxmlformats.org/presentationml/2006/main">
   <p:cSld>
     <p:spTree>
       <p:nvGrpSpPr>
@@ -17788,12 +17794,12 @@
       </p:grpSpPr>
       <p:sp>
         <p:nvSpPr>
-          <p:cNvPr id="4" name="Title 3"/>
-          <p:cNvSpPr>
-            <a:spLocks noGrp="1"/>
-          </p:cNvSpPr>
-          <p:nvPr>
-            <p:ph type="ctrTitle"/>
+          <p:cNvPr id="5" name="Title 4"/>
+          <p:cNvSpPr>
+            <a:spLocks noGrp="1"/>
+          </p:cNvSpPr>
+          <p:nvPr>
+            <p:ph type="title"/>
           </p:nvPr>
         </p:nvSpPr>
         <p:spPr/>
@@ -17802,34 +17808,252 @@
           <a:lstStyle/>
           <a:p>
             <a:r>
-              <a:rPr lang="en-US" dirty="0"/>
-              <a:t>Booting the Raspberry Pi</a:t>
-            </a:r>
-          </a:p>
-        </p:txBody>
-      </p:sp>
-      <p:sp>
-        <p:nvSpPr>
-          <p:cNvPr id="5" name="Subtitle 4"/>
-          <p:cNvSpPr>
-            <a:spLocks noGrp="1"/>
-          </p:cNvSpPr>
-          <p:nvPr>
-            <p:ph type="subTitle" idx="1"/>
+              <a:rPr lang="en-US" dirty="0" smtClean="0"/>
+              <a:t>A Repository of Packages</a:t>
+            </a:r>
+            <a:endParaRPr lang="en-US" dirty="0"/>
+          </a:p>
+        </p:txBody>
+      </p:sp>
+      <p:sp>
+        <p:nvSpPr>
+          <p:cNvPr id="6" name="Content Placeholder 5"/>
+          <p:cNvSpPr>
+            <a:spLocks noGrp="1"/>
+          </p:cNvSpPr>
+          <p:nvPr>
+            <p:ph idx="1"/>
           </p:nvPr>
         </p:nvSpPr>
         <p:spPr/>
         <p:txBody>
-          <a:bodyPr/>
-          <a:lstStyle/>
-          <a:p>
-            <a:endParaRPr lang="en-US"/>
-          </a:p>
-        </p:txBody>
-      </p:sp>
-      <p:sp>
-        <p:nvSpPr>
-          <p:cNvPr id="6" name="Slide Number Placeholder 5"/>
+          <a:bodyPr>
+            <a:normAutofit/>
+          </a:bodyPr>
+          <a:lstStyle/>
+          <a:p>
+            <a:r>
+              <a:rPr lang="en-US" dirty="0"/>
+              <a:t>Every Linux distribution is different in terms of </a:t>
+            </a:r>
+            <a:r>
+              <a:rPr lang="en-US" dirty="0">
+                <a:solidFill>
+                  <a:srgbClr val="0070C0"/>
+                </a:solidFill>
+              </a:rPr>
+              <a:t>how software is </a:t>
+            </a:r>
+            <a:r>
+              <a:rPr lang="en-US" dirty="0" smtClean="0">
+                <a:solidFill>
+                  <a:srgbClr val="0070C0"/>
+                </a:solidFill>
+              </a:rPr>
+              <a:t>installed</a:t>
+            </a:r>
+            <a:r>
+              <a:rPr lang="en-US" dirty="0" smtClean="0"/>
+              <a:t>.</a:t>
+            </a:r>
+          </a:p>
+          <a:p>
+            <a:r>
+              <a:rPr lang="en-US" dirty="0" smtClean="0"/>
+              <a:t>Linux </a:t>
+            </a:r>
+            <a:r>
+              <a:rPr lang="en-US" dirty="0"/>
+              <a:t>distributions use different installation file types, package managers, and commands for </a:t>
+            </a:r>
+            <a:r>
+              <a:rPr lang="en-US" dirty="0" smtClean="0"/>
+              <a:t>installation.</a:t>
+            </a:r>
+          </a:p>
+          <a:p>
+            <a:r>
+              <a:rPr lang="en-US" dirty="0" smtClean="0"/>
+              <a:t>Even </a:t>
+            </a:r>
+            <a:r>
+              <a:rPr lang="en-US" dirty="0"/>
+              <a:t>within a single form of Linux, there are different types of package managers</a:t>
+            </a:r>
+            <a:r>
+              <a:rPr lang="en-US" dirty="0" smtClean="0"/>
+              <a:t>.</a:t>
+            </a:r>
+          </a:p>
+          <a:p>
+            <a:pPr lvl="1"/>
+            <a:r>
+              <a:rPr lang="en-US" dirty="0"/>
+              <a:t>A </a:t>
+            </a:r>
+            <a:r>
+              <a:rPr lang="en-US" dirty="0">
+                <a:solidFill>
+                  <a:srgbClr val="0070C0"/>
+                </a:solidFill>
+              </a:rPr>
+              <a:t>package manager </a:t>
+            </a:r>
+            <a:r>
+              <a:rPr lang="en-US" dirty="0"/>
+              <a:t>is software used to </a:t>
+            </a:r>
+            <a:r>
+              <a:rPr lang="en-US" dirty="0">
+                <a:solidFill>
+                  <a:srgbClr val="0070C0"/>
+                </a:solidFill>
+              </a:rPr>
+              <a:t>handle the installation</a:t>
+            </a:r>
+            <a:r>
+              <a:rPr lang="en-US" dirty="0"/>
+              <a:t>, removal, configuration, and updating of programs and drivers</a:t>
+            </a:r>
+            <a:r>
+              <a:rPr lang="en-US" dirty="0" smtClean="0"/>
+              <a:t>.</a:t>
+            </a:r>
+          </a:p>
+          <a:p>
+            <a:endParaRPr lang="en-US" dirty="0" smtClean="0"/>
+          </a:p>
+          <a:p>
+            <a:r>
+              <a:rPr lang="en-US" dirty="0" err="1" smtClean="0"/>
+              <a:t>Debian</a:t>
+            </a:r>
+            <a:r>
+              <a:rPr lang="en-US" dirty="0" smtClean="0"/>
+              <a:t> </a:t>
+            </a:r>
+            <a:r>
+              <a:rPr lang="en-US" dirty="0"/>
+              <a:t>files are usually downloaded by package managers from a software </a:t>
+            </a:r>
+            <a:r>
+              <a:rPr lang="en-US" dirty="0" smtClean="0"/>
+              <a:t>repository.</a:t>
+            </a:r>
+          </a:p>
+          <a:p>
+            <a:pPr lvl="1"/>
+            <a:r>
+              <a:rPr lang="en-US" dirty="0" smtClean="0"/>
+              <a:t>A </a:t>
+            </a:r>
+            <a:r>
+              <a:rPr lang="en-US" dirty="0" smtClean="0">
+                <a:solidFill>
+                  <a:srgbClr val="0070C0"/>
+                </a:solidFill>
+              </a:rPr>
+              <a:t>repository</a:t>
+            </a:r>
+            <a:r>
+              <a:rPr lang="en-US" dirty="0" smtClean="0"/>
+              <a:t> is a </a:t>
+            </a:r>
+            <a:r>
+              <a:rPr lang="en-US" dirty="0" smtClean="0">
+                <a:solidFill>
+                  <a:srgbClr val="0070C0"/>
+                </a:solidFill>
+              </a:rPr>
+              <a:t>collection </a:t>
+            </a:r>
+            <a:r>
+              <a:rPr lang="en-US" dirty="0"/>
+              <a:t>of </a:t>
+            </a:r>
+            <a:r>
+              <a:rPr lang="en-US" dirty="0" err="1">
+                <a:solidFill>
+                  <a:srgbClr val="0070C0"/>
+                </a:solidFill>
+              </a:rPr>
+              <a:t>Debian</a:t>
+            </a:r>
+            <a:r>
+              <a:rPr lang="en-US" dirty="0">
+                <a:solidFill>
+                  <a:srgbClr val="0070C0"/>
+                </a:solidFill>
+              </a:rPr>
+              <a:t> files </a:t>
+            </a:r>
+            <a:r>
+              <a:rPr lang="en-US" dirty="0"/>
+              <a:t>that typically comes from a </a:t>
+            </a:r>
+            <a:r>
+              <a:rPr lang="en-US" dirty="0" smtClean="0"/>
+              <a:t>server</a:t>
+            </a:r>
+          </a:p>
+          <a:p>
+            <a:endParaRPr lang="en-US" dirty="0" smtClean="0"/>
+          </a:p>
+          <a:p>
+            <a:r>
+              <a:rPr lang="en-US" dirty="0" err="1" smtClean="0"/>
+              <a:t>Debian</a:t>
+            </a:r>
+            <a:r>
+              <a:rPr lang="en-US" dirty="0" smtClean="0"/>
+              <a:t> </a:t>
+            </a:r>
+            <a:r>
+              <a:rPr lang="en-US" dirty="0"/>
+              <a:t>files are </a:t>
+            </a:r>
+            <a:r>
+              <a:rPr lang="en-US" dirty="0">
+                <a:solidFill>
+                  <a:srgbClr val="0070C0"/>
+                </a:solidFill>
+              </a:rPr>
+              <a:t>not required </a:t>
+            </a:r>
+            <a:r>
+              <a:rPr lang="en-US" dirty="0"/>
+              <a:t>to come from a repository, although most do</a:t>
+            </a:r>
+            <a:r>
+              <a:rPr lang="en-US" dirty="0" smtClean="0"/>
+              <a:t>.</a:t>
+            </a:r>
+          </a:p>
+          <a:p>
+            <a:pPr lvl="1"/>
+            <a:r>
+              <a:rPr lang="en-US" dirty="0" smtClean="0"/>
+              <a:t>Can be </a:t>
+            </a:r>
+            <a:r>
+              <a:rPr lang="en-US" dirty="0" smtClean="0">
+                <a:solidFill>
+                  <a:srgbClr val="0070C0"/>
+                </a:solidFill>
+              </a:rPr>
+              <a:t>manually downloaded</a:t>
+            </a:r>
+            <a:r>
+              <a:rPr lang="en-US" dirty="0" smtClean="0"/>
+              <a:t> too</a:t>
+            </a:r>
+            <a:endParaRPr lang="en-US" dirty="0"/>
+          </a:p>
+        </p:txBody>
+      </p:sp>
+      <p:sp>
+        <p:nvSpPr>
+          <p:cNvPr id="4" name="Slide Number Placeholder 3"/>
           <p:cNvSpPr>
             <a:spLocks noGrp="1"/>
           </p:cNvSpPr>
@@ -17853,26 +18077,18 @@
     </p:spTree>
     <p:extLst>
       <p:ext uri="{BB962C8B-B14F-4D97-AF65-F5344CB8AC3E}">
-        <p14:creationId xmlns:p14="http://schemas.microsoft.com/office/powerpoint/2010/main" val="711743385"/>
+        <p14:creationId xmlns:p14="http://schemas.microsoft.com/office/powerpoint/2010/main" val="1011228306"/>
       </p:ext>
     </p:extLst>
   </p:cSld>
   <p:clrMapOvr>
     <a:masterClrMapping/>
   </p:clrMapOvr>
-  <mc:AlternateContent xmlns:mc="http://schemas.openxmlformats.org/markup-compatibility/2006" xmlns:p14="http://schemas.microsoft.com/office/powerpoint/2010/main">
-    <mc:Choice Requires="p14">
-      <p:transition spd="slow" p14:dur="2000"/>
-    </mc:Choice>
-    <mc:Fallback xmlns="">
-      <p:transition spd="slow"/>
-    </mc:Fallback>
-  </mc:AlternateContent>
 </p:sld>
 </file>
 
 <file path=ppt/slides/slide45.xml><?xml version="1.0" encoding="utf-8"?>
-<p:sld xmlns:a="http://schemas.openxmlformats.org/drawingml/2006/main" xmlns:r="http://schemas.openxmlformats.org/officeDocument/2006/relationships" xmlns:p="http://schemas.openxmlformats.org/presentationml/2006/main" show="0">
+<p:sld xmlns:a="http://schemas.openxmlformats.org/drawingml/2006/main" xmlns:r="http://schemas.openxmlformats.org/officeDocument/2006/relationships" xmlns:p="http://schemas.openxmlformats.org/presentationml/2006/main">
   <p:cSld>
     <p:spTree>
       <p:nvGrpSpPr>
@@ -17890,7 +18106,7 @@
       </p:grpSpPr>
       <p:sp>
         <p:nvSpPr>
-          <p:cNvPr id="4" name="Title 3"/>
+          <p:cNvPr id="5" name="Title 4"/>
           <p:cNvSpPr>
             <a:spLocks noGrp="1"/>
           </p:cNvSpPr>
@@ -17903,13 +18119,21 @@
           <a:bodyPr/>
           <a:lstStyle/>
           <a:p>
-            <a:endParaRPr lang="en-US"/>
-          </a:p>
-        </p:txBody>
-      </p:sp>
-      <p:sp>
-        <p:nvSpPr>
-          <p:cNvPr id="5" name="Content Placeholder 4"/>
+            <a:r>
+              <a:rPr lang="en-US" dirty="0" err="1" smtClean="0"/>
+              <a:t>Debian</a:t>
+            </a:r>
+            <a:r>
+              <a:rPr lang="en-US" dirty="0" smtClean="0"/>
+              <a:t> and it's Packages</a:t>
+            </a:r>
+            <a:endParaRPr lang="en-US" dirty="0"/>
+          </a:p>
+        </p:txBody>
+      </p:sp>
+      <p:sp>
+        <p:nvSpPr>
+          <p:cNvPr id="6" name="Content Placeholder 5"/>
           <p:cNvSpPr>
             <a:spLocks noGrp="1"/>
           </p:cNvSpPr>
@@ -17919,19 +18143,223 @@
         </p:nvSpPr>
         <p:spPr/>
         <p:txBody>
-          <a:bodyPr/>
-          <a:lstStyle/>
-          <a:p>
-            <a:r>
-              <a:rPr lang="en-US" dirty="0"/>
-              <a:t>When we are talking about embedded Linux we actually are talking about the same kernel code running on millions of other systems. There is no separate code base for embedded systems. When we however build a Linux system for an embedded target we do exclude features we won’t be using and we are also cross-compiling the kernel to binary code that can run on the target system.</a:t>
-            </a:r>
-          </a:p>
-        </p:txBody>
-      </p:sp>
-      <p:sp>
-        <p:nvSpPr>
-          <p:cNvPr id="6" name="Slide Number Placeholder 5"/>
+          <a:bodyPr>
+            <a:normAutofit/>
+          </a:bodyPr>
+          <a:lstStyle/>
+          <a:p>
+            <a:r>
+              <a:rPr lang="en-US" dirty="0"/>
+              <a:t>Packages generally contain all of the files necessary to implement a set of related commands or </a:t>
+            </a:r>
+            <a:r>
+              <a:rPr lang="en-US" dirty="0" smtClean="0"/>
+              <a:t>features.</a:t>
+            </a:r>
+          </a:p>
+          <a:p>
+            <a:endParaRPr lang="en-US" dirty="0"/>
+          </a:p>
+          <a:p>
+            <a:r>
+              <a:rPr lang="en-US" dirty="0" smtClean="0"/>
+              <a:t>Two types of </a:t>
+            </a:r>
+            <a:r>
+              <a:rPr lang="en-US" dirty="0" err="1" smtClean="0"/>
+              <a:t>Debian</a:t>
+            </a:r>
+            <a:r>
+              <a:rPr lang="en-US" dirty="0" smtClean="0"/>
+              <a:t> packages</a:t>
+            </a:r>
+            <a:endParaRPr lang="en-US" dirty="0"/>
+          </a:p>
+          <a:p>
+            <a:pPr lvl="1"/>
+            <a:r>
+              <a:rPr lang="en-US" b="1" dirty="0" smtClean="0"/>
+              <a:t>Binary packages</a:t>
+            </a:r>
+          </a:p>
+          <a:p>
+            <a:pPr lvl="2"/>
+            <a:r>
+              <a:rPr lang="en-US" dirty="0" smtClean="0"/>
+              <a:t>Contain </a:t>
+            </a:r>
+            <a:r>
+              <a:rPr lang="en-US" dirty="0">
+                <a:solidFill>
+                  <a:srgbClr val="0070C0"/>
+                </a:solidFill>
+              </a:rPr>
+              <a:t>executables</a:t>
+            </a:r>
+            <a:r>
+              <a:rPr lang="en-US" dirty="0"/>
+              <a:t>, configuration files, man/info pages, copyright information, and other </a:t>
+            </a:r>
+            <a:r>
+              <a:rPr lang="en-US" dirty="0" smtClean="0"/>
+              <a:t>documentation.</a:t>
+            </a:r>
+          </a:p>
+          <a:p>
+            <a:pPr lvl="2"/>
+            <a:r>
+              <a:rPr lang="en-US" dirty="0" smtClean="0"/>
+              <a:t>Distributed </a:t>
+            </a:r>
+            <a:r>
+              <a:rPr lang="en-US" dirty="0"/>
+              <a:t>in a </a:t>
+            </a:r>
+            <a:r>
+              <a:rPr lang="en-US" dirty="0" err="1">
+                <a:solidFill>
+                  <a:srgbClr val="0070C0"/>
+                </a:solidFill>
+              </a:rPr>
+              <a:t>Debian</a:t>
+            </a:r>
+            <a:r>
+              <a:rPr lang="en-US" dirty="0">
+                <a:solidFill>
+                  <a:srgbClr val="0070C0"/>
+                </a:solidFill>
+              </a:rPr>
+              <a:t>-specific archive </a:t>
+            </a:r>
+            <a:r>
+              <a:rPr lang="en-US" dirty="0" smtClean="0"/>
+              <a:t>format (.deb file)</a:t>
+            </a:r>
+            <a:endParaRPr lang="en-US" dirty="0"/>
+          </a:p>
+          <a:p>
+            <a:pPr lvl="1"/>
+            <a:r>
+              <a:rPr lang="en-US" b="1" dirty="0"/>
+              <a:t>Source </a:t>
+            </a:r>
+            <a:r>
+              <a:rPr lang="en-US" b="1" dirty="0" smtClean="0"/>
+              <a:t>packages</a:t>
+            </a:r>
+            <a:endParaRPr lang="en-US" dirty="0" smtClean="0"/>
+          </a:p>
+          <a:p>
+            <a:pPr lvl="2"/>
+            <a:r>
+              <a:rPr lang="en-US" dirty="0" smtClean="0"/>
+              <a:t>consist </a:t>
+            </a:r>
+            <a:r>
+              <a:rPr lang="en-US" dirty="0"/>
+              <a:t>of a .</a:t>
+            </a:r>
+            <a:r>
+              <a:rPr lang="en-US" dirty="0" err="1"/>
+              <a:t>dsc</a:t>
+            </a:r>
+            <a:r>
+              <a:rPr lang="en-US" dirty="0"/>
+              <a:t> file describing the source </a:t>
+            </a:r>
+            <a:r>
+              <a:rPr lang="en-US" dirty="0" smtClean="0"/>
+              <a:t>package</a:t>
+            </a:r>
+          </a:p>
+          <a:p>
+            <a:pPr lvl="2"/>
+            <a:r>
+              <a:rPr lang="en-US" dirty="0" smtClean="0"/>
+              <a:t>a </a:t>
+            </a:r>
+            <a:r>
+              <a:rPr lang="en-US" dirty="0"/>
+              <a:t>.orig.tar.gz </a:t>
+            </a:r>
+            <a:r>
+              <a:rPr lang="en-US" dirty="0" smtClean="0"/>
+              <a:t>with original </a:t>
+            </a:r>
+            <a:r>
+              <a:rPr lang="en-US" dirty="0">
+                <a:solidFill>
+                  <a:srgbClr val="0070C0"/>
+                </a:solidFill>
+              </a:rPr>
+              <a:t>unmodified</a:t>
+            </a:r>
+            <a:r>
+              <a:rPr lang="en-US" dirty="0"/>
+              <a:t> </a:t>
+            </a:r>
+            <a:r>
+              <a:rPr lang="en-US" dirty="0" smtClean="0">
+                <a:solidFill>
+                  <a:srgbClr val="0070C0"/>
+                </a:solidFill>
+              </a:rPr>
+              <a:t>source</a:t>
+            </a:r>
+          </a:p>
+          <a:p>
+            <a:pPr lvl="2"/>
+            <a:r>
+              <a:rPr lang="en-US" dirty="0" smtClean="0"/>
+              <a:t>usually </a:t>
+            </a:r>
+            <a:r>
+              <a:rPr lang="en-US" dirty="0"/>
+              <a:t>a .diff.gz file that contains the </a:t>
+            </a:r>
+            <a:r>
+              <a:rPr lang="en-US" dirty="0" err="1">
+                <a:solidFill>
+                  <a:srgbClr val="0070C0"/>
+                </a:solidFill>
+              </a:rPr>
+              <a:t>Debian</a:t>
+            </a:r>
+            <a:r>
+              <a:rPr lang="en-US" dirty="0">
+                <a:solidFill>
+                  <a:srgbClr val="0070C0"/>
+                </a:solidFill>
+              </a:rPr>
+              <a:t>-specific</a:t>
+            </a:r>
+            <a:r>
+              <a:rPr lang="en-US" dirty="0"/>
+              <a:t> </a:t>
+            </a:r>
+            <a:r>
+              <a:rPr lang="en-US" dirty="0">
+                <a:solidFill>
+                  <a:srgbClr val="0070C0"/>
+                </a:solidFill>
+              </a:rPr>
+              <a:t>changes</a:t>
+            </a:r>
+            <a:r>
+              <a:rPr lang="en-US" dirty="0"/>
+              <a:t> to the original </a:t>
+            </a:r>
+            <a:r>
+              <a:rPr lang="en-US" dirty="0" smtClean="0"/>
+              <a:t>source</a:t>
+            </a:r>
+            <a:endParaRPr lang="en-US" dirty="0"/>
+          </a:p>
+        </p:txBody>
+      </p:sp>
+      <p:sp>
+        <p:nvSpPr>
+          <p:cNvPr id="4" name="Slide Number Placeholder 3"/>
           <p:cNvSpPr>
             <a:spLocks noGrp="1"/>
           </p:cNvSpPr>
@@ -17955,26 +18383,18 @@
     </p:spTree>
     <p:extLst>
       <p:ext uri="{BB962C8B-B14F-4D97-AF65-F5344CB8AC3E}">
-        <p14:creationId xmlns:p14="http://schemas.microsoft.com/office/powerpoint/2010/main" val="2255797779"/>
+        <p14:creationId xmlns:p14="http://schemas.microsoft.com/office/powerpoint/2010/main" val="244647979"/>
       </p:ext>
     </p:extLst>
   </p:cSld>
   <p:clrMapOvr>
     <a:masterClrMapping/>
   </p:clrMapOvr>
-  <mc:AlternateContent xmlns:mc="http://schemas.openxmlformats.org/markup-compatibility/2006" xmlns:p14="http://schemas.microsoft.com/office/powerpoint/2010/main">
-    <mc:Choice Requires="p14">
-      <p:transition spd="slow" p14:dur="2000"/>
-    </mc:Choice>
-    <mc:Fallback xmlns="">
-      <p:transition spd="slow"/>
-    </mc:Fallback>
-  </mc:AlternateContent>
 </p:sld>
 </file>
 
 <file path=ppt/slides/slide46.xml><?xml version="1.0" encoding="utf-8"?>
-<p:sld xmlns:a="http://schemas.openxmlformats.org/drawingml/2006/main" xmlns:r="http://schemas.openxmlformats.org/officeDocument/2006/relationships" xmlns:p="http://schemas.openxmlformats.org/presentationml/2006/main" show="0">
+<p:sld xmlns:a="http://schemas.openxmlformats.org/drawingml/2006/main" xmlns:r="http://schemas.openxmlformats.org/officeDocument/2006/relationships" xmlns:p="http://schemas.openxmlformats.org/presentationml/2006/main">
   <p:cSld>
     <p:spTree>
       <p:nvGrpSpPr>
@@ -17992,7 +18412,7 @@
       </p:grpSpPr>
       <p:sp>
         <p:nvSpPr>
-          <p:cNvPr id="2" name="Title 1"/>
+          <p:cNvPr id="5" name="Title 4"/>
           <p:cNvSpPr>
             <a:spLocks noGrp="1"/>
           </p:cNvSpPr>
@@ -18006,8 +18426,12 @@
           <a:lstStyle/>
           <a:p>
             <a:r>
-              <a:rPr lang="en-US" dirty="0" smtClean="0"/>
-              <a:t>Setting up an Embedded System</a:t>
+              <a:rPr lang="en-US" dirty="0" err="1" smtClean="0"/>
+              <a:t>Debian</a:t>
+            </a:r>
+            <a:r>
+              <a:rPr lang="en-US" dirty="0" smtClean="0"/>
+              <a:t> and it's Packages</a:t>
             </a:r>
             <a:endParaRPr lang="en-US" dirty="0"/>
           </a:p>
@@ -18015,7 +18439,7 @@
       </p:sp>
       <p:sp>
         <p:nvSpPr>
-          <p:cNvPr id="3" name="Content Placeholder 2"/>
+          <p:cNvPr id="6" name="Content Placeholder 5"/>
           <p:cNvSpPr>
             <a:spLocks noGrp="1"/>
           </p:cNvSpPr>
@@ -18025,262 +18449,173 @@
         </p:nvSpPr>
         <p:spPr/>
         <p:txBody>
-          <a:bodyPr/>
-          <a:lstStyle/>
-          <a:p>
-            <a:r>
-              <a:rPr lang="en-US" dirty="0"/>
-              <a:t>To </a:t>
-            </a:r>
-            <a:r>
-              <a:rPr lang="en-US" dirty="0" smtClean="0"/>
-              <a:t>setup an </a:t>
-            </a:r>
-            <a:r>
-              <a:rPr lang="en-US" dirty="0"/>
-              <a:t>embedded Linux system we have multiple choices:</a:t>
+          <a:bodyPr>
+            <a:normAutofit/>
+          </a:bodyPr>
+          <a:lstStyle/>
+          <a:p>
+            <a:r>
+              <a:rPr lang="en-US" dirty="0"/>
+              <a:t>Installation of software by the package system uses "</a:t>
+            </a:r>
+            <a:r>
+              <a:rPr lang="en-US" dirty="0">
+                <a:solidFill>
+                  <a:srgbClr val="0070C0"/>
+                </a:solidFill>
+              </a:rPr>
+              <a:t>dependencies</a:t>
+            </a:r>
+            <a:r>
+              <a:rPr lang="en-US" dirty="0"/>
+              <a:t>" which are carefully designed by the package maintainers</a:t>
+            </a:r>
+            <a:r>
+              <a:rPr lang="en-US" dirty="0" smtClean="0"/>
+              <a:t>.</a:t>
             </a:r>
           </a:p>
           <a:p>
             <a:pPr lvl="1"/>
             <a:r>
-              <a:rPr lang="en-US" dirty="0"/>
-              <a:t>Use a </a:t>
-            </a:r>
-            <a:r>
-              <a:rPr lang="en-US" dirty="0">
-                <a:solidFill>
-                  <a:srgbClr val="00B050"/>
-                </a:solidFill>
-              </a:rPr>
-              <a:t>pre-built binary </a:t>
-            </a:r>
-            <a:r>
-              <a:rPr lang="en-US" dirty="0"/>
-              <a:t>distribution such as </a:t>
+              <a:rPr lang="en-US" dirty="0" smtClean="0"/>
+              <a:t>Example</a:t>
+            </a:r>
+            <a:endParaRPr lang="en-US" dirty="0"/>
+          </a:p>
+          <a:p>
+            <a:pPr lvl="2"/>
+            <a:r>
+              <a:rPr lang="en-US" dirty="0" smtClean="0"/>
+              <a:t>GNU </a:t>
+            </a:r>
+            <a:r>
+              <a:rPr lang="en-US" dirty="0"/>
+              <a:t>C compiler (</a:t>
+            </a:r>
+            <a:r>
+              <a:rPr lang="en-US" dirty="0" err="1"/>
+              <a:t>gcc</a:t>
+            </a:r>
+            <a:r>
+              <a:rPr lang="en-US" dirty="0"/>
+              <a:t>) "depends" on the package </a:t>
+            </a:r>
+            <a:r>
+              <a:rPr lang="en-US" dirty="0" err="1"/>
+              <a:t>binutils</a:t>
+            </a:r>
+            <a:r>
+              <a:rPr lang="en-US" dirty="0"/>
+              <a:t> which includes the linker and </a:t>
+            </a:r>
+            <a:r>
+              <a:rPr lang="en-US" dirty="0" smtClean="0"/>
+              <a:t>assembler.</a:t>
+            </a:r>
+          </a:p>
+          <a:p>
+            <a:pPr lvl="2"/>
+            <a:r>
+              <a:rPr lang="en-US" dirty="0" smtClean="0"/>
+              <a:t>If </a:t>
+            </a:r>
+            <a:r>
+              <a:rPr lang="en-US" dirty="0"/>
+              <a:t>a user attempts to install </a:t>
+            </a:r>
+            <a:r>
+              <a:rPr lang="en-US" dirty="0" err="1"/>
+              <a:t>gcc</a:t>
+            </a:r>
+            <a:r>
+              <a:rPr lang="en-US" dirty="0"/>
+              <a:t> without having first installed </a:t>
+            </a:r>
+            <a:r>
+              <a:rPr lang="en-US" dirty="0" err="1"/>
+              <a:t>binutils</a:t>
+            </a:r>
+            <a:r>
+              <a:rPr lang="en-US" dirty="0"/>
+              <a:t>, the package management system (</a:t>
+            </a:r>
+            <a:r>
+              <a:rPr lang="en-US" dirty="0" err="1"/>
+              <a:t>dpkg</a:t>
+            </a:r>
+            <a:r>
+              <a:rPr lang="en-US" dirty="0"/>
+              <a:t>) will send an error message that it also needs </a:t>
+            </a:r>
+            <a:r>
+              <a:rPr lang="en-US" dirty="0" err="1"/>
+              <a:t>binutils</a:t>
+            </a:r>
+            <a:r>
+              <a:rPr lang="en-US" dirty="0"/>
+              <a:t>, and stop installing </a:t>
+            </a:r>
+            <a:r>
+              <a:rPr lang="en-US" dirty="0" err="1"/>
+              <a:t>gcc</a:t>
+            </a:r>
+            <a:r>
+              <a:rPr lang="en-US" dirty="0" smtClean="0"/>
+              <a:t>.</a:t>
+            </a:r>
+          </a:p>
+          <a:p>
+            <a:endParaRPr lang="en-US" dirty="0" smtClean="0"/>
+          </a:p>
+          <a:p>
+            <a:r>
+              <a:rPr lang="en-US" dirty="0" smtClean="0"/>
+              <a:t>Multiple tools exist to manage </a:t>
             </a:r>
             <a:r>
               <a:rPr lang="en-US" dirty="0" err="1" smtClean="0"/>
-              <a:t>Raspbian</a:t>
-            </a:r>
-            <a:r>
-              <a:rPr lang="en-US" dirty="0" smtClean="0"/>
-              <a:t>, </a:t>
-            </a:r>
-            <a:r>
-              <a:rPr lang="en-US" dirty="0"/>
-              <a:t>Ubuntu or Fedora</a:t>
+              <a:t>Debian</a:t>
+            </a:r>
+            <a:r>
+              <a:rPr lang="en-US" dirty="0" smtClean="0"/>
+              <a:t> packages</a:t>
             </a:r>
           </a:p>
           <a:p>
             <a:pPr lvl="1"/>
             <a:r>
-              <a:rPr lang="en-US" dirty="0">
-                <a:solidFill>
-                  <a:srgbClr val="00B050"/>
-                </a:solidFill>
-              </a:rPr>
-              <a:t>Quick </a:t>
-            </a:r>
-            <a:r>
-              <a:rPr lang="en-US" dirty="0"/>
-              <a:t>to set </a:t>
-            </a:r>
-            <a:r>
-              <a:rPr lang="en-US" dirty="0" smtClean="0"/>
-              <a:t>up, but </a:t>
-            </a:r>
-            <a:r>
-              <a:rPr lang="en-US" dirty="0" smtClean="0">
-                <a:solidFill>
-                  <a:srgbClr val="00B050"/>
-                </a:solidFill>
-              </a:rPr>
-              <a:t>not </a:t>
-            </a:r>
-            <a:r>
-              <a:rPr lang="en-US" dirty="0">
-                <a:solidFill>
-                  <a:srgbClr val="00B050"/>
-                </a:solidFill>
-              </a:rPr>
-              <a:t>very </a:t>
-            </a:r>
-            <a:r>
-              <a:rPr lang="en-US" dirty="0" smtClean="0">
-                <a:solidFill>
-                  <a:srgbClr val="00B050"/>
-                </a:solidFill>
-              </a:rPr>
-              <a:t>flexible</a:t>
-            </a:r>
-            <a:r>
-              <a:rPr lang="en-US" dirty="0" smtClean="0"/>
-              <a:t>: support </a:t>
-            </a:r>
-            <a:r>
-              <a:rPr lang="en-US" dirty="0"/>
-              <a:t>for only a few architectures, no flexibility on package configuration, no easy way to rebuild the entire system automatically.</a:t>
-            </a:r>
-          </a:p>
-          <a:p>
+              <a:rPr lang="en-US" dirty="0" smtClean="0"/>
+              <a:t>From </a:t>
+            </a:r>
+            <a:r>
+              <a:rPr lang="en-US" dirty="0"/>
+              <a:t>graphic or text-based interfaces to the low level tools used to install </a:t>
+            </a:r>
+            <a:r>
+              <a:rPr lang="en-US" dirty="0" smtClean="0"/>
+              <a:t>packages.</a:t>
+            </a:r>
+          </a:p>
+          <a:p>
+            <a:pPr lvl="1"/>
+            <a:r>
+              <a:rPr lang="en-US" dirty="0" err="1" smtClean="0"/>
+              <a:t>dpkg</a:t>
+            </a:r>
+            <a:r>
+              <a:rPr lang="en-US" dirty="0" smtClean="0"/>
+              <a:t>, APT, aptitude, </a:t>
+            </a:r>
+            <a:r>
+              <a:rPr lang="en-US" dirty="0" err="1" smtClean="0"/>
+              <a:t>dselect</a:t>
+            </a:r>
+            <a:r>
+              <a:rPr lang="en-US" dirty="0" smtClean="0"/>
+              <a:t>, …</a:t>
+            </a:r>
             <a:endParaRPr lang="en-US" dirty="0"/>
-          </a:p>
-          <a:p>
-            <a:r>
-              <a:rPr lang="en-US" dirty="0">
-                <a:solidFill>
-                  <a:srgbClr val="00B050"/>
-                </a:solidFill>
-              </a:rPr>
-              <a:t>Build</a:t>
-            </a:r>
-            <a:r>
-              <a:rPr lang="en-US" dirty="0"/>
-              <a:t> all system components </a:t>
-            </a:r>
-            <a:r>
-              <a:rPr lang="en-US" dirty="0">
-                <a:solidFill>
-                  <a:srgbClr val="00B050"/>
-                </a:solidFill>
-              </a:rPr>
-              <a:t>manually</a:t>
-            </a:r>
-          </a:p>
-          <a:p>
-            <a:pPr lvl="1"/>
-            <a:r>
-              <a:rPr lang="en-US" dirty="0"/>
-              <a:t>Highly </a:t>
-            </a:r>
-            <a:r>
-              <a:rPr lang="en-US" dirty="0">
-                <a:solidFill>
-                  <a:srgbClr val="00B050"/>
-                </a:solidFill>
-              </a:rPr>
-              <a:t>flexible</a:t>
-            </a:r>
-            <a:r>
-              <a:rPr lang="en-US" dirty="0"/>
-              <a:t>, but </a:t>
-            </a:r>
-            <a:r>
-              <a:rPr lang="en-US" dirty="0">
-                <a:solidFill>
-                  <a:srgbClr val="00B050"/>
-                </a:solidFill>
-              </a:rPr>
-              <a:t>painful</a:t>
-            </a:r>
-            <a:r>
-              <a:rPr lang="en-US" dirty="0"/>
-              <a:t> and </a:t>
-            </a:r>
-            <a:r>
-              <a:rPr lang="en-US" dirty="0">
-                <a:solidFill>
-                  <a:srgbClr val="00B050"/>
-                </a:solidFill>
-              </a:rPr>
-              <a:t>inefficient</a:t>
-            </a:r>
-            <a:r>
-              <a:rPr lang="en-US" dirty="0"/>
-              <a:t>: need to handle complex cross-compilation issues, understand inter-package dependencies, not reproducible.</a:t>
-            </a:r>
-          </a:p>
-          <a:p>
-            <a:endParaRPr lang="en-US" dirty="0"/>
-          </a:p>
-          <a:p>
-            <a:r>
-              <a:rPr lang="en-US" dirty="0"/>
-              <a:t>Use an automated build system, that builds the entire system from source</a:t>
-            </a:r>
-          </a:p>
-          <a:p>
-            <a:pPr lvl="1"/>
-            <a:r>
-              <a:rPr lang="en-US" dirty="0">
-                <a:solidFill>
-                  <a:srgbClr val="00B050"/>
-                </a:solidFill>
-              </a:rPr>
-              <a:t>Automated</a:t>
-            </a:r>
-            <a:r>
-              <a:rPr lang="en-US" dirty="0"/>
-              <a:t>, </a:t>
-            </a:r>
-            <a:r>
-              <a:rPr lang="en-US" dirty="0">
-                <a:solidFill>
-                  <a:srgbClr val="00B050"/>
-                </a:solidFill>
-              </a:rPr>
-              <a:t>flexible</a:t>
-            </a:r>
-            <a:r>
-              <a:rPr lang="en-US" dirty="0"/>
-              <a:t>, handle most cross-compilation issues</a:t>
-            </a:r>
-          </a:p>
-          <a:p>
-            <a:pPr lvl="1"/>
-            <a:r>
-              <a:rPr lang="en-US" dirty="0"/>
-              <a:t>Examples: </a:t>
-            </a:r>
-            <a:r>
-              <a:rPr lang="en-US" dirty="0" err="1"/>
-              <a:t>Buildroot</a:t>
-            </a:r>
-            <a:r>
-              <a:rPr lang="en-US" dirty="0"/>
-              <a:t>, </a:t>
-            </a:r>
-            <a:r>
-              <a:rPr lang="en-US" dirty="0" err="1"/>
-              <a:t>OpenWRT</a:t>
-            </a:r>
-            <a:r>
-              <a:rPr lang="en-US" dirty="0"/>
-              <a:t>, </a:t>
-            </a:r>
-            <a:r>
-              <a:rPr lang="en-US" dirty="0" err="1"/>
-              <a:t>PTXdist</a:t>
-            </a:r>
-            <a:r>
-              <a:rPr lang="en-US" dirty="0"/>
-              <a:t>, </a:t>
-            </a:r>
-            <a:r>
-              <a:rPr lang="en-US" dirty="0" err="1"/>
-              <a:t>OpenBricks</a:t>
-            </a:r>
-            <a:r>
-              <a:rPr lang="en-US" dirty="0"/>
-              <a:t>, </a:t>
-            </a:r>
-            <a:r>
-              <a:rPr lang="en-US" dirty="0" err="1"/>
-              <a:t>OpenEmbedded</a:t>
-            </a:r>
-            <a:r>
-              <a:rPr lang="en-US" dirty="0"/>
-              <a:t>, </a:t>
-            </a:r>
-            <a:r>
-              <a:rPr lang="en-US" dirty="0" err="1"/>
-              <a:t>Yocto</a:t>
-            </a:r>
-            <a:r>
-              <a:rPr lang="en-US" dirty="0"/>
-              <a:t>, etc.</a:t>
-            </a:r>
           </a:p>
         </p:txBody>
       </p:sp>
@@ -18310,21 +18645,1253 @@
     </p:spTree>
     <p:extLst>
       <p:ext uri="{BB962C8B-B14F-4D97-AF65-F5344CB8AC3E}">
-        <p14:creationId xmlns:p14="http://schemas.microsoft.com/office/powerpoint/2010/main" val="2188926740"/>
+        <p14:creationId xmlns:p14="http://schemas.microsoft.com/office/powerpoint/2010/main" val="2342943775"/>
       </p:ext>
     </p:extLst>
   </p:cSld>
   <p:clrMapOvr>
     <a:masterClrMapping/>
   </p:clrMapOvr>
-  <mc:AlternateContent xmlns:mc="http://schemas.openxmlformats.org/markup-compatibility/2006" xmlns:p14="http://schemas.microsoft.com/office/powerpoint/2010/main">
-    <mc:Choice Requires="p14">
-      <p:transition spd="slow" p14:dur="2000"/>
-    </mc:Choice>
-    <mc:Fallback xmlns="">
-      <p:transition spd="slow"/>
-    </mc:Fallback>
-  </mc:AlternateContent>
+</p:sld>
+</file>
+
+<file path=ppt/slides/slide47.xml><?xml version="1.0" encoding="utf-8"?>
+<p:sld xmlns:a="http://schemas.openxmlformats.org/drawingml/2006/main" xmlns:r="http://schemas.openxmlformats.org/officeDocument/2006/relationships" xmlns:p="http://schemas.openxmlformats.org/presentationml/2006/main">
+  <p:cSld>
+    <p:spTree>
+      <p:nvGrpSpPr>
+        <p:cNvPr id="1" name=""/>
+        <p:cNvGrpSpPr/>
+        <p:nvPr/>
+      </p:nvGrpSpPr>
+      <p:grpSpPr>
+        <a:xfrm>
+          <a:off x="0" y="0"/>
+          <a:ext cx="0" cy="0"/>
+          <a:chOff x="0" y="0"/>
+          <a:chExt cx="0" cy="0"/>
+        </a:xfrm>
+      </p:grpSpPr>
+      <p:sp>
+        <p:nvSpPr>
+          <p:cNvPr id="5" name="Title 4"/>
+          <p:cNvSpPr>
+            <a:spLocks noGrp="1"/>
+          </p:cNvSpPr>
+          <p:nvPr>
+            <p:ph type="title"/>
+          </p:nvPr>
+        </p:nvSpPr>
+        <p:spPr/>
+        <p:txBody>
+          <a:bodyPr/>
+          <a:lstStyle/>
+          <a:p>
+            <a:r>
+              <a:rPr lang="en-US" dirty="0"/>
+              <a:t>Advanced Package Tool</a:t>
+            </a:r>
+          </a:p>
+        </p:txBody>
+      </p:sp>
+      <p:sp>
+        <p:nvSpPr>
+          <p:cNvPr id="6" name="Content Placeholder 5"/>
+          <p:cNvSpPr>
+            <a:spLocks noGrp="1"/>
+          </p:cNvSpPr>
+          <p:nvPr>
+            <p:ph idx="1"/>
+          </p:nvPr>
+        </p:nvSpPr>
+        <p:spPr/>
+        <p:txBody>
+          <a:bodyPr>
+            <a:normAutofit/>
+          </a:bodyPr>
+          <a:lstStyle/>
+          <a:p>
+            <a:r>
+              <a:rPr lang="en-US" dirty="0" err="1" smtClean="0"/>
+              <a:t>dpkg</a:t>
+            </a:r>
+            <a:r>
+              <a:rPr lang="en-US" dirty="0" smtClean="0"/>
+              <a:t> </a:t>
+            </a:r>
+            <a:r>
+              <a:rPr lang="en-US" dirty="0"/>
+              <a:t>is the main package management </a:t>
+            </a:r>
+            <a:r>
+              <a:rPr lang="en-US" dirty="0" smtClean="0"/>
+              <a:t>program</a:t>
+            </a:r>
+          </a:p>
+          <a:p>
+            <a:pPr lvl="1"/>
+            <a:r>
+              <a:rPr lang="en-US" dirty="0" smtClean="0"/>
+              <a:t>Low level</a:t>
+            </a:r>
+            <a:endParaRPr lang="en-US" dirty="0"/>
+          </a:p>
+          <a:p>
+            <a:r>
+              <a:rPr lang="en-US" dirty="0"/>
+              <a:t>APT is the </a:t>
+            </a:r>
+            <a:r>
+              <a:rPr lang="en-US" dirty="0">
+                <a:solidFill>
+                  <a:srgbClr val="0070C0"/>
+                </a:solidFill>
+              </a:rPr>
+              <a:t>Advanced Package Tool</a:t>
+            </a:r>
+            <a:r>
+              <a:rPr lang="en-US" dirty="0"/>
+              <a:t> and provides the </a:t>
+            </a:r>
+            <a:r>
+              <a:rPr lang="en-US" dirty="0">
+                <a:solidFill>
+                  <a:srgbClr val="0070C0"/>
+                </a:solidFill>
+              </a:rPr>
+              <a:t>apt-get</a:t>
+            </a:r>
+            <a:r>
+              <a:rPr lang="en-US" dirty="0"/>
+              <a:t> </a:t>
+            </a:r>
+            <a:r>
+              <a:rPr lang="en-US" dirty="0" smtClean="0"/>
+              <a:t>program.</a:t>
+            </a:r>
+          </a:p>
+          <a:p>
+            <a:pPr lvl="1"/>
+            <a:r>
+              <a:rPr lang="en-US" dirty="0" smtClean="0"/>
+              <a:t>apt-get </a:t>
+            </a:r>
+            <a:r>
+              <a:rPr lang="en-US" dirty="0"/>
+              <a:t>provides a simple way to retrieve and install packages from multiple sources using the command </a:t>
+            </a:r>
+            <a:r>
+              <a:rPr lang="en-US" dirty="0" smtClean="0"/>
+              <a:t>line.</a:t>
+            </a:r>
+          </a:p>
+          <a:p>
+            <a:pPr lvl="1"/>
+            <a:r>
+              <a:rPr lang="en-US" dirty="0" smtClean="0"/>
+              <a:t>Unlike </a:t>
+            </a:r>
+            <a:r>
+              <a:rPr lang="en-US" dirty="0" err="1"/>
+              <a:t>dpkg</a:t>
+            </a:r>
+            <a:r>
+              <a:rPr lang="en-US" dirty="0"/>
+              <a:t>, apt-get does not understand .deb files, it works with the packages proper name and can only install .deb archives from a source specified in /</a:t>
+            </a:r>
+            <a:r>
+              <a:rPr lang="en-US" dirty="0" err="1" smtClean="0"/>
+              <a:t>etc</a:t>
+            </a:r>
+            <a:r>
+              <a:rPr lang="en-US" dirty="0" smtClean="0"/>
+              <a:t>/apt/</a:t>
+            </a:r>
+            <a:r>
+              <a:rPr lang="en-US" dirty="0" err="1" smtClean="0"/>
+              <a:t>sources.list</a:t>
+            </a:r>
+            <a:r>
+              <a:rPr lang="en-US" dirty="0" smtClean="0"/>
+              <a:t>.</a:t>
+            </a:r>
+          </a:p>
+          <a:p>
+            <a:pPr lvl="1"/>
+            <a:r>
+              <a:rPr lang="en-US" dirty="0" smtClean="0"/>
+              <a:t>apt-get </a:t>
+            </a:r>
+            <a:r>
+              <a:rPr lang="en-US" dirty="0"/>
+              <a:t>will call </a:t>
+            </a:r>
+            <a:r>
+              <a:rPr lang="en-US" dirty="0" err="1"/>
+              <a:t>dpkg</a:t>
+            </a:r>
+            <a:r>
+              <a:rPr lang="en-US" dirty="0"/>
+              <a:t> directly after downloading the .deb archives from the configured sources.</a:t>
+            </a:r>
+          </a:p>
+        </p:txBody>
+      </p:sp>
+      <p:sp>
+        <p:nvSpPr>
+          <p:cNvPr id="4" name="Slide Number Placeholder 3"/>
+          <p:cNvSpPr>
+            <a:spLocks noGrp="1"/>
+          </p:cNvSpPr>
+          <p:nvPr>
+            <p:ph type="sldNum" sz="quarter" idx="12"/>
+          </p:nvPr>
+        </p:nvSpPr>
+        <p:spPr/>
+        <p:txBody>
+          <a:bodyPr/>
+          <a:lstStyle/>
+          <a:p>
+            <a:fld id="{52DB1A75-B9BE-46B1-B482-5F96E51FA4B2}" type="slidenum">
+              <a:rPr lang="en-US" smtClean="0"/>
+              <a:t>47</a:t>
+            </a:fld>
+            <a:endParaRPr lang="en-US"/>
+          </a:p>
+        </p:txBody>
+      </p:sp>
+    </p:spTree>
+    <p:extLst>
+      <p:ext uri="{BB962C8B-B14F-4D97-AF65-F5344CB8AC3E}">
+        <p14:creationId xmlns:p14="http://schemas.microsoft.com/office/powerpoint/2010/main" val="2205491345"/>
+      </p:ext>
+    </p:extLst>
+  </p:cSld>
+  <p:clrMapOvr>
+    <a:masterClrMapping/>
+  </p:clrMapOvr>
+</p:sld>
+</file>
+
+<file path=ppt/slides/slide48.xml><?xml version="1.0" encoding="utf-8"?>
+<p:sld xmlns:a="http://schemas.openxmlformats.org/drawingml/2006/main" xmlns:r="http://schemas.openxmlformats.org/officeDocument/2006/relationships" xmlns:p="http://schemas.openxmlformats.org/presentationml/2006/main">
+  <p:cSld>
+    <p:spTree>
+      <p:nvGrpSpPr>
+        <p:cNvPr id="1" name=""/>
+        <p:cNvGrpSpPr/>
+        <p:nvPr/>
+      </p:nvGrpSpPr>
+      <p:grpSpPr>
+        <a:xfrm>
+          <a:off x="0" y="0"/>
+          <a:ext cx="0" cy="0"/>
+          <a:chOff x="0" y="0"/>
+          <a:chExt cx="0" cy="0"/>
+        </a:xfrm>
+      </p:grpSpPr>
+      <p:sp>
+        <p:nvSpPr>
+          <p:cNvPr id="2" name="Title 1"/>
+          <p:cNvSpPr>
+            <a:spLocks noGrp="1"/>
+          </p:cNvSpPr>
+          <p:nvPr>
+            <p:ph type="title"/>
+          </p:nvPr>
+        </p:nvSpPr>
+        <p:spPr/>
+        <p:txBody>
+          <a:bodyPr/>
+          <a:lstStyle/>
+          <a:p>
+            <a:r>
+              <a:rPr lang="en-US" dirty="0" smtClean="0"/>
+              <a:t>Using APT to Manage Your Packages</a:t>
+            </a:r>
+            <a:endParaRPr lang="en-US" dirty="0"/>
+          </a:p>
+        </p:txBody>
+      </p:sp>
+      <p:sp>
+        <p:nvSpPr>
+          <p:cNvPr id="3" name="Content Placeholder 2"/>
+          <p:cNvSpPr>
+            <a:spLocks noGrp="1"/>
+          </p:cNvSpPr>
+          <p:nvPr>
+            <p:ph idx="1"/>
+          </p:nvPr>
+        </p:nvSpPr>
+        <p:spPr/>
+        <p:txBody>
+          <a:bodyPr>
+            <a:normAutofit/>
+          </a:bodyPr>
+          <a:lstStyle/>
+          <a:p>
+            <a:r>
+              <a:rPr lang="en-US" dirty="0" smtClean="0"/>
+              <a:t>To </a:t>
+            </a:r>
+            <a:r>
+              <a:rPr lang="en-US" dirty="0">
+                <a:solidFill>
+                  <a:srgbClr val="0070C0"/>
+                </a:solidFill>
+              </a:rPr>
+              <a:t>update</a:t>
+            </a:r>
+            <a:r>
+              <a:rPr lang="en-US" dirty="0"/>
+              <a:t> the </a:t>
+            </a:r>
+            <a:r>
+              <a:rPr lang="en-US" dirty="0">
+                <a:solidFill>
+                  <a:srgbClr val="0070C0"/>
+                </a:solidFill>
+              </a:rPr>
+              <a:t>list</a:t>
+            </a:r>
+            <a:r>
+              <a:rPr lang="en-US" dirty="0"/>
+              <a:t> </a:t>
+            </a:r>
+            <a:r>
+              <a:rPr lang="en-US" dirty="0">
+                <a:solidFill>
+                  <a:srgbClr val="0070C0"/>
+                </a:solidFill>
+              </a:rPr>
+              <a:t>of</a:t>
+            </a:r>
+            <a:r>
+              <a:rPr lang="en-US" dirty="0"/>
+              <a:t> </a:t>
+            </a:r>
+            <a:r>
+              <a:rPr lang="en-US" dirty="0">
+                <a:solidFill>
+                  <a:srgbClr val="0070C0"/>
+                </a:solidFill>
+              </a:rPr>
+              <a:t>package</a:t>
+            </a:r>
+            <a:r>
+              <a:rPr lang="en-US" dirty="0"/>
+              <a:t> known by your system, you can </a:t>
+            </a:r>
+            <a:r>
+              <a:rPr lang="en-US" dirty="0" smtClean="0"/>
+              <a:t>run</a:t>
+            </a:r>
+          </a:p>
+          <a:p>
+            <a:endParaRPr lang="en-US" dirty="0"/>
+          </a:p>
+          <a:p>
+            <a:endParaRPr lang="en-US" dirty="0"/>
+          </a:p>
+          <a:p>
+            <a:pPr lvl="1"/>
+            <a:r>
+              <a:rPr lang="en-US" dirty="0" smtClean="0"/>
+              <a:t>Always run this command before installing packages to make sure you are using latest versions</a:t>
+            </a:r>
+          </a:p>
+          <a:p>
+            <a:pPr lvl="1"/>
+            <a:endParaRPr lang="en-US" dirty="0"/>
+          </a:p>
+          <a:p>
+            <a:r>
+              <a:rPr lang="en-US" dirty="0" smtClean="0"/>
+              <a:t>To </a:t>
+            </a:r>
+            <a:r>
+              <a:rPr lang="en-US" dirty="0">
+                <a:solidFill>
+                  <a:srgbClr val="0070C0"/>
+                </a:solidFill>
+              </a:rPr>
+              <a:t>upgrade</a:t>
+            </a:r>
+            <a:r>
+              <a:rPr lang="en-US" dirty="0"/>
+              <a:t> all the </a:t>
+            </a:r>
+            <a:r>
+              <a:rPr lang="en-US" dirty="0">
+                <a:solidFill>
+                  <a:srgbClr val="0070C0"/>
+                </a:solidFill>
+              </a:rPr>
+              <a:t>packages</a:t>
+            </a:r>
+            <a:r>
+              <a:rPr lang="en-US" dirty="0"/>
+              <a:t> on your system (without installing extra packages or removing packages), </a:t>
+            </a:r>
+            <a:r>
+              <a:rPr lang="en-US" dirty="0" smtClean="0"/>
+              <a:t>run</a:t>
+            </a:r>
+          </a:p>
+          <a:p>
+            <a:pPr lvl="1"/>
+            <a:endParaRPr lang="en-US" dirty="0" smtClean="0"/>
+          </a:p>
+          <a:p>
+            <a:pPr lvl="1"/>
+            <a:endParaRPr lang="en-US" dirty="0"/>
+          </a:p>
+          <a:p>
+            <a:pPr lvl="1"/>
+            <a:endParaRPr lang="en-US" dirty="0" smtClean="0"/>
+          </a:p>
+          <a:p>
+            <a:r>
+              <a:rPr lang="en-US" dirty="0" smtClean="0"/>
+              <a:t>These commands must be run with </a:t>
+            </a:r>
+            <a:r>
+              <a:rPr lang="en-US" dirty="0" smtClean="0">
+                <a:solidFill>
+                  <a:srgbClr val="0070C0"/>
+                </a:solidFill>
+              </a:rPr>
+              <a:t>root privileges</a:t>
+            </a:r>
+            <a:r>
+              <a:rPr lang="en-US" dirty="0" smtClean="0"/>
+              <a:t>, so use '</a:t>
+            </a:r>
+            <a:r>
+              <a:rPr lang="en-US" dirty="0" err="1" smtClean="0"/>
+              <a:t>sudo</a:t>
+            </a:r>
+            <a:r>
+              <a:rPr lang="en-US" dirty="0" smtClean="0"/>
+              <a:t>'</a:t>
+            </a:r>
+            <a:endParaRPr lang="en-US" dirty="0"/>
+          </a:p>
+        </p:txBody>
+      </p:sp>
+      <p:sp>
+        <p:nvSpPr>
+          <p:cNvPr id="4" name="Slide Number Placeholder 3"/>
+          <p:cNvSpPr>
+            <a:spLocks noGrp="1"/>
+          </p:cNvSpPr>
+          <p:nvPr>
+            <p:ph type="sldNum" sz="quarter" idx="12"/>
+          </p:nvPr>
+        </p:nvSpPr>
+        <p:spPr/>
+        <p:txBody>
+          <a:bodyPr/>
+          <a:lstStyle/>
+          <a:p>
+            <a:fld id="{52DB1A75-B9BE-46B1-B482-5F96E51FA4B2}" type="slidenum">
+              <a:rPr lang="en-US" smtClean="0"/>
+              <a:t>48</a:t>
+            </a:fld>
+            <a:endParaRPr lang="en-US"/>
+          </a:p>
+        </p:txBody>
+      </p:sp>
+      <p:sp>
+        <p:nvSpPr>
+          <p:cNvPr id="5" name="TextBox 4"/>
+          <p:cNvSpPr txBox="1"/>
+          <p:nvPr/>
+        </p:nvSpPr>
+        <p:spPr>
+          <a:xfrm>
+            <a:off x="2200597" y="2065294"/>
+            <a:ext cx="4742803" cy="369332"/>
+          </a:xfrm>
+          <a:prstGeom prst="rect">
+            <a:avLst/>
+          </a:prstGeom>
+        </p:spPr>
+        <p:style>
+          <a:lnRef idx="1">
+            <a:schemeClr val="dk1"/>
+          </a:lnRef>
+          <a:fillRef idx="2">
+            <a:schemeClr val="dk1"/>
+          </a:fillRef>
+          <a:effectRef idx="1">
+            <a:schemeClr val="dk1"/>
+          </a:effectRef>
+          <a:fontRef idx="minor">
+            <a:schemeClr val="dk1"/>
+          </a:fontRef>
+        </p:style>
+        <p:txBody>
+          <a:bodyPr wrap="square" rtlCol="0">
+            <a:spAutoFit/>
+          </a:bodyPr>
+          <a:lstStyle/>
+          <a:p>
+            <a:r>
+              <a:rPr lang="en-US" dirty="0" err="1" smtClean="0">
+                <a:solidFill>
+                  <a:srgbClr val="C00000"/>
+                </a:solidFill>
+                <a:latin typeface="Consolas" panose="020B0609020204030204" pitchFamily="49" charset="0"/>
+                <a:cs typeface="Consolas" panose="020B0609020204030204" pitchFamily="49" charset="0"/>
+              </a:rPr>
+              <a:t>bioboost@NDWMINT</a:t>
+            </a:r>
+            <a:r>
+              <a:rPr lang="en-US" dirty="0" smtClean="0">
+                <a:solidFill>
+                  <a:srgbClr val="C00000"/>
+                </a:solidFill>
+                <a:latin typeface="Consolas" panose="020B0609020204030204" pitchFamily="49" charset="0"/>
+                <a:cs typeface="Consolas" panose="020B0609020204030204" pitchFamily="49" charset="0"/>
+              </a:rPr>
+              <a:t> </a:t>
+            </a:r>
+            <a:r>
+              <a:rPr lang="en-US" dirty="0">
+                <a:solidFill>
+                  <a:srgbClr val="C00000"/>
+                </a:solidFill>
+                <a:latin typeface="Consolas" panose="020B0609020204030204" pitchFamily="49" charset="0"/>
+                <a:cs typeface="Consolas" panose="020B0609020204030204" pitchFamily="49" charset="0"/>
+              </a:rPr>
+              <a:t>~ </a:t>
+            </a:r>
+            <a:r>
+              <a:rPr lang="en-US" dirty="0" smtClean="0">
+                <a:solidFill>
+                  <a:srgbClr val="C00000"/>
+                </a:solidFill>
+                <a:latin typeface="Consolas" panose="020B0609020204030204" pitchFamily="49" charset="0"/>
+                <a:cs typeface="Consolas" panose="020B0609020204030204" pitchFamily="49" charset="0"/>
+              </a:rPr>
+              <a:t>$</a:t>
+            </a:r>
+            <a:r>
+              <a:rPr lang="en-US" dirty="0" smtClean="0">
+                <a:solidFill>
+                  <a:srgbClr val="00B050"/>
+                </a:solidFill>
+                <a:latin typeface="Consolas" panose="020B0609020204030204" pitchFamily="49" charset="0"/>
+                <a:cs typeface="Consolas" panose="020B0609020204030204" pitchFamily="49" charset="0"/>
+              </a:rPr>
+              <a:t> </a:t>
+            </a:r>
+            <a:r>
+              <a:rPr lang="en-US" dirty="0">
+                <a:solidFill>
+                  <a:srgbClr val="00B050"/>
+                </a:solidFill>
+                <a:latin typeface="Consolas" panose="020B0609020204030204" pitchFamily="49" charset="0"/>
+                <a:cs typeface="Consolas" panose="020B0609020204030204" pitchFamily="49" charset="0"/>
+              </a:rPr>
+              <a:t>apt-get update</a:t>
+            </a:r>
+            <a:endParaRPr lang="en-US" dirty="0">
+              <a:solidFill>
+                <a:srgbClr val="0070C0"/>
+              </a:solidFill>
+              <a:latin typeface="Consolas" panose="020B0609020204030204" pitchFamily="49" charset="0"/>
+              <a:cs typeface="Consolas" panose="020B0609020204030204" pitchFamily="49" charset="0"/>
+            </a:endParaRPr>
+          </a:p>
+        </p:txBody>
+      </p:sp>
+      <p:sp>
+        <p:nvSpPr>
+          <p:cNvPr id="6" name="TextBox 5"/>
+          <p:cNvSpPr txBox="1"/>
+          <p:nvPr/>
+        </p:nvSpPr>
+        <p:spPr>
+          <a:xfrm>
+            <a:off x="2200597" y="4430542"/>
+            <a:ext cx="4742803" cy="369332"/>
+          </a:xfrm>
+          <a:prstGeom prst="rect">
+            <a:avLst/>
+          </a:prstGeom>
+        </p:spPr>
+        <p:style>
+          <a:lnRef idx="1">
+            <a:schemeClr val="dk1"/>
+          </a:lnRef>
+          <a:fillRef idx="2">
+            <a:schemeClr val="dk1"/>
+          </a:fillRef>
+          <a:effectRef idx="1">
+            <a:schemeClr val="dk1"/>
+          </a:effectRef>
+          <a:fontRef idx="minor">
+            <a:schemeClr val="dk1"/>
+          </a:fontRef>
+        </p:style>
+        <p:txBody>
+          <a:bodyPr wrap="square" rtlCol="0">
+            <a:spAutoFit/>
+          </a:bodyPr>
+          <a:lstStyle/>
+          <a:p>
+            <a:r>
+              <a:rPr lang="en-US" dirty="0" err="1" smtClean="0">
+                <a:solidFill>
+                  <a:srgbClr val="C00000"/>
+                </a:solidFill>
+                <a:latin typeface="Consolas" panose="020B0609020204030204" pitchFamily="49" charset="0"/>
+                <a:cs typeface="Consolas" panose="020B0609020204030204" pitchFamily="49" charset="0"/>
+              </a:rPr>
+              <a:t>bioboost@NDWMINT</a:t>
+            </a:r>
+            <a:r>
+              <a:rPr lang="en-US" dirty="0" smtClean="0">
+                <a:solidFill>
+                  <a:srgbClr val="C00000"/>
+                </a:solidFill>
+                <a:latin typeface="Consolas" panose="020B0609020204030204" pitchFamily="49" charset="0"/>
+                <a:cs typeface="Consolas" panose="020B0609020204030204" pitchFamily="49" charset="0"/>
+              </a:rPr>
+              <a:t> </a:t>
+            </a:r>
+            <a:r>
+              <a:rPr lang="en-US" dirty="0">
+                <a:solidFill>
+                  <a:srgbClr val="C00000"/>
+                </a:solidFill>
+                <a:latin typeface="Consolas" panose="020B0609020204030204" pitchFamily="49" charset="0"/>
+                <a:cs typeface="Consolas" panose="020B0609020204030204" pitchFamily="49" charset="0"/>
+              </a:rPr>
+              <a:t>~ </a:t>
+            </a:r>
+            <a:r>
+              <a:rPr lang="en-US" dirty="0" smtClean="0">
+                <a:solidFill>
+                  <a:srgbClr val="C00000"/>
+                </a:solidFill>
+                <a:latin typeface="Consolas" panose="020B0609020204030204" pitchFamily="49" charset="0"/>
+                <a:cs typeface="Consolas" panose="020B0609020204030204" pitchFamily="49" charset="0"/>
+              </a:rPr>
+              <a:t>$</a:t>
+            </a:r>
+            <a:r>
+              <a:rPr lang="en-US" dirty="0" smtClean="0">
+                <a:solidFill>
+                  <a:srgbClr val="00B050"/>
+                </a:solidFill>
+                <a:latin typeface="Consolas" panose="020B0609020204030204" pitchFamily="49" charset="0"/>
+                <a:cs typeface="Consolas" panose="020B0609020204030204" pitchFamily="49" charset="0"/>
+              </a:rPr>
+              <a:t> </a:t>
+            </a:r>
+            <a:r>
+              <a:rPr lang="en-US" dirty="0">
+                <a:solidFill>
+                  <a:srgbClr val="00B050"/>
+                </a:solidFill>
+                <a:latin typeface="Consolas" panose="020B0609020204030204" pitchFamily="49" charset="0"/>
+                <a:cs typeface="Consolas" panose="020B0609020204030204" pitchFamily="49" charset="0"/>
+              </a:rPr>
+              <a:t>apt-get </a:t>
+            </a:r>
+            <a:r>
+              <a:rPr lang="en-US" dirty="0" smtClean="0">
+                <a:solidFill>
+                  <a:srgbClr val="00B050"/>
+                </a:solidFill>
+                <a:latin typeface="Consolas" panose="020B0609020204030204" pitchFamily="49" charset="0"/>
+                <a:cs typeface="Consolas" panose="020B0609020204030204" pitchFamily="49" charset="0"/>
+              </a:rPr>
+              <a:t>upgrade</a:t>
+            </a:r>
+            <a:endParaRPr lang="en-US" dirty="0">
+              <a:solidFill>
+                <a:srgbClr val="0070C0"/>
+              </a:solidFill>
+              <a:latin typeface="Consolas" panose="020B0609020204030204" pitchFamily="49" charset="0"/>
+              <a:cs typeface="Consolas" panose="020B0609020204030204" pitchFamily="49" charset="0"/>
+            </a:endParaRPr>
+          </a:p>
+        </p:txBody>
+      </p:sp>
+    </p:spTree>
+    <p:extLst>
+      <p:ext uri="{BB962C8B-B14F-4D97-AF65-F5344CB8AC3E}">
+        <p14:creationId xmlns:p14="http://schemas.microsoft.com/office/powerpoint/2010/main" val="2167949943"/>
+      </p:ext>
+    </p:extLst>
+  </p:cSld>
+  <p:clrMapOvr>
+    <a:masterClrMapping/>
+  </p:clrMapOvr>
+</p:sld>
+</file>
+
+<file path=ppt/slides/slide49.xml><?xml version="1.0" encoding="utf-8"?>
+<p:sld xmlns:a="http://schemas.openxmlformats.org/drawingml/2006/main" xmlns:r="http://schemas.openxmlformats.org/officeDocument/2006/relationships" xmlns:p="http://schemas.openxmlformats.org/presentationml/2006/main">
+  <p:cSld>
+    <p:spTree>
+      <p:nvGrpSpPr>
+        <p:cNvPr id="1" name=""/>
+        <p:cNvGrpSpPr/>
+        <p:nvPr/>
+      </p:nvGrpSpPr>
+      <p:grpSpPr>
+        <a:xfrm>
+          <a:off x="0" y="0"/>
+          <a:ext cx="0" cy="0"/>
+          <a:chOff x="0" y="0"/>
+          <a:chExt cx="0" cy="0"/>
+        </a:xfrm>
+      </p:grpSpPr>
+      <p:sp>
+        <p:nvSpPr>
+          <p:cNvPr id="2" name="Title 1"/>
+          <p:cNvSpPr>
+            <a:spLocks noGrp="1"/>
+          </p:cNvSpPr>
+          <p:nvPr>
+            <p:ph type="title"/>
+          </p:nvPr>
+        </p:nvSpPr>
+        <p:spPr/>
+        <p:txBody>
+          <a:bodyPr/>
+          <a:lstStyle/>
+          <a:p>
+            <a:r>
+              <a:rPr lang="en-US" dirty="0" smtClean="0"/>
+              <a:t>Using APT to Manage Your Packages</a:t>
+            </a:r>
+            <a:endParaRPr lang="en-US" dirty="0"/>
+          </a:p>
+        </p:txBody>
+      </p:sp>
+      <p:sp>
+        <p:nvSpPr>
+          <p:cNvPr id="3" name="Content Placeholder 2"/>
+          <p:cNvSpPr>
+            <a:spLocks noGrp="1"/>
+          </p:cNvSpPr>
+          <p:nvPr>
+            <p:ph idx="1"/>
+          </p:nvPr>
+        </p:nvSpPr>
+        <p:spPr/>
+        <p:txBody>
+          <a:bodyPr>
+            <a:normAutofit/>
+          </a:bodyPr>
+          <a:lstStyle/>
+          <a:p>
+            <a:r>
+              <a:rPr lang="en-US" dirty="0" smtClean="0"/>
+              <a:t>To install a package you can use</a:t>
+            </a:r>
+          </a:p>
+          <a:p>
+            <a:endParaRPr lang="en-US" dirty="0"/>
+          </a:p>
+          <a:p>
+            <a:endParaRPr lang="en-US" dirty="0" smtClean="0"/>
+          </a:p>
+          <a:p>
+            <a:pPr lvl="1"/>
+            <a:r>
+              <a:rPr lang="en-US" dirty="0" smtClean="0"/>
+              <a:t>This will also install the dependencies of the package</a:t>
+            </a:r>
+          </a:p>
+          <a:p>
+            <a:endParaRPr lang="en-US" dirty="0"/>
+          </a:p>
+          <a:p>
+            <a:r>
+              <a:rPr lang="en-US" dirty="0" smtClean="0"/>
+              <a:t>To </a:t>
+            </a:r>
+            <a:r>
+              <a:rPr lang="en-US" dirty="0"/>
+              <a:t>remove the foo package from your system, </a:t>
+            </a:r>
+            <a:r>
+              <a:rPr lang="en-US" dirty="0" smtClean="0"/>
+              <a:t>run</a:t>
+            </a:r>
+            <a:endParaRPr lang="en-US" dirty="0"/>
+          </a:p>
+          <a:p>
+            <a:endParaRPr lang="en-US" dirty="0" smtClean="0"/>
+          </a:p>
+          <a:p>
+            <a:endParaRPr lang="en-US" dirty="0"/>
+          </a:p>
+          <a:p>
+            <a:endParaRPr lang="en-US" dirty="0" smtClean="0"/>
+          </a:p>
+          <a:p>
+            <a:r>
+              <a:rPr lang="en-US" dirty="0" smtClean="0"/>
+              <a:t>To </a:t>
+            </a:r>
+            <a:r>
+              <a:rPr lang="en-US" dirty="0"/>
+              <a:t>remove the foo package and its configuration files from your system, </a:t>
+            </a:r>
+            <a:r>
+              <a:rPr lang="en-US" dirty="0" smtClean="0"/>
+              <a:t>run</a:t>
+            </a:r>
+            <a:endParaRPr lang="en-US" dirty="0"/>
+          </a:p>
+        </p:txBody>
+      </p:sp>
+      <p:sp>
+        <p:nvSpPr>
+          <p:cNvPr id="4" name="Slide Number Placeholder 3"/>
+          <p:cNvSpPr>
+            <a:spLocks noGrp="1"/>
+          </p:cNvSpPr>
+          <p:nvPr>
+            <p:ph type="sldNum" sz="quarter" idx="12"/>
+          </p:nvPr>
+        </p:nvSpPr>
+        <p:spPr/>
+        <p:txBody>
+          <a:bodyPr/>
+          <a:lstStyle/>
+          <a:p>
+            <a:fld id="{52DB1A75-B9BE-46B1-B482-5F96E51FA4B2}" type="slidenum">
+              <a:rPr lang="en-US" smtClean="0"/>
+              <a:t>49</a:t>
+            </a:fld>
+            <a:endParaRPr lang="en-US"/>
+          </a:p>
+        </p:txBody>
+      </p:sp>
+      <p:sp>
+        <p:nvSpPr>
+          <p:cNvPr id="5" name="TextBox 4"/>
+          <p:cNvSpPr txBox="1"/>
+          <p:nvPr/>
+        </p:nvSpPr>
+        <p:spPr>
+          <a:xfrm>
+            <a:off x="1323126" y="2111014"/>
+            <a:ext cx="6497744" cy="369332"/>
+          </a:xfrm>
+          <a:prstGeom prst="rect">
+            <a:avLst/>
+          </a:prstGeom>
+        </p:spPr>
+        <p:style>
+          <a:lnRef idx="1">
+            <a:schemeClr val="dk1"/>
+          </a:lnRef>
+          <a:fillRef idx="2">
+            <a:schemeClr val="dk1"/>
+          </a:fillRef>
+          <a:effectRef idx="1">
+            <a:schemeClr val="dk1"/>
+          </a:effectRef>
+          <a:fontRef idx="minor">
+            <a:schemeClr val="dk1"/>
+          </a:fontRef>
+        </p:style>
+        <p:txBody>
+          <a:bodyPr wrap="square" rtlCol="0">
+            <a:spAutoFit/>
+          </a:bodyPr>
+          <a:lstStyle/>
+          <a:p>
+            <a:r>
+              <a:rPr lang="en-US" dirty="0" err="1" smtClean="0">
+                <a:solidFill>
+                  <a:srgbClr val="C00000"/>
+                </a:solidFill>
+                <a:latin typeface="Consolas" panose="020B0609020204030204" pitchFamily="49" charset="0"/>
+                <a:cs typeface="Consolas" panose="020B0609020204030204" pitchFamily="49" charset="0"/>
+              </a:rPr>
+              <a:t>bioboost@NDWMINT</a:t>
+            </a:r>
+            <a:r>
+              <a:rPr lang="en-US" dirty="0" smtClean="0">
+                <a:solidFill>
+                  <a:srgbClr val="C00000"/>
+                </a:solidFill>
+                <a:latin typeface="Consolas" panose="020B0609020204030204" pitchFamily="49" charset="0"/>
+                <a:cs typeface="Consolas" panose="020B0609020204030204" pitchFamily="49" charset="0"/>
+              </a:rPr>
+              <a:t> </a:t>
+            </a:r>
+            <a:r>
+              <a:rPr lang="en-US" dirty="0">
+                <a:solidFill>
+                  <a:srgbClr val="C00000"/>
+                </a:solidFill>
+                <a:latin typeface="Consolas" panose="020B0609020204030204" pitchFamily="49" charset="0"/>
+                <a:cs typeface="Consolas" panose="020B0609020204030204" pitchFamily="49" charset="0"/>
+              </a:rPr>
+              <a:t>~ </a:t>
+            </a:r>
+            <a:r>
+              <a:rPr lang="en-US" dirty="0" smtClean="0">
+                <a:solidFill>
+                  <a:srgbClr val="C00000"/>
+                </a:solidFill>
+                <a:latin typeface="Consolas" panose="020B0609020204030204" pitchFamily="49" charset="0"/>
+                <a:cs typeface="Consolas" panose="020B0609020204030204" pitchFamily="49" charset="0"/>
+              </a:rPr>
+              <a:t>$</a:t>
+            </a:r>
+            <a:r>
+              <a:rPr lang="en-US" dirty="0" smtClean="0">
+                <a:solidFill>
+                  <a:srgbClr val="00B050"/>
+                </a:solidFill>
+                <a:latin typeface="Consolas" panose="020B0609020204030204" pitchFamily="49" charset="0"/>
+                <a:cs typeface="Consolas" panose="020B0609020204030204" pitchFamily="49" charset="0"/>
+              </a:rPr>
+              <a:t> </a:t>
+            </a:r>
+            <a:r>
+              <a:rPr lang="en-US" dirty="0">
+                <a:solidFill>
+                  <a:srgbClr val="00B050"/>
+                </a:solidFill>
+                <a:latin typeface="Consolas" panose="020B0609020204030204" pitchFamily="49" charset="0"/>
+                <a:cs typeface="Consolas" panose="020B0609020204030204" pitchFamily="49" charset="0"/>
+              </a:rPr>
+              <a:t>apt-get </a:t>
+            </a:r>
+            <a:r>
+              <a:rPr lang="en-US" dirty="0" smtClean="0">
+                <a:solidFill>
+                  <a:srgbClr val="00B050"/>
+                </a:solidFill>
+                <a:latin typeface="Consolas" panose="020B0609020204030204" pitchFamily="49" charset="0"/>
+                <a:cs typeface="Consolas" panose="020B0609020204030204" pitchFamily="49" charset="0"/>
+              </a:rPr>
+              <a:t>install &lt;</a:t>
+            </a:r>
+            <a:r>
+              <a:rPr lang="en-US" dirty="0" err="1" smtClean="0">
+                <a:solidFill>
+                  <a:srgbClr val="00B050"/>
+                </a:solidFill>
+                <a:latin typeface="Consolas" panose="020B0609020204030204" pitchFamily="49" charset="0"/>
+                <a:cs typeface="Consolas" panose="020B0609020204030204" pitchFamily="49" charset="0"/>
+              </a:rPr>
+              <a:t>packagename</a:t>
+            </a:r>
+            <a:r>
+              <a:rPr lang="en-US" dirty="0" smtClean="0">
+                <a:solidFill>
+                  <a:srgbClr val="00B050"/>
+                </a:solidFill>
+                <a:latin typeface="Consolas" panose="020B0609020204030204" pitchFamily="49" charset="0"/>
+                <a:cs typeface="Consolas" panose="020B0609020204030204" pitchFamily="49" charset="0"/>
+              </a:rPr>
+              <a:t>&gt;</a:t>
+            </a:r>
+            <a:endParaRPr lang="en-US" dirty="0">
+              <a:solidFill>
+                <a:srgbClr val="0070C0"/>
+              </a:solidFill>
+              <a:latin typeface="Consolas" panose="020B0609020204030204" pitchFamily="49" charset="0"/>
+              <a:cs typeface="Consolas" panose="020B0609020204030204" pitchFamily="49" charset="0"/>
+            </a:endParaRPr>
+          </a:p>
+        </p:txBody>
+      </p:sp>
+      <p:sp>
+        <p:nvSpPr>
+          <p:cNvPr id="6" name="TextBox 5"/>
+          <p:cNvSpPr txBox="1"/>
+          <p:nvPr/>
+        </p:nvSpPr>
+        <p:spPr>
+          <a:xfrm>
+            <a:off x="1405069" y="3863183"/>
+            <a:ext cx="6486203" cy="369332"/>
+          </a:xfrm>
+          <a:prstGeom prst="rect">
+            <a:avLst/>
+          </a:prstGeom>
+        </p:spPr>
+        <p:style>
+          <a:lnRef idx="1">
+            <a:schemeClr val="dk1"/>
+          </a:lnRef>
+          <a:fillRef idx="2">
+            <a:schemeClr val="dk1"/>
+          </a:fillRef>
+          <a:effectRef idx="1">
+            <a:schemeClr val="dk1"/>
+          </a:effectRef>
+          <a:fontRef idx="minor">
+            <a:schemeClr val="dk1"/>
+          </a:fontRef>
+        </p:style>
+        <p:txBody>
+          <a:bodyPr wrap="square" rtlCol="0">
+            <a:spAutoFit/>
+          </a:bodyPr>
+          <a:lstStyle/>
+          <a:p>
+            <a:r>
+              <a:rPr lang="en-US" dirty="0" err="1" smtClean="0">
+                <a:solidFill>
+                  <a:srgbClr val="C00000"/>
+                </a:solidFill>
+                <a:latin typeface="Consolas" panose="020B0609020204030204" pitchFamily="49" charset="0"/>
+                <a:cs typeface="Consolas" panose="020B0609020204030204" pitchFamily="49" charset="0"/>
+              </a:rPr>
+              <a:t>bioboost@NDWMINT</a:t>
+            </a:r>
+            <a:r>
+              <a:rPr lang="en-US" dirty="0" smtClean="0">
+                <a:solidFill>
+                  <a:srgbClr val="C00000"/>
+                </a:solidFill>
+                <a:latin typeface="Consolas" panose="020B0609020204030204" pitchFamily="49" charset="0"/>
+                <a:cs typeface="Consolas" panose="020B0609020204030204" pitchFamily="49" charset="0"/>
+              </a:rPr>
+              <a:t> </a:t>
+            </a:r>
+            <a:r>
+              <a:rPr lang="en-US" dirty="0">
+                <a:solidFill>
+                  <a:srgbClr val="C00000"/>
+                </a:solidFill>
+                <a:latin typeface="Consolas" panose="020B0609020204030204" pitchFamily="49" charset="0"/>
+                <a:cs typeface="Consolas" panose="020B0609020204030204" pitchFamily="49" charset="0"/>
+              </a:rPr>
+              <a:t>~ </a:t>
+            </a:r>
+            <a:r>
+              <a:rPr lang="en-US" dirty="0" smtClean="0">
+                <a:solidFill>
+                  <a:srgbClr val="C00000"/>
+                </a:solidFill>
+                <a:latin typeface="Consolas" panose="020B0609020204030204" pitchFamily="49" charset="0"/>
+                <a:cs typeface="Consolas" panose="020B0609020204030204" pitchFamily="49" charset="0"/>
+              </a:rPr>
+              <a:t>$</a:t>
+            </a:r>
+            <a:r>
+              <a:rPr lang="en-US" dirty="0" smtClean="0">
+                <a:solidFill>
+                  <a:srgbClr val="00B050"/>
+                </a:solidFill>
+                <a:latin typeface="Consolas" panose="020B0609020204030204" pitchFamily="49" charset="0"/>
+                <a:cs typeface="Consolas" panose="020B0609020204030204" pitchFamily="49" charset="0"/>
+              </a:rPr>
+              <a:t> </a:t>
+            </a:r>
+            <a:r>
+              <a:rPr lang="en-US" dirty="0">
+                <a:solidFill>
+                  <a:srgbClr val="00B050"/>
+                </a:solidFill>
+                <a:latin typeface="Consolas" panose="020B0609020204030204" pitchFamily="49" charset="0"/>
+                <a:cs typeface="Consolas" panose="020B0609020204030204" pitchFamily="49" charset="0"/>
+              </a:rPr>
+              <a:t>apt-get </a:t>
+            </a:r>
+            <a:r>
+              <a:rPr lang="en-US" dirty="0" smtClean="0">
+                <a:solidFill>
+                  <a:srgbClr val="00B050"/>
+                </a:solidFill>
+                <a:latin typeface="Consolas" panose="020B0609020204030204" pitchFamily="49" charset="0"/>
+                <a:cs typeface="Consolas" panose="020B0609020204030204" pitchFamily="49" charset="0"/>
+              </a:rPr>
+              <a:t>remove &lt;</a:t>
+            </a:r>
+            <a:r>
+              <a:rPr lang="en-US" dirty="0" err="1" smtClean="0">
+                <a:solidFill>
+                  <a:srgbClr val="00B050"/>
+                </a:solidFill>
+                <a:latin typeface="Consolas" panose="020B0609020204030204" pitchFamily="49" charset="0"/>
+                <a:cs typeface="Consolas" panose="020B0609020204030204" pitchFamily="49" charset="0"/>
+              </a:rPr>
+              <a:t>packagename</a:t>
+            </a:r>
+            <a:r>
+              <a:rPr lang="en-US" dirty="0" smtClean="0">
+                <a:solidFill>
+                  <a:srgbClr val="00B050"/>
+                </a:solidFill>
+                <a:latin typeface="Consolas" panose="020B0609020204030204" pitchFamily="49" charset="0"/>
+                <a:cs typeface="Consolas" panose="020B0609020204030204" pitchFamily="49" charset="0"/>
+              </a:rPr>
+              <a:t>&gt;</a:t>
+            </a:r>
+            <a:endParaRPr lang="en-US" dirty="0">
+              <a:solidFill>
+                <a:srgbClr val="0070C0"/>
+              </a:solidFill>
+              <a:latin typeface="Consolas" panose="020B0609020204030204" pitchFamily="49" charset="0"/>
+              <a:cs typeface="Consolas" panose="020B0609020204030204" pitchFamily="49" charset="0"/>
+            </a:endParaRPr>
+          </a:p>
+        </p:txBody>
+      </p:sp>
+      <p:sp>
+        <p:nvSpPr>
+          <p:cNvPr id="7" name="TextBox 6"/>
+          <p:cNvSpPr txBox="1"/>
+          <p:nvPr/>
+        </p:nvSpPr>
+        <p:spPr>
+          <a:xfrm>
+            <a:off x="1405069" y="5118004"/>
+            <a:ext cx="6486203" cy="646331"/>
+          </a:xfrm>
+          <a:prstGeom prst="rect">
+            <a:avLst/>
+          </a:prstGeom>
+        </p:spPr>
+        <p:style>
+          <a:lnRef idx="1">
+            <a:schemeClr val="dk1"/>
+          </a:lnRef>
+          <a:fillRef idx="2">
+            <a:schemeClr val="dk1"/>
+          </a:fillRef>
+          <a:effectRef idx="1">
+            <a:schemeClr val="dk1"/>
+          </a:effectRef>
+          <a:fontRef idx="minor">
+            <a:schemeClr val="dk1"/>
+          </a:fontRef>
+        </p:style>
+        <p:txBody>
+          <a:bodyPr wrap="square" rtlCol="0">
+            <a:spAutoFit/>
+          </a:bodyPr>
+          <a:lstStyle/>
+          <a:p>
+            <a:r>
+              <a:rPr lang="en-US" dirty="0" err="1" smtClean="0">
+                <a:solidFill>
+                  <a:srgbClr val="C00000"/>
+                </a:solidFill>
+                <a:latin typeface="Consolas" panose="020B0609020204030204" pitchFamily="49" charset="0"/>
+                <a:cs typeface="Consolas" panose="020B0609020204030204" pitchFamily="49" charset="0"/>
+              </a:rPr>
+              <a:t>bioboost@NDWMINT</a:t>
+            </a:r>
+            <a:r>
+              <a:rPr lang="en-US" dirty="0" smtClean="0">
+                <a:solidFill>
+                  <a:srgbClr val="C00000"/>
+                </a:solidFill>
+                <a:latin typeface="Consolas" panose="020B0609020204030204" pitchFamily="49" charset="0"/>
+                <a:cs typeface="Consolas" panose="020B0609020204030204" pitchFamily="49" charset="0"/>
+              </a:rPr>
+              <a:t> </a:t>
+            </a:r>
+            <a:r>
+              <a:rPr lang="en-US" dirty="0">
+                <a:solidFill>
+                  <a:srgbClr val="C00000"/>
+                </a:solidFill>
+                <a:latin typeface="Consolas" panose="020B0609020204030204" pitchFamily="49" charset="0"/>
+                <a:cs typeface="Consolas" panose="020B0609020204030204" pitchFamily="49" charset="0"/>
+              </a:rPr>
+              <a:t>~ </a:t>
+            </a:r>
+            <a:r>
+              <a:rPr lang="en-US" dirty="0" smtClean="0">
+                <a:solidFill>
+                  <a:srgbClr val="C00000"/>
+                </a:solidFill>
+                <a:latin typeface="Consolas" panose="020B0609020204030204" pitchFamily="49" charset="0"/>
+                <a:cs typeface="Consolas" panose="020B0609020204030204" pitchFamily="49" charset="0"/>
+              </a:rPr>
+              <a:t>$</a:t>
+            </a:r>
+            <a:r>
+              <a:rPr lang="en-US" dirty="0" smtClean="0">
+                <a:solidFill>
+                  <a:srgbClr val="00B050"/>
+                </a:solidFill>
+                <a:latin typeface="Consolas" panose="020B0609020204030204" pitchFamily="49" charset="0"/>
+                <a:cs typeface="Consolas" panose="020B0609020204030204" pitchFamily="49" charset="0"/>
+              </a:rPr>
+              <a:t> </a:t>
+            </a:r>
+            <a:r>
+              <a:rPr lang="en-US" dirty="0">
+                <a:solidFill>
+                  <a:srgbClr val="00B050"/>
+                </a:solidFill>
+                <a:latin typeface="Consolas" panose="020B0609020204030204" pitchFamily="49" charset="0"/>
+                <a:cs typeface="Consolas" panose="020B0609020204030204" pitchFamily="49" charset="0"/>
+              </a:rPr>
+              <a:t>apt-get </a:t>
+            </a:r>
+            <a:r>
+              <a:rPr lang="en-US" dirty="0" smtClean="0">
+                <a:solidFill>
+                  <a:srgbClr val="00B050"/>
+                </a:solidFill>
+                <a:latin typeface="Consolas" panose="020B0609020204030204" pitchFamily="49" charset="0"/>
+                <a:cs typeface="Consolas" panose="020B0609020204030204" pitchFamily="49" charset="0"/>
+              </a:rPr>
+              <a:t>--purge remove &lt;</a:t>
+            </a:r>
+            <a:r>
+              <a:rPr lang="en-US" dirty="0" err="1" smtClean="0">
+                <a:solidFill>
+                  <a:srgbClr val="00B050"/>
+                </a:solidFill>
+                <a:latin typeface="Consolas" panose="020B0609020204030204" pitchFamily="49" charset="0"/>
+                <a:cs typeface="Consolas" panose="020B0609020204030204" pitchFamily="49" charset="0"/>
+              </a:rPr>
+              <a:t>packagename</a:t>
+            </a:r>
+            <a:r>
+              <a:rPr lang="en-US" dirty="0" smtClean="0">
+                <a:solidFill>
+                  <a:srgbClr val="00B050"/>
+                </a:solidFill>
+                <a:latin typeface="Consolas" panose="020B0609020204030204" pitchFamily="49" charset="0"/>
+                <a:cs typeface="Consolas" panose="020B0609020204030204" pitchFamily="49" charset="0"/>
+              </a:rPr>
+              <a:t>&gt;</a:t>
+            </a:r>
+            <a:endParaRPr lang="en-US" dirty="0">
+              <a:solidFill>
+                <a:srgbClr val="0070C0"/>
+              </a:solidFill>
+              <a:latin typeface="Consolas" panose="020B0609020204030204" pitchFamily="49" charset="0"/>
+              <a:cs typeface="Consolas" panose="020B0609020204030204" pitchFamily="49" charset="0"/>
+            </a:endParaRPr>
+          </a:p>
+        </p:txBody>
+      </p:sp>
+    </p:spTree>
+    <p:extLst>
+      <p:ext uri="{BB962C8B-B14F-4D97-AF65-F5344CB8AC3E}">
+        <p14:creationId xmlns:p14="http://schemas.microsoft.com/office/powerpoint/2010/main" val="1778081964"/>
+      </p:ext>
+    </p:extLst>
+  </p:cSld>
+  <p:clrMapOvr>
+    <a:masterClrMapping/>
+  </p:clrMapOvr>
 </p:sld>
 </file>
 
@@ -18630,6 +20197,1643 @@
   <p:clrMapOvr>
     <a:masterClrMapping/>
   </p:clrMapOvr>
+</p:sld>
+</file>
+
+<file path=ppt/slides/slide50.xml><?xml version="1.0" encoding="utf-8"?>
+<p:sld xmlns:a="http://schemas.openxmlformats.org/drawingml/2006/main" xmlns:r="http://schemas.openxmlformats.org/officeDocument/2006/relationships" xmlns:p="http://schemas.openxmlformats.org/presentationml/2006/main">
+  <p:cSld>
+    <p:spTree>
+      <p:nvGrpSpPr>
+        <p:cNvPr id="1" name=""/>
+        <p:cNvGrpSpPr/>
+        <p:nvPr/>
+      </p:nvGrpSpPr>
+      <p:grpSpPr>
+        <a:xfrm>
+          <a:off x="0" y="0"/>
+          <a:ext cx="0" cy="0"/>
+          <a:chOff x="0" y="0"/>
+          <a:chExt cx="0" cy="0"/>
+        </a:xfrm>
+      </p:grpSpPr>
+      <p:sp>
+        <p:nvSpPr>
+          <p:cNvPr id="2" name="Title 1"/>
+          <p:cNvSpPr>
+            <a:spLocks noGrp="1"/>
+          </p:cNvSpPr>
+          <p:nvPr>
+            <p:ph type="title"/>
+          </p:nvPr>
+        </p:nvSpPr>
+        <p:spPr/>
+        <p:txBody>
+          <a:bodyPr/>
+          <a:lstStyle/>
+          <a:p>
+            <a:r>
+              <a:rPr lang="en-US" dirty="0" smtClean="0"/>
+              <a:t>Using APT to Manage Your Packages</a:t>
+            </a:r>
+            <a:endParaRPr lang="en-US" dirty="0"/>
+          </a:p>
+        </p:txBody>
+      </p:sp>
+      <p:sp>
+        <p:nvSpPr>
+          <p:cNvPr id="3" name="Content Placeholder 2"/>
+          <p:cNvSpPr>
+            <a:spLocks noGrp="1"/>
+          </p:cNvSpPr>
+          <p:nvPr>
+            <p:ph idx="1"/>
+          </p:nvPr>
+        </p:nvSpPr>
+        <p:spPr/>
+        <p:txBody>
+          <a:bodyPr>
+            <a:normAutofit/>
+          </a:bodyPr>
+          <a:lstStyle/>
+          <a:p>
+            <a:r>
+              <a:rPr lang="en-US" dirty="0" smtClean="0"/>
+              <a:t>To </a:t>
+            </a:r>
+            <a:r>
+              <a:rPr lang="en-US" dirty="0"/>
+              <a:t>upgrade all the packages on your system, and, if needed for a package upgrade, installing extra packages or removing packages, </a:t>
+            </a:r>
+            <a:r>
+              <a:rPr lang="en-US" dirty="0" smtClean="0"/>
+              <a:t>run</a:t>
+            </a:r>
+          </a:p>
+          <a:p>
+            <a:endParaRPr lang="en-US" dirty="0"/>
+          </a:p>
+          <a:p>
+            <a:endParaRPr lang="en-US" dirty="0" smtClean="0"/>
+          </a:p>
+          <a:p>
+            <a:endParaRPr lang="en-US" dirty="0"/>
+          </a:p>
+          <a:p>
+            <a:r>
+              <a:rPr lang="en-US" dirty="0" smtClean="0"/>
+              <a:t>Some exercises</a:t>
+            </a:r>
+          </a:p>
+          <a:p>
+            <a:pPr lvl="1"/>
+            <a:r>
+              <a:rPr lang="en-US" dirty="0" smtClean="0"/>
+              <a:t>Install </a:t>
+            </a:r>
+            <a:r>
+              <a:rPr lang="en-US" dirty="0" err="1" smtClean="0"/>
+              <a:t>git</a:t>
+            </a:r>
+            <a:endParaRPr lang="en-US" dirty="0" smtClean="0"/>
+          </a:p>
+          <a:p>
+            <a:pPr lvl="1"/>
+            <a:r>
+              <a:rPr lang="en-US" dirty="0" smtClean="0"/>
+              <a:t>Install aptitude</a:t>
+            </a:r>
+          </a:p>
+          <a:p>
+            <a:pPr lvl="1"/>
+            <a:r>
+              <a:rPr lang="en-US" dirty="0" smtClean="0"/>
+              <a:t>Install ruby</a:t>
+            </a:r>
+            <a:endParaRPr lang="en-US" dirty="0"/>
+          </a:p>
+        </p:txBody>
+      </p:sp>
+      <p:sp>
+        <p:nvSpPr>
+          <p:cNvPr id="4" name="Slide Number Placeholder 3"/>
+          <p:cNvSpPr>
+            <a:spLocks noGrp="1"/>
+          </p:cNvSpPr>
+          <p:nvPr>
+            <p:ph type="sldNum" sz="quarter" idx="12"/>
+          </p:nvPr>
+        </p:nvSpPr>
+        <p:spPr/>
+        <p:txBody>
+          <a:bodyPr/>
+          <a:lstStyle/>
+          <a:p>
+            <a:fld id="{52DB1A75-B9BE-46B1-B482-5F96E51FA4B2}" type="slidenum">
+              <a:rPr lang="en-US" smtClean="0"/>
+              <a:t>50</a:t>
+            </a:fld>
+            <a:endParaRPr lang="en-US"/>
+          </a:p>
+        </p:txBody>
+      </p:sp>
+      <p:sp>
+        <p:nvSpPr>
+          <p:cNvPr id="5" name="TextBox 4"/>
+          <p:cNvSpPr txBox="1"/>
+          <p:nvPr/>
+        </p:nvSpPr>
+        <p:spPr>
+          <a:xfrm>
+            <a:off x="1786276" y="2458486"/>
+            <a:ext cx="5571448" cy="369332"/>
+          </a:xfrm>
+          <a:prstGeom prst="rect">
+            <a:avLst/>
+          </a:prstGeom>
+        </p:spPr>
+        <p:style>
+          <a:lnRef idx="1">
+            <a:schemeClr val="dk1"/>
+          </a:lnRef>
+          <a:fillRef idx="2">
+            <a:schemeClr val="dk1"/>
+          </a:fillRef>
+          <a:effectRef idx="1">
+            <a:schemeClr val="dk1"/>
+          </a:effectRef>
+          <a:fontRef idx="minor">
+            <a:schemeClr val="dk1"/>
+          </a:fontRef>
+        </p:style>
+        <p:txBody>
+          <a:bodyPr wrap="square" rtlCol="0">
+            <a:spAutoFit/>
+          </a:bodyPr>
+          <a:lstStyle/>
+          <a:p>
+            <a:r>
+              <a:rPr lang="en-US" dirty="0" err="1" smtClean="0">
+                <a:solidFill>
+                  <a:srgbClr val="C00000"/>
+                </a:solidFill>
+                <a:latin typeface="Consolas" panose="020B0609020204030204" pitchFamily="49" charset="0"/>
+                <a:cs typeface="Consolas" panose="020B0609020204030204" pitchFamily="49" charset="0"/>
+              </a:rPr>
+              <a:t>bioboost@NDWMINT</a:t>
+            </a:r>
+            <a:r>
+              <a:rPr lang="en-US" dirty="0" smtClean="0">
+                <a:solidFill>
+                  <a:srgbClr val="C00000"/>
+                </a:solidFill>
+                <a:latin typeface="Consolas" panose="020B0609020204030204" pitchFamily="49" charset="0"/>
+                <a:cs typeface="Consolas" panose="020B0609020204030204" pitchFamily="49" charset="0"/>
+              </a:rPr>
+              <a:t> </a:t>
+            </a:r>
+            <a:r>
+              <a:rPr lang="en-US" dirty="0">
+                <a:solidFill>
+                  <a:srgbClr val="C00000"/>
+                </a:solidFill>
+                <a:latin typeface="Consolas" panose="020B0609020204030204" pitchFamily="49" charset="0"/>
+                <a:cs typeface="Consolas" panose="020B0609020204030204" pitchFamily="49" charset="0"/>
+              </a:rPr>
+              <a:t>~ </a:t>
+            </a:r>
+            <a:r>
+              <a:rPr lang="en-US" dirty="0" smtClean="0">
+                <a:solidFill>
+                  <a:srgbClr val="C00000"/>
+                </a:solidFill>
+                <a:latin typeface="Consolas" panose="020B0609020204030204" pitchFamily="49" charset="0"/>
+                <a:cs typeface="Consolas" panose="020B0609020204030204" pitchFamily="49" charset="0"/>
+              </a:rPr>
+              <a:t>$</a:t>
+            </a:r>
+            <a:r>
+              <a:rPr lang="en-US" dirty="0">
+                <a:solidFill>
+                  <a:srgbClr val="00B050"/>
+                </a:solidFill>
+                <a:latin typeface="Consolas" panose="020B0609020204030204" pitchFamily="49" charset="0"/>
+                <a:cs typeface="Consolas" panose="020B0609020204030204" pitchFamily="49" charset="0"/>
+              </a:rPr>
+              <a:t> apt-get </a:t>
+            </a:r>
+            <a:r>
+              <a:rPr lang="en-US" dirty="0" err="1">
+                <a:solidFill>
+                  <a:srgbClr val="00B050"/>
+                </a:solidFill>
+                <a:latin typeface="Consolas" panose="020B0609020204030204" pitchFamily="49" charset="0"/>
+                <a:cs typeface="Consolas" panose="020B0609020204030204" pitchFamily="49" charset="0"/>
+              </a:rPr>
+              <a:t>dist</a:t>
+            </a:r>
+            <a:r>
+              <a:rPr lang="en-US" dirty="0">
+                <a:solidFill>
+                  <a:srgbClr val="00B050"/>
+                </a:solidFill>
+                <a:latin typeface="Consolas" panose="020B0609020204030204" pitchFamily="49" charset="0"/>
+                <a:cs typeface="Consolas" panose="020B0609020204030204" pitchFamily="49" charset="0"/>
+              </a:rPr>
+              <a:t>-upgrade</a:t>
+            </a:r>
+            <a:endParaRPr lang="en-US" dirty="0">
+              <a:solidFill>
+                <a:srgbClr val="0070C0"/>
+              </a:solidFill>
+              <a:latin typeface="Consolas" panose="020B0609020204030204" pitchFamily="49" charset="0"/>
+              <a:cs typeface="Consolas" panose="020B0609020204030204" pitchFamily="49" charset="0"/>
+            </a:endParaRPr>
+          </a:p>
+        </p:txBody>
+      </p:sp>
+    </p:spTree>
+    <p:extLst>
+      <p:ext uri="{BB962C8B-B14F-4D97-AF65-F5344CB8AC3E}">
+        <p14:creationId xmlns:p14="http://schemas.microsoft.com/office/powerpoint/2010/main" val="386464259"/>
+      </p:ext>
+    </p:extLst>
+  </p:cSld>
+  <p:clrMapOvr>
+    <a:masterClrMapping/>
+  </p:clrMapOvr>
+</p:sld>
+</file>
+
+<file path=ppt/slides/slide51.xml><?xml version="1.0" encoding="utf-8"?>
+<p:sld xmlns:a="http://schemas.openxmlformats.org/drawingml/2006/main" xmlns:r="http://schemas.openxmlformats.org/officeDocument/2006/relationships" xmlns:p="http://schemas.openxmlformats.org/presentationml/2006/main">
+  <p:cSld>
+    <p:spTree>
+      <p:nvGrpSpPr>
+        <p:cNvPr id="1" name=""/>
+        <p:cNvGrpSpPr/>
+        <p:nvPr/>
+      </p:nvGrpSpPr>
+      <p:grpSpPr>
+        <a:xfrm>
+          <a:off x="0" y="0"/>
+          <a:ext cx="0" cy="0"/>
+          <a:chOff x="0" y="0"/>
+          <a:chExt cx="0" cy="0"/>
+        </a:xfrm>
+      </p:grpSpPr>
+      <p:sp>
+        <p:nvSpPr>
+          <p:cNvPr id="2" name="Title 1"/>
+          <p:cNvSpPr>
+            <a:spLocks noGrp="1"/>
+          </p:cNvSpPr>
+          <p:nvPr>
+            <p:ph type="title"/>
+          </p:nvPr>
+        </p:nvSpPr>
+        <p:spPr/>
+        <p:txBody>
+          <a:bodyPr/>
+          <a:lstStyle/>
+          <a:p>
+            <a:r>
+              <a:rPr lang="en-US" dirty="0" smtClean="0"/>
+              <a:t>Aptitude</a:t>
+            </a:r>
+            <a:endParaRPr lang="en-US" dirty="0"/>
+          </a:p>
+        </p:txBody>
+      </p:sp>
+      <p:sp>
+        <p:nvSpPr>
+          <p:cNvPr id="3" name="Content Placeholder 2"/>
+          <p:cNvSpPr>
+            <a:spLocks noGrp="1"/>
+          </p:cNvSpPr>
+          <p:nvPr>
+            <p:ph idx="1"/>
+          </p:nvPr>
+        </p:nvSpPr>
+        <p:spPr/>
+        <p:txBody>
+          <a:bodyPr>
+            <a:normAutofit/>
+          </a:bodyPr>
+          <a:lstStyle/>
+          <a:p>
+            <a:r>
+              <a:rPr lang="en-US" dirty="0" smtClean="0"/>
+              <a:t>Aptitude </a:t>
+            </a:r>
+            <a:r>
+              <a:rPr lang="en-US" dirty="0"/>
+              <a:t>is a </a:t>
+            </a:r>
+            <a:r>
+              <a:rPr lang="en-US" dirty="0">
+                <a:solidFill>
+                  <a:srgbClr val="0070C0"/>
+                </a:solidFill>
+              </a:rPr>
+              <a:t>package manager </a:t>
+            </a:r>
+            <a:r>
+              <a:rPr lang="en-US" dirty="0"/>
+              <a:t>for </a:t>
+            </a:r>
+            <a:r>
+              <a:rPr lang="en-US" dirty="0" err="1"/>
+              <a:t>Debian</a:t>
+            </a:r>
+            <a:r>
+              <a:rPr lang="en-US" dirty="0"/>
+              <a:t> GNU/Linux systems that provides a </a:t>
+            </a:r>
+            <a:r>
+              <a:rPr lang="en-US" dirty="0">
+                <a:solidFill>
+                  <a:srgbClr val="0070C0"/>
+                </a:solidFill>
+              </a:rPr>
+              <a:t>frontend</a:t>
+            </a:r>
+            <a:r>
+              <a:rPr lang="en-US" dirty="0"/>
+              <a:t> to the </a:t>
+            </a:r>
+            <a:r>
+              <a:rPr lang="en-US" dirty="0">
+                <a:solidFill>
+                  <a:srgbClr val="0070C0"/>
+                </a:solidFill>
+              </a:rPr>
+              <a:t>apt</a:t>
+            </a:r>
+            <a:r>
+              <a:rPr lang="en-US" dirty="0"/>
+              <a:t> package management </a:t>
+            </a:r>
+            <a:r>
+              <a:rPr lang="en-US" dirty="0" smtClean="0"/>
+              <a:t>infrastructure.</a:t>
+            </a:r>
+          </a:p>
+          <a:p>
+            <a:pPr lvl="1"/>
+            <a:r>
+              <a:rPr lang="en-US" dirty="0" smtClean="0"/>
+              <a:t>Aptitude </a:t>
+            </a:r>
+            <a:r>
+              <a:rPr lang="en-US" dirty="0"/>
+              <a:t>is a </a:t>
+            </a:r>
+            <a:r>
+              <a:rPr lang="en-US" dirty="0" smtClean="0"/>
+              <a:t>text-based </a:t>
+            </a:r>
+            <a:r>
+              <a:rPr lang="en-US" dirty="0"/>
+              <a:t>interface using the </a:t>
+            </a:r>
+            <a:r>
+              <a:rPr lang="en-US" dirty="0">
+                <a:solidFill>
+                  <a:srgbClr val="0070C0"/>
+                </a:solidFill>
+              </a:rPr>
+              <a:t>curses</a:t>
+            </a:r>
+            <a:r>
+              <a:rPr lang="en-US" dirty="0"/>
+              <a:t> </a:t>
+            </a:r>
+            <a:r>
+              <a:rPr lang="en-US" dirty="0" smtClean="0"/>
+              <a:t>library</a:t>
+            </a:r>
+          </a:p>
+          <a:p>
+            <a:endParaRPr lang="en-US" dirty="0" smtClean="0"/>
+          </a:p>
+          <a:p>
+            <a:r>
+              <a:rPr lang="en-US" dirty="0" smtClean="0"/>
+              <a:t>Easy </a:t>
+            </a:r>
+            <a:r>
+              <a:rPr lang="en-US" dirty="0"/>
+              <a:t>access to all versions of a package.</a:t>
+            </a:r>
+          </a:p>
+          <a:p>
+            <a:r>
+              <a:rPr lang="en-US" dirty="0" smtClean="0"/>
+              <a:t>easy </a:t>
+            </a:r>
+            <a:r>
+              <a:rPr lang="en-US" dirty="0"/>
+              <a:t>to keep track of obsolete software by listing it under "Obsolete and Locally Created Packages".</a:t>
+            </a:r>
+          </a:p>
+          <a:p>
+            <a:r>
+              <a:rPr lang="en-US" dirty="0" smtClean="0"/>
+              <a:t>fairly </a:t>
+            </a:r>
+            <a:r>
+              <a:rPr lang="en-US" dirty="0"/>
+              <a:t>powerful system for searching particular packages and limiting the package </a:t>
+            </a:r>
+            <a:r>
+              <a:rPr lang="en-US" dirty="0" smtClean="0"/>
+              <a:t>display</a:t>
+            </a:r>
+          </a:p>
+          <a:p>
+            <a:r>
+              <a:rPr lang="en-US" dirty="0" smtClean="0"/>
+              <a:t>can </a:t>
+            </a:r>
+            <a:r>
+              <a:rPr lang="en-US" dirty="0"/>
+              <a:t>be used to install the predefined </a:t>
+            </a:r>
+            <a:r>
+              <a:rPr lang="en-US" dirty="0" smtClean="0"/>
+              <a:t>tasks</a:t>
+            </a:r>
+          </a:p>
+          <a:p>
+            <a:r>
+              <a:rPr lang="en-US" dirty="0" smtClean="0"/>
+              <a:t>Aptitude </a:t>
+            </a:r>
+            <a:r>
+              <a:rPr lang="en-US" dirty="0"/>
+              <a:t>in full screen mode has </a:t>
+            </a:r>
+            <a:r>
+              <a:rPr lang="en-US" dirty="0" err="1"/>
+              <a:t>su</a:t>
+            </a:r>
+            <a:r>
+              <a:rPr lang="en-US" dirty="0"/>
+              <a:t> functionality embedded and can be run by a normal </a:t>
+            </a:r>
+            <a:r>
+              <a:rPr lang="en-US" dirty="0" smtClean="0"/>
+              <a:t>user.</a:t>
+            </a:r>
+          </a:p>
+          <a:p>
+            <a:pPr lvl="1"/>
+            <a:r>
+              <a:rPr lang="en-US" dirty="0" smtClean="0"/>
+              <a:t>It </a:t>
+            </a:r>
+            <a:r>
+              <a:rPr lang="en-US" dirty="0"/>
+              <a:t>will call </a:t>
+            </a:r>
+            <a:r>
+              <a:rPr lang="en-US" dirty="0" err="1"/>
+              <a:t>su</a:t>
+            </a:r>
+            <a:r>
+              <a:rPr lang="en-US" dirty="0"/>
+              <a:t> (and ask for the root password, if any) when you really need administrative privileges</a:t>
+            </a:r>
+          </a:p>
+          <a:p>
+            <a:endParaRPr lang="en-US" dirty="0"/>
+          </a:p>
+        </p:txBody>
+      </p:sp>
+      <p:sp>
+        <p:nvSpPr>
+          <p:cNvPr id="4" name="Slide Number Placeholder 3"/>
+          <p:cNvSpPr>
+            <a:spLocks noGrp="1"/>
+          </p:cNvSpPr>
+          <p:nvPr>
+            <p:ph type="sldNum" sz="quarter" idx="12"/>
+          </p:nvPr>
+        </p:nvSpPr>
+        <p:spPr/>
+        <p:txBody>
+          <a:bodyPr/>
+          <a:lstStyle/>
+          <a:p>
+            <a:fld id="{52DB1A75-B9BE-46B1-B482-5F96E51FA4B2}" type="slidenum">
+              <a:rPr lang="en-US" smtClean="0"/>
+              <a:t>51</a:t>
+            </a:fld>
+            <a:endParaRPr lang="en-US"/>
+          </a:p>
+        </p:txBody>
+      </p:sp>
+    </p:spTree>
+    <p:extLst>
+      <p:ext uri="{BB962C8B-B14F-4D97-AF65-F5344CB8AC3E}">
+        <p14:creationId xmlns:p14="http://schemas.microsoft.com/office/powerpoint/2010/main" val="590676747"/>
+      </p:ext>
+    </p:extLst>
+  </p:cSld>
+  <p:clrMapOvr>
+    <a:masterClrMapping/>
+  </p:clrMapOvr>
+</p:sld>
+</file>
+
+<file path=ppt/slides/slide52.xml><?xml version="1.0" encoding="utf-8"?>
+<p:sld xmlns:a="http://schemas.openxmlformats.org/drawingml/2006/main" xmlns:r="http://schemas.openxmlformats.org/officeDocument/2006/relationships" xmlns:p="http://schemas.openxmlformats.org/presentationml/2006/main">
+  <p:cSld>
+    <p:spTree>
+      <p:nvGrpSpPr>
+        <p:cNvPr id="1" name=""/>
+        <p:cNvGrpSpPr/>
+        <p:nvPr/>
+      </p:nvGrpSpPr>
+      <p:grpSpPr>
+        <a:xfrm>
+          <a:off x="0" y="0"/>
+          <a:ext cx="0" cy="0"/>
+          <a:chOff x="0" y="0"/>
+          <a:chExt cx="0" cy="0"/>
+        </a:xfrm>
+      </p:grpSpPr>
+      <p:sp>
+        <p:nvSpPr>
+          <p:cNvPr id="2" name="Title 1"/>
+          <p:cNvSpPr>
+            <a:spLocks noGrp="1"/>
+          </p:cNvSpPr>
+          <p:nvPr>
+            <p:ph type="title"/>
+          </p:nvPr>
+        </p:nvSpPr>
+        <p:spPr/>
+        <p:txBody>
+          <a:bodyPr/>
+          <a:lstStyle/>
+          <a:p>
+            <a:r>
+              <a:rPr lang="en-US" dirty="0" smtClean="0"/>
+              <a:t>Aptitude</a:t>
+            </a:r>
+            <a:endParaRPr lang="en-US" dirty="0"/>
+          </a:p>
+        </p:txBody>
+      </p:sp>
+      <p:sp>
+        <p:nvSpPr>
+          <p:cNvPr id="3" name="Content Placeholder 2"/>
+          <p:cNvSpPr>
+            <a:spLocks noGrp="1"/>
+          </p:cNvSpPr>
+          <p:nvPr>
+            <p:ph idx="1"/>
+          </p:nvPr>
+        </p:nvSpPr>
+        <p:spPr/>
+        <p:txBody>
+          <a:bodyPr>
+            <a:normAutofit/>
+          </a:bodyPr>
+          <a:lstStyle/>
+          <a:p>
+            <a:r>
+              <a:rPr lang="en-US" dirty="0" smtClean="0"/>
+              <a:t>We will mainly use it for searching for packages</a:t>
+            </a:r>
+          </a:p>
+          <a:p>
+            <a:endParaRPr lang="en-US" dirty="0"/>
+          </a:p>
+          <a:p>
+            <a:endParaRPr lang="en-US" dirty="0" smtClean="0"/>
+          </a:p>
+          <a:p>
+            <a:endParaRPr lang="en-US" dirty="0"/>
+          </a:p>
+          <a:p>
+            <a:endParaRPr lang="en-US" dirty="0" smtClean="0"/>
+          </a:p>
+          <a:p>
+            <a:r>
+              <a:rPr lang="en-US" dirty="0" smtClean="0"/>
+              <a:t>Assignment</a:t>
+            </a:r>
+          </a:p>
+          <a:p>
+            <a:pPr lvl="1"/>
+            <a:r>
+              <a:rPr lang="en-US" dirty="0"/>
+              <a:t>Install the apache package and find out where the webpages are stored. Make sure you can view your </a:t>
+            </a:r>
+            <a:r>
+              <a:rPr lang="en-US" dirty="0" smtClean="0"/>
+              <a:t>website </a:t>
+            </a:r>
+            <a:r>
+              <a:rPr lang="en-US" dirty="0"/>
+              <a:t>from your host machine. Change the index.html page (you can use the </a:t>
+            </a:r>
+            <a:r>
+              <a:rPr lang="en-US" dirty="0" err="1"/>
+              <a:t>nano</a:t>
+            </a:r>
+            <a:r>
+              <a:rPr lang="en-US" dirty="0"/>
+              <a:t> editor for this) and add some cool things to it.</a:t>
+            </a:r>
+            <a:endParaRPr lang="en-US" dirty="0" smtClean="0"/>
+          </a:p>
+          <a:p>
+            <a:endParaRPr lang="en-US" dirty="0"/>
+          </a:p>
+        </p:txBody>
+      </p:sp>
+      <p:sp>
+        <p:nvSpPr>
+          <p:cNvPr id="4" name="Slide Number Placeholder 3"/>
+          <p:cNvSpPr>
+            <a:spLocks noGrp="1"/>
+          </p:cNvSpPr>
+          <p:nvPr>
+            <p:ph type="sldNum" sz="quarter" idx="12"/>
+          </p:nvPr>
+        </p:nvSpPr>
+        <p:spPr/>
+        <p:txBody>
+          <a:bodyPr/>
+          <a:lstStyle/>
+          <a:p>
+            <a:fld id="{52DB1A75-B9BE-46B1-B482-5F96E51FA4B2}" type="slidenum">
+              <a:rPr lang="en-US" smtClean="0"/>
+              <a:t>52</a:t>
+            </a:fld>
+            <a:endParaRPr lang="en-US"/>
+          </a:p>
+        </p:txBody>
+      </p:sp>
+      <p:sp>
+        <p:nvSpPr>
+          <p:cNvPr id="5" name="TextBox 4"/>
+          <p:cNvSpPr txBox="1"/>
+          <p:nvPr/>
+        </p:nvSpPr>
+        <p:spPr>
+          <a:xfrm>
+            <a:off x="1357843" y="2293894"/>
+            <a:ext cx="6428314" cy="369332"/>
+          </a:xfrm>
+          <a:prstGeom prst="rect">
+            <a:avLst/>
+          </a:prstGeom>
+        </p:spPr>
+        <p:style>
+          <a:lnRef idx="1">
+            <a:schemeClr val="dk1"/>
+          </a:lnRef>
+          <a:fillRef idx="2">
+            <a:schemeClr val="dk1"/>
+          </a:fillRef>
+          <a:effectRef idx="1">
+            <a:schemeClr val="dk1"/>
+          </a:effectRef>
+          <a:fontRef idx="minor">
+            <a:schemeClr val="dk1"/>
+          </a:fontRef>
+        </p:style>
+        <p:txBody>
+          <a:bodyPr wrap="square" rtlCol="0">
+            <a:spAutoFit/>
+          </a:bodyPr>
+          <a:lstStyle/>
+          <a:p>
+            <a:r>
+              <a:rPr lang="en-US" dirty="0" err="1" smtClean="0">
+                <a:solidFill>
+                  <a:srgbClr val="C00000"/>
+                </a:solidFill>
+                <a:latin typeface="Consolas" panose="020B0609020204030204" pitchFamily="49" charset="0"/>
+                <a:cs typeface="Consolas" panose="020B0609020204030204" pitchFamily="49" charset="0"/>
+              </a:rPr>
+              <a:t>bioboost@NDWMINT</a:t>
+            </a:r>
+            <a:r>
+              <a:rPr lang="en-US" dirty="0" smtClean="0">
+                <a:solidFill>
+                  <a:srgbClr val="C00000"/>
+                </a:solidFill>
+                <a:latin typeface="Consolas" panose="020B0609020204030204" pitchFamily="49" charset="0"/>
+                <a:cs typeface="Consolas" panose="020B0609020204030204" pitchFamily="49" charset="0"/>
+              </a:rPr>
+              <a:t> </a:t>
+            </a:r>
+            <a:r>
+              <a:rPr lang="en-US" dirty="0">
+                <a:solidFill>
+                  <a:srgbClr val="C00000"/>
+                </a:solidFill>
+                <a:latin typeface="Consolas" panose="020B0609020204030204" pitchFamily="49" charset="0"/>
+                <a:cs typeface="Consolas" panose="020B0609020204030204" pitchFamily="49" charset="0"/>
+              </a:rPr>
+              <a:t>~ </a:t>
+            </a:r>
+            <a:r>
+              <a:rPr lang="en-US" dirty="0" smtClean="0">
+                <a:solidFill>
+                  <a:srgbClr val="C00000"/>
+                </a:solidFill>
+                <a:latin typeface="Consolas" panose="020B0609020204030204" pitchFamily="49" charset="0"/>
+                <a:cs typeface="Consolas" panose="020B0609020204030204" pitchFamily="49" charset="0"/>
+              </a:rPr>
+              <a:t>$</a:t>
+            </a:r>
+            <a:r>
+              <a:rPr lang="en-US" dirty="0">
+                <a:solidFill>
+                  <a:srgbClr val="00B050"/>
+                </a:solidFill>
+                <a:latin typeface="Consolas" panose="020B0609020204030204" pitchFamily="49" charset="0"/>
+                <a:cs typeface="Consolas" panose="020B0609020204030204" pitchFamily="49" charset="0"/>
+              </a:rPr>
+              <a:t> </a:t>
+            </a:r>
+            <a:r>
+              <a:rPr lang="en-US" dirty="0" smtClean="0">
+                <a:solidFill>
+                  <a:srgbClr val="00B050"/>
+                </a:solidFill>
+                <a:latin typeface="Consolas" panose="020B0609020204030204" pitchFamily="49" charset="0"/>
+                <a:cs typeface="Consolas" panose="020B0609020204030204" pitchFamily="49" charset="0"/>
+              </a:rPr>
+              <a:t>aptitude search &lt;</a:t>
+            </a:r>
+            <a:r>
+              <a:rPr lang="en-US" dirty="0" err="1" smtClean="0">
+                <a:solidFill>
+                  <a:srgbClr val="00B050"/>
+                </a:solidFill>
+                <a:latin typeface="Consolas" panose="020B0609020204030204" pitchFamily="49" charset="0"/>
+                <a:cs typeface="Consolas" panose="020B0609020204030204" pitchFamily="49" charset="0"/>
+              </a:rPr>
+              <a:t>searchterm</a:t>
+            </a:r>
+            <a:r>
+              <a:rPr lang="en-US" dirty="0" smtClean="0">
+                <a:solidFill>
+                  <a:srgbClr val="00B050"/>
+                </a:solidFill>
+                <a:latin typeface="Consolas" panose="020B0609020204030204" pitchFamily="49" charset="0"/>
+                <a:cs typeface="Consolas" panose="020B0609020204030204" pitchFamily="49" charset="0"/>
+              </a:rPr>
+              <a:t>&gt;</a:t>
+            </a:r>
+            <a:endParaRPr lang="en-US" dirty="0">
+              <a:solidFill>
+                <a:srgbClr val="0070C0"/>
+              </a:solidFill>
+              <a:latin typeface="Consolas" panose="020B0609020204030204" pitchFamily="49" charset="0"/>
+              <a:cs typeface="Consolas" panose="020B0609020204030204" pitchFamily="49" charset="0"/>
+            </a:endParaRPr>
+          </a:p>
+        </p:txBody>
+      </p:sp>
+    </p:spTree>
+    <p:extLst>
+      <p:ext uri="{BB962C8B-B14F-4D97-AF65-F5344CB8AC3E}">
+        <p14:creationId xmlns:p14="http://schemas.microsoft.com/office/powerpoint/2010/main" val="1143321662"/>
+      </p:ext>
+    </p:extLst>
+  </p:cSld>
+  <p:clrMapOvr>
+    <a:masterClrMapping/>
+  </p:clrMapOvr>
+</p:sld>
+</file>
+
+<file path=ppt/slides/slide53.xml><?xml version="1.0" encoding="utf-8"?>
+<p:sld xmlns:a="http://schemas.openxmlformats.org/drawingml/2006/main" xmlns:r="http://schemas.openxmlformats.org/officeDocument/2006/relationships" xmlns:p="http://schemas.openxmlformats.org/presentationml/2006/main">
+  <p:cSld>
+    <p:spTree>
+      <p:nvGrpSpPr>
+        <p:cNvPr id="1" name=""/>
+        <p:cNvGrpSpPr/>
+        <p:nvPr/>
+      </p:nvGrpSpPr>
+      <p:grpSpPr>
+        <a:xfrm>
+          <a:off x="0" y="0"/>
+          <a:ext cx="0" cy="0"/>
+          <a:chOff x="0" y="0"/>
+          <a:chExt cx="0" cy="0"/>
+        </a:xfrm>
+      </p:grpSpPr>
+      <p:sp>
+        <p:nvSpPr>
+          <p:cNvPr id="2" name="Title 1"/>
+          <p:cNvSpPr>
+            <a:spLocks noGrp="1"/>
+          </p:cNvSpPr>
+          <p:nvPr>
+            <p:ph type="title"/>
+          </p:nvPr>
+        </p:nvSpPr>
+        <p:spPr/>
+        <p:txBody>
+          <a:bodyPr/>
+          <a:lstStyle/>
+          <a:p>
+            <a:r>
+              <a:rPr lang="en-US" dirty="0" smtClean="0"/>
+              <a:t>Would you like to know more ?</a:t>
+            </a:r>
+            <a:endParaRPr lang="en-US" dirty="0"/>
+          </a:p>
+        </p:txBody>
+      </p:sp>
+      <p:sp>
+        <p:nvSpPr>
+          <p:cNvPr id="3" name="Content Placeholder 2"/>
+          <p:cNvSpPr>
+            <a:spLocks noGrp="1"/>
+          </p:cNvSpPr>
+          <p:nvPr>
+            <p:ph idx="1"/>
+          </p:nvPr>
+        </p:nvSpPr>
+        <p:spPr/>
+        <p:txBody>
+          <a:bodyPr/>
+          <a:lstStyle/>
+          <a:p>
+            <a:endParaRPr lang="en-US" dirty="0" smtClean="0"/>
+          </a:p>
+          <a:p>
+            <a:endParaRPr lang="en-US" dirty="0"/>
+          </a:p>
+          <a:p>
+            <a:endParaRPr lang="en-US" dirty="0" smtClean="0"/>
+          </a:p>
+          <a:p>
+            <a:endParaRPr lang="en-US" dirty="0" smtClean="0"/>
+          </a:p>
+          <a:p>
+            <a:endParaRPr lang="en-US" dirty="0" smtClean="0"/>
+          </a:p>
+          <a:p>
+            <a:endParaRPr lang="en-US" dirty="0"/>
+          </a:p>
+          <a:p>
+            <a:endParaRPr lang="en-US" dirty="0" smtClean="0"/>
+          </a:p>
+          <a:p>
+            <a:endParaRPr lang="en-US" dirty="0"/>
+          </a:p>
+          <a:p>
+            <a:r>
+              <a:rPr lang="en-US" dirty="0" smtClean="0"/>
+              <a:t>Well then</a:t>
+            </a:r>
+            <a:endParaRPr lang="en-US" dirty="0"/>
+          </a:p>
+        </p:txBody>
+      </p:sp>
+      <p:sp>
+        <p:nvSpPr>
+          <p:cNvPr id="4" name="Slide Number Placeholder 3"/>
+          <p:cNvSpPr>
+            <a:spLocks noGrp="1"/>
+          </p:cNvSpPr>
+          <p:nvPr>
+            <p:ph type="sldNum" sz="quarter" idx="12"/>
+          </p:nvPr>
+        </p:nvSpPr>
+        <p:spPr/>
+        <p:txBody>
+          <a:bodyPr/>
+          <a:lstStyle/>
+          <a:p>
+            <a:fld id="{52DB1A75-B9BE-46B1-B482-5F96E51FA4B2}" type="slidenum">
+              <a:rPr lang="en-US" smtClean="0"/>
+              <a:t>53</a:t>
+            </a:fld>
+            <a:endParaRPr lang="en-US"/>
+          </a:p>
+        </p:txBody>
+      </p:sp>
+      <p:pic>
+        <p:nvPicPr>
+          <p:cNvPr id="1026" name="Picture 2" descr="http://nitehawkcinema.files.wordpress.com/2012/05/starship-troopers-wyltkm.jpg"/>
+          <p:cNvPicPr>
+            <a:picLocks noChangeAspect="1" noChangeArrowheads="1"/>
+          </p:cNvPicPr>
+          <p:nvPr/>
+        </p:nvPicPr>
+        <p:blipFill>
+          <a:blip r:embed="rId2">
+            <a:extLst>
+              <a:ext uri="{28A0092B-C50C-407E-A947-70E740481C1C}">
+                <a14:useLocalDpi xmlns:a14="http://schemas.microsoft.com/office/drawing/2010/main" val="0"/>
+              </a:ext>
+            </a:extLst>
+          </a:blip>
+          <a:srcRect/>
+          <a:stretch>
+            <a:fillRect/>
+          </a:stretch>
+        </p:blipFill>
+        <p:spPr bwMode="auto">
+          <a:xfrm>
+            <a:off x="1952625" y="1124712"/>
+            <a:ext cx="5238750" cy="2867025"/>
+          </a:xfrm>
+          <a:prstGeom prst="rect">
+            <a:avLst/>
+          </a:prstGeom>
+          <a:noFill/>
+          <a:extLst>
+            <a:ext uri="{909E8E84-426E-40DD-AFC4-6F175D3DCCD1}">
+              <a14:hiddenFill xmlns:a14="http://schemas.microsoft.com/office/drawing/2010/main">
+                <a:solidFill>
+                  <a:srgbClr val="FFFFFF"/>
+                </a:solidFill>
+              </a14:hiddenFill>
+            </a:ext>
+          </a:extLst>
+        </p:spPr>
+      </p:pic>
+      <p:grpSp>
+        <p:nvGrpSpPr>
+          <p:cNvPr id="7" name="Group 6"/>
+          <p:cNvGrpSpPr/>
+          <p:nvPr/>
+        </p:nvGrpSpPr>
+        <p:grpSpPr>
+          <a:xfrm>
+            <a:off x="3090799" y="4242815"/>
+            <a:ext cx="2313173" cy="2313173"/>
+            <a:chOff x="5413375" y="1752026"/>
+            <a:chExt cx="2857500" cy="2857500"/>
+          </a:xfrm>
+        </p:grpSpPr>
+        <p:pic>
+          <p:nvPicPr>
+            <p:cNvPr id="8" name="Picture 2" descr="http://matthewhailwood.co.nz/content/images/2014/Feb/rtfm_300x300.jpg"/>
+            <p:cNvPicPr>
+              <a:picLocks noChangeAspect="1" noChangeArrowheads="1"/>
+            </p:cNvPicPr>
+            <p:nvPr/>
+          </p:nvPicPr>
+          <p:blipFill>
+            <a:blip r:embed="rId3">
+              <a:extLst>
+                <a:ext uri="{28A0092B-C50C-407E-A947-70E740481C1C}">
+                  <a14:useLocalDpi xmlns:a14="http://schemas.microsoft.com/office/drawing/2010/main" val="0"/>
+                </a:ext>
+              </a:extLst>
+            </a:blip>
+            <a:srcRect/>
+            <a:stretch>
+              <a:fillRect/>
+            </a:stretch>
+          </p:blipFill>
+          <p:spPr bwMode="auto">
+            <a:xfrm>
+              <a:off x="5413375" y="1752026"/>
+              <a:ext cx="2857500" cy="2857500"/>
+            </a:xfrm>
+            <a:prstGeom prst="rect">
+              <a:avLst/>
+            </a:prstGeom>
+            <a:noFill/>
+            <a:extLst>
+              <a:ext uri="{909E8E84-426E-40DD-AFC4-6F175D3DCCD1}">
+                <a14:hiddenFill xmlns:a14="http://schemas.microsoft.com/office/drawing/2010/main">
+                  <a:solidFill>
+                    <a:srgbClr val="FFFFFF"/>
+                  </a:solidFill>
+                </a14:hiddenFill>
+              </a:ext>
+            </a:extLst>
+          </p:spPr>
+        </p:pic>
+        <p:pic>
+          <p:nvPicPr>
+            <p:cNvPr id="9" name="Picture 2" descr="http://imanweb.free.fr/rtfm/rtfm.jpg"/>
+            <p:cNvPicPr>
+              <a:picLocks noChangeAspect="1" noChangeArrowheads="1"/>
+            </p:cNvPicPr>
+            <p:nvPr/>
+          </p:nvPicPr>
+          <p:blipFill>
+            <a:blip r:embed="rId4" cstate="print">
+              <a:extLst>
+                <a:ext uri="{28A0092B-C50C-407E-A947-70E740481C1C}">
+                  <a14:useLocalDpi xmlns:a14="http://schemas.microsoft.com/office/drawing/2010/main" val="0"/>
+                </a:ext>
+              </a:extLst>
+            </a:blip>
+            <a:srcRect/>
+            <a:stretch>
+              <a:fillRect/>
+            </a:stretch>
+          </p:blipFill>
+          <p:spPr bwMode="auto">
+            <a:xfrm>
+              <a:off x="5464885" y="3600452"/>
+              <a:ext cx="2805990" cy="1009074"/>
+            </a:xfrm>
+            <a:prstGeom prst="rect">
+              <a:avLst/>
+            </a:prstGeom>
+            <a:noFill/>
+            <a:extLst>
+              <a:ext uri="{909E8E84-426E-40DD-AFC4-6F175D3DCCD1}">
+                <a14:hiddenFill xmlns:a14="http://schemas.microsoft.com/office/drawing/2010/main">
+                  <a:solidFill>
+                    <a:srgbClr val="FFFFFF"/>
+                  </a:solidFill>
+                </a14:hiddenFill>
+              </a:ext>
+            </a:extLst>
+          </p:spPr>
+        </p:pic>
+      </p:grpSp>
+    </p:spTree>
+    <p:extLst>
+      <p:ext uri="{BB962C8B-B14F-4D97-AF65-F5344CB8AC3E}">
+        <p14:creationId xmlns:p14="http://schemas.microsoft.com/office/powerpoint/2010/main" val="133995243"/>
+      </p:ext>
+    </p:extLst>
+  </p:cSld>
+  <p:clrMapOvr>
+    <a:masterClrMapping/>
+  </p:clrMapOvr>
+</p:sld>
+</file>
+
+<file path=ppt/slides/slide54.xml><?xml version="1.0" encoding="utf-8"?>
+<p:sld xmlns:a="http://schemas.openxmlformats.org/drawingml/2006/main" xmlns:r="http://schemas.openxmlformats.org/officeDocument/2006/relationships" xmlns:p="http://schemas.openxmlformats.org/presentationml/2006/main" show="0">
+  <p:cSld>
+    <p:spTree>
+      <p:nvGrpSpPr>
+        <p:cNvPr id="1" name=""/>
+        <p:cNvGrpSpPr/>
+        <p:nvPr/>
+      </p:nvGrpSpPr>
+      <p:grpSpPr>
+        <a:xfrm>
+          <a:off x="0" y="0"/>
+          <a:ext cx="0" cy="0"/>
+          <a:chOff x="0" y="0"/>
+          <a:chExt cx="0" cy="0"/>
+        </a:xfrm>
+      </p:grpSpPr>
+      <p:sp>
+        <p:nvSpPr>
+          <p:cNvPr id="4" name="Title 3"/>
+          <p:cNvSpPr>
+            <a:spLocks noGrp="1"/>
+          </p:cNvSpPr>
+          <p:nvPr>
+            <p:ph type="ctrTitle"/>
+          </p:nvPr>
+        </p:nvSpPr>
+        <p:spPr/>
+        <p:txBody>
+          <a:bodyPr/>
+          <a:lstStyle/>
+          <a:p>
+            <a:r>
+              <a:rPr lang="en-US" dirty="0"/>
+              <a:t>Booting the Raspberry Pi</a:t>
+            </a:r>
+          </a:p>
+        </p:txBody>
+      </p:sp>
+      <p:sp>
+        <p:nvSpPr>
+          <p:cNvPr id="5" name="Subtitle 4"/>
+          <p:cNvSpPr>
+            <a:spLocks noGrp="1"/>
+          </p:cNvSpPr>
+          <p:nvPr>
+            <p:ph type="subTitle" idx="1"/>
+          </p:nvPr>
+        </p:nvSpPr>
+        <p:spPr/>
+        <p:txBody>
+          <a:bodyPr/>
+          <a:lstStyle/>
+          <a:p>
+            <a:endParaRPr lang="en-US"/>
+          </a:p>
+        </p:txBody>
+      </p:sp>
+      <p:sp>
+        <p:nvSpPr>
+          <p:cNvPr id="6" name="Slide Number Placeholder 5"/>
+          <p:cNvSpPr>
+            <a:spLocks noGrp="1"/>
+          </p:cNvSpPr>
+          <p:nvPr>
+            <p:ph type="sldNum" sz="quarter" idx="12"/>
+          </p:nvPr>
+        </p:nvSpPr>
+        <p:spPr/>
+        <p:txBody>
+          <a:bodyPr/>
+          <a:lstStyle/>
+          <a:p>
+            <a:fld id="{52DB1A75-B9BE-46B1-B482-5F96E51FA4B2}" type="slidenum">
+              <a:rPr lang="en-US" smtClean="0"/>
+              <a:t>54</a:t>
+            </a:fld>
+            <a:endParaRPr lang="en-US"/>
+          </a:p>
+        </p:txBody>
+      </p:sp>
+    </p:spTree>
+    <p:extLst>
+      <p:ext uri="{BB962C8B-B14F-4D97-AF65-F5344CB8AC3E}">
+        <p14:creationId xmlns:p14="http://schemas.microsoft.com/office/powerpoint/2010/main" val="711743385"/>
+      </p:ext>
+    </p:extLst>
+  </p:cSld>
+  <p:clrMapOvr>
+    <a:masterClrMapping/>
+  </p:clrMapOvr>
+  <mc:AlternateContent xmlns:mc="http://schemas.openxmlformats.org/markup-compatibility/2006" xmlns:p14="http://schemas.microsoft.com/office/powerpoint/2010/main">
+    <mc:Choice Requires="p14">
+      <p:transition spd="slow" p14:dur="2000"/>
+    </mc:Choice>
+    <mc:Fallback xmlns="">
+      <p:transition spd="slow"/>
+    </mc:Fallback>
+  </mc:AlternateContent>
+</p:sld>
+</file>
+
+<file path=ppt/slides/slide55.xml><?xml version="1.0" encoding="utf-8"?>
+<p:sld xmlns:a="http://schemas.openxmlformats.org/drawingml/2006/main" xmlns:r="http://schemas.openxmlformats.org/officeDocument/2006/relationships" xmlns:p="http://schemas.openxmlformats.org/presentationml/2006/main" show="0">
+  <p:cSld>
+    <p:spTree>
+      <p:nvGrpSpPr>
+        <p:cNvPr id="1" name=""/>
+        <p:cNvGrpSpPr/>
+        <p:nvPr/>
+      </p:nvGrpSpPr>
+      <p:grpSpPr>
+        <a:xfrm>
+          <a:off x="0" y="0"/>
+          <a:ext cx="0" cy="0"/>
+          <a:chOff x="0" y="0"/>
+          <a:chExt cx="0" cy="0"/>
+        </a:xfrm>
+      </p:grpSpPr>
+      <p:sp>
+        <p:nvSpPr>
+          <p:cNvPr id="4" name="Title 3"/>
+          <p:cNvSpPr>
+            <a:spLocks noGrp="1"/>
+          </p:cNvSpPr>
+          <p:nvPr>
+            <p:ph type="title"/>
+          </p:nvPr>
+        </p:nvSpPr>
+        <p:spPr/>
+        <p:txBody>
+          <a:bodyPr/>
+          <a:lstStyle/>
+          <a:p>
+            <a:endParaRPr lang="en-US"/>
+          </a:p>
+        </p:txBody>
+      </p:sp>
+      <p:sp>
+        <p:nvSpPr>
+          <p:cNvPr id="5" name="Content Placeholder 4"/>
+          <p:cNvSpPr>
+            <a:spLocks noGrp="1"/>
+          </p:cNvSpPr>
+          <p:nvPr>
+            <p:ph idx="1"/>
+          </p:nvPr>
+        </p:nvSpPr>
+        <p:spPr/>
+        <p:txBody>
+          <a:bodyPr/>
+          <a:lstStyle/>
+          <a:p>
+            <a:r>
+              <a:rPr lang="en-US" dirty="0"/>
+              <a:t>When we are talking about embedded Linux we actually are talking about the same kernel code running on millions of other systems. There is no separate code base for embedded systems. When we however build a Linux system for an embedded target we do exclude features we won’t be using and we are also cross-compiling the kernel to binary code that can run on the target system.</a:t>
+            </a:r>
+          </a:p>
+        </p:txBody>
+      </p:sp>
+      <p:sp>
+        <p:nvSpPr>
+          <p:cNvPr id="6" name="Slide Number Placeholder 5"/>
+          <p:cNvSpPr>
+            <a:spLocks noGrp="1"/>
+          </p:cNvSpPr>
+          <p:nvPr>
+            <p:ph type="sldNum" sz="quarter" idx="12"/>
+          </p:nvPr>
+        </p:nvSpPr>
+        <p:spPr/>
+        <p:txBody>
+          <a:bodyPr/>
+          <a:lstStyle/>
+          <a:p>
+            <a:fld id="{52DB1A75-B9BE-46B1-B482-5F96E51FA4B2}" type="slidenum">
+              <a:rPr lang="en-US" smtClean="0"/>
+              <a:t>55</a:t>
+            </a:fld>
+            <a:endParaRPr lang="en-US"/>
+          </a:p>
+        </p:txBody>
+      </p:sp>
+    </p:spTree>
+    <p:extLst>
+      <p:ext uri="{BB962C8B-B14F-4D97-AF65-F5344CB8AC3E}">
+        <p14:creationId xmlns:p14="http://schemas.microsoft.com/office/powerpoint/2010/main" val="2255797779"/>
+      </p:ext>
+    </p:extLst>
+  </p:cSld>
+  <p:clrMapOvr>
+    <a:masterClrMapping/>
+  </p:clrMapOvr>
+  <mc:AlternateContent xmlns:mc="http://schemas.openxmlformats.org/markup-compatibility/2006" xmlns:p14="http://schemas.microsoft.com/office/powerpoint/2010/main">
+    <mc:Choice Requires="p14">
+      <p:transition spd="slow" p14:dur="2000"/>
+    </mc:Choice>
+    <mc:Fallback xmlns="">
+      <p:transition spd="slow"/>
+    </mc:Fallback>
+  </mc:AlternateContent>
+</p:sld>
+</file>
+
+<file path=ppt/slides/slide56.xml><?xml version="1.0" encoding="utf-8"?>
+<p:sld xmlns:a="http://schemas.openxmlformats.org/drawingml/2006/main" xmlns:r="http://schemas.openxmlformats.org/officeDocument/2006/relationships" xmlns:p="http://schemas.openxmlformats.org/presentationml/2006/main" show="0">
+  <p:cSld>
+    <p:spTree>
+      <p:nvGrpSpPr>
+        <p:cNvPr id="1" name=""/>
+        <p:cNvGrpSpPr/>
+        <p:nvPr/>
+      </p:nvGrpSpPr>
+      <p:grpSpPr>
+        <a:xfrm>
+          <a:off x="0" y="0"/>
+          <a:ext cx="0" cy="0"/>
+          <a:chOff x="0" y="0"/>
+          <a:chExt cx="0" cy="0"/>
+        </a:xfrm>
+      </p:grpSpPr>
+      <p:sp>
+        <p:nvSpPr>
+          <p:cNvPr id="2" name="Title 1"/>
+          <p:cNvSpPr>
+            <a:spLocks noGrp="1"/>
+          </p:cNvSpPr>
+          <p:nvPr>
+            <p:ph type="title"/>
+          </p:nvPr>
+        </p:nvSpPr>
+        <p:spPr/>
+        <p:txBody>
+          <a:bodyPr/>
+          <a:lstStyle/>
+          <a:p>
+            <a:r>
+              <a:rPr lang="en-US" dirty="0" smtClean="0"/>
+              <a:t>Setting up an Embedded System</a:t>
+            </a:r>
+            <a:endParaRPr lang="en-US" dirty="0"/>
+          </a:p>
+        </p:txBody>
+      </p:sp>
+      <p:sp>
+        <p:nvSpPr>
+          <p:cNvPr id="3" name="Content Placeholder 2"/>
+          <p:cNvSpPr>
+            <a:spLocks noGrp="1"/>
+          </p:cNvSpPr>
+          <p:nvPr>
+            <p:ph idx="1"/>
+          </p:nvPr>
+        </p:nvSpPr>
+        <p:spPr/>
+        <p:txBody>
+          <a:bodyPr/>
+          <a:lstStyle/>
+          <a:p>
+            <a:r>
+              <a:rPr lang="en-US" dirty="0"/>
+              <a:t>To </a:t>
+            </a:r>
+            <a:r>
+              <a:rPr lang="en-US" dirty="0" smtClean="0"/>
+              <a:t>setup an </a:t>
+            </a:r>
+            <a:r>
+              <a:rPr lang="en-US" dirty="0"/>
+              <a:t>embedded Linux system we have multiple choices:</a:t>
+            </a:r>
+          </a:p>
+          <a:p>
+            <a:pPr lvl="1"/>
+            <a:r>
+              <a:rPr lang="en-US" dirty="0"/>
+              <a:t>Use a </a:t>
+            </a:r>
+            <a:r>
+              <a:rPr lang="en-US" dirty="0">
+                <a:solidFill>
+                  <a:srgbClr val="00B050"/>
+                </a:solidFill>
+              </a:rPr>
+              <a:t>pre-built binary </a:t>
+            </a:r>
+            <a:r>
+              <a:rPr lang="en-US" dirty="0"/>
+              <a:t>distribution such as </a:t>
+            </a:r>
+            <a:r>
+              <a:rPr lang="en-US" dirty="0" err="1" smtClean="0"/>
+              <a:t>Raspbian</a:t>
+            </a:r>
+            <a:r>
+              <a:rPr lang="en-US" dirty="0" smtClean="0"/>
+              <a:t>, </a:t>
+            </a:r>
+            <a:r>
+              <a:rPr lang="en-US" dirty="0"/>
+              <a:t>Ubuntu or Fedora</a:t>
+            </a:r>
+          </a:p>
+          <a:p>
+            <a:pPr lvl="1"/>
+            <a:r>
+              <a:rPr lang="en-US" dirty="0">
+                <a:solidFill>
+                  <a:srgbClr val="00B050"/>
+                </a:solidFill>
+              </a:rPr>
+              <a:t>Quick </a:t>
+            </a:r>
+            <a:r>
+              <a:rPr lang="en-US" dirty="0"/>
+              <a:t>to set </a:t>
+            </a:r>
+            <a:r>
+              <a:rPr lang="en-US" dirty="0" smtClean="0"/>
+              <a:t>up, but </a:t>
+            </a:r>
+            <a:r>
+              <a:rPr lang="en-US" dirty="0" smtClean="0">
+                <a:solidFill>
+                  <a:srgbClr val="00B050"/>
+                </a:solidFill>
+              </a:rPr>
+              <a:t>not </a:t>
+            </a:r>
+            <a:r>
+              <a:rPr lang="en-US" dirty="0">
+                <a:solidFill>
+                  <a:srgbClr val="00B050"/>
+                </a:solidFill>
+              </a:rPr>
+              <a:t>very </a:t>
+            </a:r>
+            <a:r>
+              <a:rPr lang="en-US" dirty="0" smtClean="0">
+                <a:solidFill>
+                  <a:srgbClr val="00B050"/>
+                </a:solidFill>
+              </a:rPr>
+              <a:t>flexible</a:t>
+            </a:r>
+            <a:r>
+              <a:rPr lang="en-US" dirty="0" smtClean="0"/>
+              <a:t>: support </a:t>
+            </a:r>
+            <a:r>
+              <a:rPr lang="en-US" dirty="0"/>
+              <a:t>for only a few architectures, no flexibility on package configuration, no easy way to rebuild the entire system automatically.</a:t>
+            </a:r>
+          </a:p>
+          <a:p>
+            <a:endParaRPr lang="en-US" dirty="0"/>
+          </a:p>
+          <a:p>
+            <a:r>
+              <a:rPr lang="en-US" dirty="0">
+                <a:solidFill>
+                  <a:srgbClr val="00B050"/>
+                </a:solidFill>
+              </a:rPr>
+              <a:t>Build</a:t>
+            </a:r>
+            <a:r>
+              <a:rPr lang="en-US" dirty="0"/>
+              <a:t> all system components </a:t>
+            </a:r>
+            <a:r>
+              <a:rPr lang="en-US" dirty="0">
+                <a:solidFill>
+                  <a:srgbClr val="00B050"/>
+                </a:solidFill>
+              </a:rPr>
+              <a:t>manually</a:t>
+            </a:r>
+          </a:p>
+          <a:p>
+            <a:pPr lvl="1"/>
+            <a:r>
+              <a:rPr lang="en-US" dirty="0"/>
+              <a:t>Highly </a:t>
+            </a:r>
+            <a:r>
+              <a:rPr lang="en-US" dirty="0">
+                <a:solidFill>
+                  <a:srgbClr val="00B050"/>
+                </a:solidFill>
+              </a:rPr>
+              <a:t>flexible</a:t>
+            </a:r>
+            <a:r>
+              <a:rPr lang="en-US" dirty="0"/>
+              <a:t>, but </a:t>
+            </a:r>
+            <a:r>
+              <a:rPr lang="en-US" dirty="0">
+                <a:solidFill>
+                  <a:srgbClr val="00B050"/>
+                </a:solidFill>
+              </a:rPr>
+              <a:t>painful</a:t>
+            </a:r>
+            <a:r>
+              <a:rPr lang="en-US" dirty="0"/>
+              <a:t> and </a:t>
+            </a:r>
+            <a:r>
+              <a:rPr lang="en-US" dirty="0">
+                <a:solidFill>
+                  <a:srgbClr val="00B050"/>
+                </a:solidFill>
+              </a:rPr>
+              <a:t>inefficient</a:t>
+            </a:r>
+            <a:r>
+              <a:rPr lang="en-US" dirty="0"/>
+              <a:t>: need to handle complex cross-compilation issues, understand inter-package dependencies, not reproducible.</a:t>
+            </a:r>
+          </a:p>
+          <a:p>
+            <a:endParaRPr lang="en-US" dirty="0"/>
+          </a:p>
+          <a:p>
+            <a:r>
+              <a:rPr lang="en-US" dirty="0"/>
+              <a:t>Use an automated build system, that builds the entire system from source</a:t>
+            </a:r>
+          </a:p>
+          <a:p>
+            <a:pPr lvl="1"/>
+            <a:r>
+              <a:rPr lang="en-US" dirty="0">
+                <a:solidFill>
+                  <a:srgbClr val="00B050"/>
+                </a:solidFill>
+              </a:rPr>
+              <a:t>Automated</a:t>
+            </a:r>
+            <a:r>
+              <a:rPr lang="en-US" dirty="0"/>
+              <a:t>, </a:t>
+            </a:r>
+            <a:r>
+              <a:rPr lang="en-US" dirty="0">
+                <a:solidFill>
+                  <a:srgbClr val="00B050"/>
+                </a:solidFill>
+              </a:rPr>
+              <a:t>flexible</a:t>
+            </a:r>
+            <a:r>
+              <a:rPr lang="en-US" dirty="0"/>
+              <a:t>, handle most cross-compilation issues</a:t>
+            </a:r>
+          </a:p>
+          <a:p>
+            <a:pPr lvl="1"/>
+            <a:r>
+              <a:rPr lang="en-US" dirty="0"/>
+              <a:t>Examples: </a:t>
+            </a:r>
+            <a:r>
+              <a:rPr lang="en-US" dirty="0" err="1"/>
+              <a:t>Buildroot</a:t>
+            </a:r>
+            <a:r>
+              <a:rPr lang="en-US" dirty="0"/>
+              <a:t>, </a:t>
+            </a:r>
+            <a:r>
+              <a:rPr lang="en-US" dirty="0" err="1"/>
+              <a:t>OpenWRT</a:t>
+            </a:r>
+            <a:r>
+              <a:rPr lang="en-US" dirty="0"/>
+              <a:t>, </a:t>
+            </a:r>
+            <a:r>
+              <a:rPr lang="en-US" dirty="0" err="1"/>
+              <a:t>PTXdist</a:t>
+            </a:r>
+            <a:r>
+              <a:rPr lang="en-US" dirty="0"/>
+              <a:t>, </a:t>
+            </a:r>
+            <a:r>
+              <a:rPr lang="en-US" dirty="0" err="1"/>
+              <a:t>OpenBricks</a:t>
+            </a:r>
+            <a:r>
+              <a:rPr lang="en-US" dirty="0"/>
+              <a:t>, </a:t>
+            </a:r>
+            <a:r>
+              <a:rPr lang="en-US" dirty="0" err="1"/>
+              <a:t>OpenEmbedded</a:t>
+            </a:r>
+            <a:r>
+              <a:rPr lang="en-US" dirty="0"/>
+              <a:t>, </a:t>
+            </a:r>
+            <a:r>
+              <a:rPr lang="en-US" dirty="0" err="1"/>
+              <a:t>Yocto</a:t>
+            </a:r>
+            <a:r>
+              <a:rPr lang="en-US" dirty="0"/>
+              <a:t>, etc.</a:t>
+            </a:r>
+          </a:p>
+        </p:txBody>
+      </p:sp>
+      <p:sp>
+        <p:nvSpPr>
+          <p:cNvPr id="4" name="Slide Number Placeholder 3"/>
+          <p:cNvSpPr>
+            <a:spLocks noGrp="1"/>
+          </p:cNvSpPr>
+          <p:nvPr>
+            <p:ph type="sldNum" sz="quarter" idx="12"/>
+          </p:nvPr>
+        </p:nvSpPr>
+        <p:spPr/>
+        <p:txBody>
+          <a:bodyPr/>
+          <a:lstStyle/>
+          <a:p>
+            <a:fld id="{52DB1A75-B9BE-46B1-B482-5F96E51FA4B2}" type="slidenum">
+              <a:rPr lang="en-US" smtClean="0"/>
+              <a:t>56</a:t>
+            </a:fld>
+            <a:endParaRPr lang="en-US"/>
+          </a:p>
+        </p:txBody>
+      </p:sp>
+    </p:spTree>
+    <p:extLst>
+      <p:ext uri="{BB962C8B-B14F-4D97-AF65-F5344CB8AC3E}">
+        <p14:creationId xmlns:p14="http://schemas.microsoft.com/office/powerpoint/2010/main" val="2188926740"/>
+      </p:ext>
+    </p:extLst>
+  </p:cSld>
+  <p:clrMapOvr>
+    <a:masterClrMapping/>
+  </p:clrMapOvr>
+  <mc:AlternateContent xmlns:mc="http://schemas.openxmlformats.org/markup-compatibility/2006" xmlns:p14="http://schemas.microsoft.com/office/powerpoint/2010/main">
+    <mc:Choice Requires="p14">
+      <p:transition spd="slow" p14:dur="2000"/>
+    </mc:Choice>
+    <mc:Fallback xmlns="">
+      <p:transition spd="slow"/>
+    </mc:Fallback>
+  </mc:AlternateContent>
 </p:sld>
 </file>
 

</xml_diff>

<commit_message>
Fix small typo in slide 8 and 9
</commit_message>
<xml_diff>
--- a/slides/introduction_to_linux.pptx
+++ b/slides/introduction_to_linux.pptx
@@ -5,7 +5,7 @@
     <p:sldMasterId id="2147483660" r:id="rId1"/>
   </p:sldMasterIdLst>
   <p:notesMasterIdLst>
-    <p:notesMasterId r:id="rId58"/>
+    <p:notesMasterId r:id="rId55"/>
   </p:notesMasterIdLst>
   <p:sldIdLst>
     <p:sldId id="256" r:id="rId2"/>
@@ -61,9 +61,6 @@
     <p:sldId id="350" r:id="rId52"/>
     <p:sldId id="351" r:id="rId53"/>
     <p:sldId id="352" r:id="rId54"/>
-    <p:sldId id="300" r:id="rId55"/>
-    <p:sldId id="304" r:id="rId56"/>
-    <p:sldId id="299" r:id="rId57"/>
   </p:sldIdLst>
   <p:sldSz cx="9144000" cy="6858000" type="screen4x3"/>
   <p:notesSz cx="7099300" cy="10234613"/>
@@ -252,7 +249,7 @@
           <a:p>
             <a:fld id="{7C42333B-93F9-44BD-828D-D8CC89BB8051}" type="datetimeFigureOut">
               <a:rPr lang="en-US" smtClean="0"/>
-              <a:t>9/25/2015</a:t>
+              <a:t>9/27/2015</a:t>
             </a:fld>
             <a:endParaRPr lang="en-US"/>
           </a:p>
@@ -913,7 +910,7 @@
           <a:p>
             <a:fld id="{7FDBF51A-AD7B-48B9-BD6C-0DEFB4E1088B}" type="datetime1">
               <a:rPr lang="en-US" smtClean="0"/>
-              <a:t>9/25/2015</a:t>
+              <a:t>9/27/2015</a:t>
             </a:fld>
             <a:endParaRPr lang="en-US"/>
           </a:p>
@@ -1052,7 +1049,7 @@
           <a:p>
             <a:fld id="{0D5F0973-A24E-4E51-AC53-0AF2185C47AF}" type="datetime1">
               <a:rPr lang="en-US" smtClean="0"/>
-              <a:t>9/25/2015</a:t>
+              <a:t>9/27/2015</a:t>
             </a:fld>
             <a:endParaRPr lang="en-US"/>
           </a:p>
@@ -1168,7 +1165,7 @@
           <a:p>
             <a:fld id="{C3A9A478-9E2E-4842-9E1D-95C5E13356D8}" type="datetime1">
               <a:rPr lang="en-US" smtClean="0"/>
-              <a:t>9/25/2015</a:t>
+              <a:t>9/27/2015</a:t>
             </a:fld>
             <a:endParaRPr lang="en-US"/>
           </a:p>
@@ -1466,7 +1463,7 @@
           <a:p>
             <a:fld id="{D248CA02-C1C1-4368-BDD9-8AD0D4FB83DE}" type="datetime1">
               <a:rPr lang="en-US" smtClean="0"/>
-              <a:t>9/25/2015</a:t>
+              <a:t>9/27/2015</a:t>
             </a:fld>
             <a:endParaRPr lang="en-US"/>
           </a:p>
@@ -1744,7 +1741,7 @@
           <a:p>
             <a:fld id="{C6ED301A-2145-43E1-863D-C0977C11DAC4}" type="datetime1">
               <a:rPr lang="en-US" smtClean="0"/>
-              <a:t>9/25/2015</a:t>
+              <a:t>9/27/2015</a:t>
             </a:fld>
             <a:endParaRPr lang="en-US"/>
           </a:p>
@@ -1935,7 +1932,7 @@
           <a:p>
             <a:fld id="{CEECE4E9-A09C-4A3A-872A-60197681C0E8}" type="datetime1">
               <a:rPr lang="en-US" smtClean="0"/>
-              <a:t>9/25/2015</a:t>
+              <a:t>9/27/2015</a:t>
             </a:fld>
             <a:endParaRPr lang="en-US"/>
           </a:p>
@@ -2136,7 +2133,7 @@
           <a:p>
             <a:fld id="{6E9A05D7-B596-47AE-9553-3890A22995BF}" type="datetime1">
               <a:rPr lang="en-US" smtClean="0"/>
-              <a:t>9/25/2015</a:t>
+              <a:t>9/27/2015</a:t>
             </a:fld>
             <a:endParaRPr lang="en-US"/>
           </a:p>
@@ -2399,7 +2396,7 @@
           <a:p>
             <a:fld id="{625ADD71-1C5F-4F7E-8D78-15C68348C390}" type="datetime1">
               <a:rPr lang="en-US" smtClean="0"/>
-              <a:t>9/25/2015</a:t>
+              <a:t>9/27/2015</a:t>
             </a:fld>
             <a:endParaRPr lang="en-US"/>
           </a:p>
@@ -2590,7 +2587,7 @@
           <a:p>
             <a:fld id="{0B328EE6-6A9B-40B0-A5EF-990F53AEF9DA}" type="datetime1">
               <a:rPr lang="en-US" smtClean="0"/>
-              <a:t>9/25/2015</a:t>
+              <a:t>9/27/2015</a:t>
             </a:fld>
             <a:endParaRPr lang="en-US"/>
           </a:p>
@@ -2786,7 +2783,7 @@
           <a:p>
             <a:fld id="{B4AFEB28-E49B-464B-9FE0-FB4552046618}" type="datetime1">
               <a:rPr lang="en-US" smtClean="0"/>
-              <a:t>9/25/2015</a:t>
+              <a:t>9/27/2015</a:t>
             </a:fld>
             <a:endParaRPr lang="en-US"/>
           </a:p>
@@ -2985,7 +2982,7 @@
           <a:p>
             <a:fld id="{F605F17B-680A-48C5-ADAF-14CE0D16BB75}" type="datetime1">
               <a:rPr lang="en-US" smtClean="0"/>
-              <a:t>9/25/2015</a:t>
+              <a:t>9/27/2015</a:t>
             </a:fld>
             <a:endParaRPr lang="en-US"/>
           </a:p>
@@ -3176,7 +3173,7 @@
           <a:p>
             <a:fld id="{E754C7F4-4B95-4CDF-B24E-B5EE227E4593}" type="datetime1">
               <a:rPr lang="en-US" smtClean="0"/>
-              <a:t>9/25/2015</a:t>
+              <a:t>9/27/2015</a:t>
             </a:fld>
             <a:endParaRPr lang="en-US"/>
           </a:p>
@@ -3443,7 +3440,7 @@
           <a:p>
             <a:fld id="{522D90DD-3F1D-4333-B251-10030ABE1E45}" type="datetime1">
               <a:rPr lang="en-US" smtClean="0"/>
-              <a:t>9/25/2015</a:t>
+              <a:t>9/27/2015</a:t>
             </a:fld>
             <a:endParaRPr lang="en-US"/>
           </a:p>
@@ -3752,7 +3749,7 @@
           <a:p>
             <a:fld id="{0371234B-895E-41E6-ADE7-FEE13FC2EF30}" type="datetime1">
               <a:rPr lang="en-US" smtClean="0"/>
-              <a:t>9/25/2015</a:t>
+              <a:t>9/27/2015</a:t>
             </a:fld>
             <a:endParaRPr lang="en-US"/>
           </a:p>
@@ -4195,7 +4192,7 @@
           <a:p>
             <a:fld id="{CAE48979-8F5D-4C7E-B73F-F6B6BB499E94}" type="datetime1">
               <a:rPr lang="en-US" smtClean="0"/>
-              <a:t>9/25/2015</a:t>
+              <a:t>9/27/2015</a:t>
             </a:fld>
             <a:endParaRPr lang="en-US"/>
           </a:p>
@@ -4452,7 +4449,7 @@
           <a:p>
             <a:fld id="{C63F0295-AD35-4898-97C4-7954EC9DDE31}" type="datetime1">
               <a:rPr lang="en-US" smtClean="0"/>
-              <a:t>9/25/2015</a:t>
+              <a:t>9/27/2015</a:t>
             </a:fld>
             <a:endParaRPr lang="en-US"/>
           </a:p>
@@ -21278,565 +21275,6 @@
 </p:sld>
 </file>
 
-<file path=ppt/slides/slide54.xml><?xml version="1.0" encoding="utf-8"?>
-<p:sld xmlns:a="http://schemas.openxmlformats.org/drawingml/2006/main" xmlns:r="http://schemas.openxmlformats.org/officeDocument/2006/relationships" xmlns:p="http://schemas.openxmlformats.org/presentationml/2006/main" show="0">
-  <p:cSld>
-    <p:spTree>
-      <p:nvGrpSpPr>
-        <p:cNvPr id="1" name=""/>
-        <p:cNvGrpSpPr/>
-        <p:nvPr/>
-      </p:nvGrpSpPr>
-      <p:grpSpPr>
-        <a:xfrm>
-          <a:off x="0" y="0"/>
-          <a:ext cx="0" cy="0"/>
-          <a:chOff x="0" y="0"/>
-          <a:chExt cx="0" cy="0"/>
-        </a:xfrm>
-      </p:grpSpPr>
-      <p:sp>
-        <p:nvSpPr>
-          <p:cNvPr id="4" name="Title 3"/>
-          <p:cNvSpPr>
-            <a:spLocks noGrp="1"/>
-          </p:cNvSpPr>
-          <p:nvPr>
-            <p:ph type="ctrTitle"/>
-          </p:nvPr>
-        </p:nvSpPr>
-        <p:spPr/>
-        <p:txBody>
-          <a:bodyPr/>
-          <a:lstStyle/>
-          <a:p>
-            <a:r>
-              <a:rPr lang="en-US" dirty="0"/>
-              <a:t>Booting the Raspberry Pi</a:t>
-            </a:r>
-          </a:p>
-        </p:txBody>
-      </p:sp>
-      <p:sp>
-        <p:nvSpPr>
-          <p:cNvPr id="5" name="Subtitle 4"/>
-          <p:cNvSpPr>
-            <a:spLocks noGrp="1"/>
-          </p:cNvSpPr>
-          <p:nvPr>
-            <p:ph type="subTitle" idx="1"/>
-          </p:nvPr>
-        </p:nvSpPr>
-        <p:spPr/>
-        <p:txBody>
-          <a:bodyPr/>
-          <a:lstStyle/>
-          <a:p>
-            <a:endParaRPr lang="en-US"/>
-          </a:p>
-        </p:txBody>
-      </p:sp>
-      <p:sp>
-        <p:nvSpPr>
-          <p:cNvPr id="6" name="Slide Number Placeholder 5"/>
-          <p:cNvSpPr>
-            <a:spLocks noGrp="1"/>
-          </p:cNvSpPr>
-          <p:nvPr>
-            <p:ph type="sldNum" sz="quarter" idx="12"/>
-          </p:nvPr>
-        </p:nvSpPr>
-        <p:spPr/>
-        <p:txBody>
-          <a:bodyPr/>
-          <a:lstStyle/>
-          <a:p>
-            <a:fld id="{52DB1A75-B9BE-46B1-B482-5F96E51FA4B2}" type="slidenum">
-              <a:rPr lang="en-US" smtClean="0"/>
-              <a:t>54</a:t>
-            </a:fld>
-            <a:endParaRPr lang="en-US"/>
-          </a:p>
-        </p:txBody>
-      </p:sp>
-    </p:spTree>
-    <p:extLst>
-      <p:ext uri="{BB962C8B-B14F-4D97-AF65-F5344CB8AC3E}">
-        <p14:creationId xmlns:p14="http://schemas.microsoft.com/office/powerpoint/2010/main" val="711743385"/>
-      </p:ext>
-    </p:extLst>
-  </p:cSld>
-  <p:clrMapOvr>
-    <a:masterClrMapping/>
-  </p:clrMapOvr>
-  <mc:AlternateContent xmlns:mc="http://schemas.openxmlformats.org/markup-compatibility/2006" xmlns:p14="http://schemas.microsoft.com/office/powerpoint/2010/main">
-    <mc:Choice Requires="p14">
-      <p:transition spd="slow" p14:dur="2000"/>
-    </mc:Choice>
-    <mc:Fallback xmlns="">
-      <p:transition spd="slow"/>
-    </mc:Fallback>
-  </mc:AlternateContent>
-</p:sld>
-</file>
-
-<file path=ppt/slides/slide55.xml><?xml version="1.0" encoding="utf-8"?>
-<p:sld xmlns:a="http://schemas.openxmlformats.org/drawingml/2006/main" xmlns:r="http://schemas.openxmlformats.org/officeDocument/2006/relationships" xmlns:p="http://schemas.openxmlformats.org/presentationml/2006/main" show="0">
-  <p:cSld>
-    <p:spTree>
-      <p:nvGrpSpPr>
-        <p:cNvPr id="1" name=""/>
-        <p:cNvGrpSpPr/>
-        <p:nvPr/>
-      </p:nvGrpSpPr>
-      <p:grpSpPr>
-        <a:xfrm>
-          <a:off x="0" y="0"/>
-          <a:ext cx="0" cy="0"/>
-          <a:chOff x="0" y="0"/>
-          <a:chExt cx="0" cy="0"/>
-        </a:xfrm>
-      </p:grpSpPr>
-      <p:sp>
-        <p:nvSpPr>
-          <p:cNvPr id="4" name="Title 3"/>
-          <p:cNvSpPr>
-            <a:spLocks noGrp="1"/>
-          </p:cNvSpPr>
-          <p:nvPr>
-            <p:ph type="title"/>
-          </p:nvPr>
-        </p:nvSpPr>
-        <p:spPr/>
-        <p:txBody>
-          <a:bodyPr/>
-          <a:lstStyle/>
-          <a:p>
-            <a:endParaRPr lang="en-US"/>
-          </a:p>
-        </p:txBody>
-      </p:sp>
-      <p:sp>
-        <p:nvSpPr>
-          <p:cNvPr id="5" name="Content Placeholder 4"/>
-          <p:cNvSpPr>
-            <a:spLocks noGrp="1"/>
-          </p:cNvSpPr>
-          <p:nvPr>
-            <p:ph idx="1"/>
-          </p:nvPr>
-        </p:nvSpPr>
-        <p:spPr/>
-        <p:txBody>
-          <a:bodyPr/>
-          <a:lstStyle/>
-          <a:p>
-            <a:r>
-              <a:rPr lang="en-US" dirty="0"/>
-              <a:t>When we are talking about embedded Linux we actually are talking about the same kernel code running on millions of other systems. There is no separate code base for embedded systems. When we however build a Linux system for an embedded target we do exclude features we won’t be using and we are also cross-compiling the kernel to binary code that can run on the target system.</a:t>
-            </a:r>
-          </a:p>
-        </p:txBody>
-      </p:sp>
-      <p:sp>
-        <p:nvSpPr>
-          <p:cNvPr id="6" name="Slide Number Placeholder 5"/>
-          <p:cNvSpPr>
-            <a:spLocks noGrp="1"/>
-          </p:cNvSpPr>
-          <p:nvPr>
-            <p:ph type="sldNum" sz="quarter" idx="12"/>
-          </p:nvPr>
-        </p:nvSpPr>
-        <p:spPr/>
-        <p:txBody>
-          <a:bodyPr/>
-          <a:lstStyle/>
-          <a:p>
-            <a:fld id="{52DB1A75-B9BE-46B1-B482-5F96E51FA4B2}" type="slidenum">
-              <a:rPr lang="en-US" smtClean="0"/>
-              <a:t>55</a:t>
-            </a:fld>
-            <a:endParaRPr lang="en-US"/>
-          </a:p>
-        </p:txBody>
-      </p:sp>
-    </p:spTree>
-    <p:extLst>
-      <p:ext uri="{BB962C8B-B14F-4D97-AF65-F5344CB8AC3E}">
-        <p14:creationId xmlns:p14="http://schemas.microsoft.com/office/powerpoint/2010/main" val="2255797779"/>
-      </p:ext>
-    </p:extLst>
-  </p:cSld>
-  <p:clrMapOvr>
-    <a:masterClrMapping/>
-  </p:clrMapOvr>
-  <mc:AlternateContent xmlns:mc="http://schemas.openxmlformats.org/markup-compatibility/2006" xmlns:p14="http://schemas.microsoft.com/office/powerpoint/2010/main">
-    <mc:Choice Requires="p14">
-      <p:transition spd="slow" p14:dur="2000"/>
-    </mc:Choice>
-    <mc:Fallback xmlns="">
-      <p:transition spd="slow"/>
-    </mc:Fallback>
-  </mc:AlternateContent>
-</p:sld>
-</file>
-
-<file path=ppt/slides/slide56.xml><?xml version="1.0" encoding="utf-8"?>
-<p:sld xmlns:a="http://schemas.openxmlformats.org/drawingml/2006/main" xmlns:r="http://schemas.openxmlformats.org/officeDocument/2006/relationships" xmlns:p="http://schemas.openxmlformats.org/presentationml/2006/main" show="0">
-  <p:cSld>
-    <p:spTree>
-      <p:nvGrpSpPr>
-        <p:cNvPr id="1" name=""/>
-        <p:cNvGrpSpPr/>
-        <p:nvPr/>
-      </p:nvGrpSpPr>
-      <p:grpSpPr>
-        <a:xfrm>
-          <a:off x="0" y="0"/>
-          <a:ext cx="0" cy="0"/>
-          <a:chOff x="0" y="0"/>
-          <a:chExt cx="0" cy="0"/>
-        </a:xfrm>
-      </p:grpSpPr>
-      <p:sp>
-        <p:nvSpPr>
-          <p:cNvPr id="2" name="Title 1"/>
-          <p:cNvSpPr>
-            <a:spLocks noGrp="1"/>
-          </p:cNvSpPr>
-          <p:nvPr>
-            <p:ph type="title"/>
-          </p:nvPr>
-        </p:nvSpPr>
-        <p:spPr/>
-        <p:txBody>
-          <a:bodyPr/>
-          <a:lstStyle/>
-          <a:p>
-            <a:r>
-              <a:rPr lang="en-US" dirty="0" smtClean="0"/>
-              <a:t>Setting up an Embedded System</a:t>
-            </a:r>
-            <a:endParaRPr lang="en-US" dirty="0"/>
-          </a:p>
-        </p:txBody>
-      </p:sp>
-      <p:sp>
-        <p:nvSpPr>
-          <p:cNvPr id="3" name="Content Placeholder 2"/>
-          <p:cNvSpPr>
-            <a:spLocks noGrp="1"/>
-          </p:cNvSpPr>
-          <p:nvPr>
-            <p:ph idx="1"/>
-          </p:nvPr>
-        </p:nvSpPr>
-        <p:spPr/>
-        <p:txBody>
-          <a:bodyPr/>
-          <a:lstStyle/>
-          <a:p>
-            <a:r>
-              <a:rPr lang="en-US" dirty="0"/>
-              <a:t>To </a:t>
-            </a:r>
-            <a:r>
-              <a:rPr lang="en-US" dirty="0" smtClean="0"/>
-              <a:t>setup an </a:t>
-            </a:r>
-            <a:r>
-              <a:rPr lang="en-US" dirty="0"/>
-              <a:t>embedded Linux system we have multiple choices:</a:t>
-            </a:r>
-          </a:p>
-          <a:p>
-            <a:pPr lvl="1"/>
-            <a:r>
-              <a:rPr lang="en-US" dirty="0"/>
-              <a:t>Use a </a:t>
-            </a:r>
-            <a:r>
-              <a:rPr lang="en-US" dirty="0">
-                <a:solidFill>
-                  <a:srgbClr val="00B050"/>
-                </a:solidFill>
-              </a:rPr>
-              <a:t>pre-built binary </a:t>
-            </a:r>
-            <a:r>
-              <a:rPr lang="en-US" dirty="0"/>
-              <a:t>distribution such as </a:t>
-            </a:r>
-            <a:r>
-              <a:rPr lang="en-US" dirty="0" err="1" smtClean="0"/>
-              <a:t>Raspbian</a:t>
-            </a:r>
-            <a:r>
-              <a:rPr lang="en-US" dirty="0" smtClean="0"/>
-              <a:t>, </a:t>
-            </a:r>
-            <a:r>
-              <a:rPr lang="en-US" dirty="0"/>
-              <a:t>Ubuntu or Fedora</a:t>
-            </a:r>
-          </a:p>
-          <a:p>
-            <a:pPr lvl="1"/>
-            <a:r>
-              <a:rPr lang="en-US" dirty="0">
-                <a:solidFill>
-                  <a:srgbClr val="00B050"/>
-                </a:solidFill>
-              </a:rPr>
-              <a:t>Quick </a:t>
-            </a:r>
-            <a:r>
-              <a:rPr lang="en-US" dirty="0"/>
-              <a:t>to set </a:t>
-            </a:r>
-            <a:r>
-              <a:rPr lang="en-US" dirty="0" smtClean="0"/>
-              <a:t>up, but </a:t>
-            </a:r>
-            <a:r>
-              <a:rPr lang="en-US" dirty="0" smtClean="0">
-                <a:solidFill>
-                  <a:srgbClr val="00B050"/>
-                </a:solidFill>
-              </a:rPr>
-              <a:t>not </a:t>
-            </a:r>
-            <a:r>
-              <a:rPr lang="en-US" dirty="0">
-                <a:solidFill>
-                  <a:srgbClr val="00B050"/>
-                </a:solidFill>
-              </a:rPr>
-              <a:t>very </a:t>
-            </a:r>
-            <a:r>
-              <a:rPr lang="en-US" dirty="0" smtClean="0">
-                <a:solidFill>
-                  <a:srgbClr val="00B050"/>
-                </a:solidFill>
-              </a:rPr>
-              <a:t>flexible</a:t>
-            </a:r>
-            <a:r>
-              <a:rPr lang="en-US" dirty="0" smtClean="0"/>
-              <a:t>: support </a:t>
-            </a:r>
-            <a:r>
-              <a:rPr lang="en-US" dirty="0"/>
-              <a:t>for only a few architectures, no flexibility on package configuration, no easy way to rebuild the entire system automatically.</a:t>
-            </a:r>
-          </a:p>
-          <a:p>
-            <a:endParaRPr lang="en-US" dirty="0"/>
-          </a:p>
-          <a:p>
-            <a:r>
-              <a:rPr lang="en-US" dirty="0">
-                <a:solidFill>
-                  <a:srgbClr val="00B050"/>
-                </a:solidFill>
-              </a:rPr>
-              <a:t>Build</a:t>
-            </a:r>
-            <a:r>
-              <a:rPr lang="en-US" dirty="0"/>
-              <a:t> all system components </a:t>
-            </a:r>
-            <a:r>
-              <a:rPr lang="en-US" dirty="0">
-                <a:solidFill>
-                  <a:srgbClr val="00B050"/>
-                </a:solidFill>
-              </a:rPr>
-              <a:t>manually</a:t>
-            </a:r>
-          </a:p>
-          <a:p>
-            <a:pPr lvl="1"/>
-            <a:r>
-              <a:rPr lang="en-US" dirty="0"/>
-              <a:t>Highly </a:t>
-            </a:r>
-            <a:r>
-              <a:rPr lang="en-US" dirty="0">
-                <a:solidFill>
-                  <a:srgbClr val="00B050"/>
-                </a:solidFill>
-              </a:rPr>
-              <a:t>flexible</a:t>
-            </a:r>
-            <a:r>
-              <a:rPr lang="en-US" dirty="0"/>
-              <a:t>, but </a:t>
-            </a:r>
-            <a:r>
-              <a:rPr lang="en-US" dirty="0">
-                <a:solidFill>
-                  <a:srgbClr val="00B050"/>
-                </a:solidFill>
-              </a:rPr>
-              <a:t>painful</a:t>
-            </a:r>
-            <a:r>
-              <a:rPr lang="en-US" dirty="0"/>
-              <a:t> and </a:t>
-            </a:r>
-            <a:r>
-              <a:rPr lang="en-US" dirty="0">
-                <a:solidFill>
-                  <a:srgbClr val="00B050"/>
-                </a:solidFill>
-              </a:rPr>
-              <a:t>inefficient</a:t>
-            </a:r>
-            <a:r>
-              <a:rPr lang="en-US" dirty="0"/>
-              <a:t>: need to handle complex cross-compilation issues, understand inter-package dependencies, not reproducible.</a:t>
-            </a:r>
-          </a:p>
-          <a:p>
-            <a:endParaRPr lang="en-US" dirty="0"/>
-          </a:p>
-          <a:p>
-            <a:r>
-              <a:rPr lang="en-US" dirty="0"/>
-              <a:t>Use an automated build system, that builds the entire system from source</a:t>
-            </a:r>
-          </a:p>
-          <a:p>
-            <a:pPr lvl="1"/>
-            <a:r>
-              <a:rPr lang="en-US" dirty="0">
-                <a:solidFill>
-                  <a:srgbClr val="00B050"/>
-                </a:solidFill>
-              </a:rPr>
-              <a:t>Automated</a:t>
-            </a:r>
-            <a:r>
-              <a:rPr lang="en-US" dirty="0"/>
-              <a:t>, </a:t>
-            </a:r>
-            <a:r>
-              <a:rPr lang="en-US" dirty="0">
-                <a:solidFill>
-                  <a:srgbClr val="00B050"/>
-                </a:solidFill>
-              </a:rPr>
-              <a:t>flexible</a:t>
-            </a:r>
-            <a:r>
-              <a:rPr lang="en-US" dirty="0"/>
-              <a:t>, handle most cross-compilation issues</a:t>
-            </a:r>
-          </a:p>
-          <a:p>
-            <a:pPr lvl="1"/>
-            <a:r>
-              <a:rPr lang="en-US" dirty="0"/>
-              <a:t>Examples: </a:t>
-            </a:r>
-            <a:r>
-              <a:rPr lang="en-US" dirty="0" err="1"/>
-              <a:t>Buildroot</a:t>
-            </a:r>
-            <a:r>
-              <a:rPr lang="en-US" dirty="0"/>
-              <a:t>, </a:t>
-            </a:r>
-            <a:r>
-              <a:rPr lang="en-US" dirty="0" err="1"/>
-              <a:t>OpenWRT</a:t>
-            </a:r>
-            <a:r>
-              <a:rPr lang="en-US" dirty="0"/>
-              <a:t>, </a:t>
-            </a:r>
-            <a:r>
-              <a:rPr lang="en-US" dirty="0" err="1"/>
-              <a:t>PTXdist</a:t>
-            </a:r>
-            <a:r>
-              <a:rPr lang="en-US" dirty="0"/>
-              <a:t>, </a:t>
-            </a:r>
-            <a:r>
-              <a:rPr lang="en-US" dirty="0" err="1"/>
-              <a:t>OpenBricks</a:t>
-            </a:r>
-            <a:r>
-              <a:rPr lang="en-US" dirty="0"/>
-              <a:t>, </a:t>
-            </a:r>
-            <a:r>
-              <a:rPr lang="en-US" dirty="0" err="1"/>
-              <a:t>OpenEmbedded</a:t>
-            </a:r>
-            <a:r>
-              <a:rPr lang="en-US" dirty="0"/>
-              <a:t>, </a:t>
-            </a:r>
-            <a:r>
-              <a:rPr lang="en-US" dirty="0" err="1"/>
-              <a:t>Yocto</a:t>
-            </a:r>
-            <a:r>
-              <a:rPr lang="en-US" dirty="0"/>
-              <a:t>, etc.</a:t>
-            </a:r>
-          </a:p>
-        </p:txBody>
-      </p:sp>
-      <p:sp>
-        <p:nvSpPr>
-          <p:cNvPr id="4" name="Slide Number Placeholder 3"/>
-          <p:cNvSpPr>
-            <a:spLocks noGrp="1"/>
-          </p:cNvSpPr>
-          <p:nvPr>
-            <p:ph type="sldNum" sz="quarter" idx="12"/>
-          </p:nvPr>
-        </p:nvSpPr>
-        <p:spPr/>
-        <p:txBody>
-          <a:bodyPr/>
-          <a:lstStyle/>
-          <a:p>
-            <a:fld id="{52DB1A75-B9BE-46B1-B482-5F96E51FA4B2}" type="slidenum">
-              <a:rPr lang="en-US" smtClean="0"/>
-              <a:t>56</a:t>
-            </a:fld>
-            <a:endParaRPr lang="en-US"/>
-          </a:p>
-        </p:txBody>
-      </p:sp>
-    </p:spTree>
-    <p:extLst>
-      <p:ext uri="{BB962C8B-B14F-4D97-AF65-F5344CB8AC3E}">
-        <p14:creationId xmlns:p14="http://schemas.microsoft.com/office/powerpoint/2010/main" val="2188926740"/>
-      </p:ext>
-    </p:extLst>
-  </p:cSld>
-  <p:clrMapOvr>
-    <a:masterClrMapping/>
-  </p:clrMapOvr>
-  <mc:AlternateContent xmlns:mc="http://schemas.openxmlformats.org/markup-compatibility/2006" xmlns:p14="http://schemas.microsoft.com/office/powerpoint/2010/main">
-    <mc:Choice Requires="p14">
-      <p:transition spd="slow" p14:dur="2000"/>
-    </mc:Choice>
-    <mc:Fallback xmlns="">
-      <p:transition spd="slow"/>
-    </mc:Fallback>
-  </mc:AlternateContent>
-</p:sld>
-</file>
-
 <file path=ppt/slides/slide6.xml><?xml version="1.0" encoding="utf-8"?>
 <p:sld xmlns:a="http://schemas.openxmlformats.org/drawingml/2006/main" xmlns:r="http://schemas.openxmlformats.org/officeDocument/2006/relationships" xmlns:p="http://schemas.openxmlformats.org/presentationml/2006/main">
   <p:cSld>
@@ -22771,7 +22209,7 @@
               <a:pPr algn="ctr"/>
               <a:r>
                 <a:rPr lang="en-US" dirty="0" smtClean="0"/>
-                <a:t>Desktop PC</a:t>
+                <a:t>Server</a:t>
               </a:r>
               <a:endParaRPr lang="en-US" dirty="0"/>
             </a:p>
@@ -23104,9 +22542,32 @@
           </a:p>
         </p:txBody>
       </p:sp>
+      <p:sp>
+        <p:nvSpPr>
+          <p:cNvPr id="20" name="Slide Number Placeholder 19"/>
+          <p:cNvSpPr>
+            <a:spLocks noGrp="1"/>
+          </p:cNvSpPr>
+          <p:nvPr>
+            <p:ph type="sldNum" sz="quarter" idx="12"/>
+          </p:nvPr>
+        </p:nvSpPr>
+        <p:spPr/>
+        <p:txBody>
+          <a:bodyPr/>
+          <a:lstStyle/>
+          <a:p>
+            <a:fld id="{52DB1A75-B9BE-46B1-B482-5F96E51FA4B2}" type="slidenum">
+              <a:rPr lang="en-US" smtClean="0"/>
+              <a:t>9</a:t>
+            </a:fld>
+            <a:endParaRPr lang="en-US"/>
+          </a:p>
+        </p:txBody>
+      </p:sp>
       <p:pic>
         <p:nvPicPr>
-          <p:cNvPr id="19" name="Picture 18"/>
+          <p:cNvPr id="4" name="Picture 3"/>
           <p:cNvPicPr>
             <a:picLocks noChangeAspect="1"/>
           </p:cNvPicPr>
@@ -23120,37 +22581,14 @@
         </p:blipFill>
         <p:spPr>
           <a:xfrm>
-            <a:off x="2543633" y="3894932"/>
-            <a:ext cx="3976039" cy="2576170"/>
+            <a:off x="2660189" y="3730121"/>
+            <a:ext cx="3979801" cy="2578608"/>
           </a:xfrm>
           <a:prstGeom prst="rect">
             <a:avLst/>
           </a:prstGeom>
         </p:spPr>
       </p:pic>
-      <p:sp>
-        <p:nvSpPr>
-          <p:cNvPr id="20" name="Slide Number Placeholder 19"/>
-          <p:cNvSpPr>
-            <a:spLocks noGrp="1"/>
-          </p:cNvSpPr>
-          <p:nvPr>
-            <p:ph type="sldNum" sz="quarter" idx="12"/>
-          </p:nvPr>
-        </p:nvSpPr>
-        <p:spPr/>
-        <p:txBody>
-          <a:bodyPr/>
-          <a:lstStyle/>
-          <a:p>
-            <a:fld id="{52DB1A75-B9BE-46B1-B482-5F96E51FA4B2}" type="slidenum">
-              <a:rPr lang="en-US" smtClean="0"/>
-              <a:t>9</a:t>
-            </a:fld>
-            <a:endParaRPr lang="en-US"/>
-          </a:p>
-        </p:txBody>
-      </p:sp>
     </p:spTree>
     <p:extLst>
       <p:ext uri="{BB962C8B-B14F-4D97-AF65-F5344CB8AC3E}">

</xml_diff>

<commit_message>
Add date to first slide
</commit_message>
<xml_diff>
--- a/slides/introduction_to_linux.pptx
+++ b/slides/introduction_to_linux.pptx
@@ -4858,6 +4858,17 @@
             <a:r>
               <a:rPr lang="en-US" dirty="0" err="1" smtClean="0"/>
               <a:t>Technieken</a:t>
+            </a:r>
+            <a:r>
+              <a:rPr lang="en-US" dirty="0" smtClean="0"/>
+              <a:t/>
+            </a:r>
+            <a:br>
+              <a:rPr lang="en-US" dirty="0" smtClean="0"/>
+            </a:br>
+            <a:r>
+              <a:rPr lang="en-US" sz="1800" dirty="0" smtClean="0"/>
+              <a:t>2015 – 2016</a:t>
             </a:r>
             <a:endParaRPr lang="en-US" dirty="0"/>
           </a:p>

</xml_diff>

<commit_message>
Add slides on i2c neopixel slave controller
</commit_message>
<xml_diff>
--- a/slides/introduction_to_linux.pptx
+++ b/slides/introduction_to_linux.pptx
@@ -249,7 +249,7 @@
           <a:p>
             <a:fld id="{7C42333B-93F9-44BD-828D-D8CC89BB8051}" type="datetimeFigureOut">
               <a:rPr lang="en-US" smtClean="0"/>
-              <a:t>9/27/2015</a:t>
+              <a:t>10/2/2015</a:t>
             </a:fld>
             <a:endParaRPr lang="en-US"/>
           </a:p>
@@ -910,7 +910,7 @@
           <a:p>
             <a:fld id="{7FDBF51A-AD7B-48B9-BD6C-0DEFB4E1088B}" type="datetime1">
               <a:rPr lang="en-US" smtClean="0"/>
-              <a:t>9/27/2015</a:t>
+              <a:t>10/2/2015</a:t>
             </a:fld>
             <a:endParaRPr lang="en-US"/>
           </a:p>
@@ -1049,7 +1049,7 @@
           <a:p>
             <a:fld id="{0D5F0973-A24E-4E51-AC53-0AF2185C47AF}" type="datetime1">
               <a:rPr lang="en-US" smtClean="0"/>
-              <a:t>9/27/2015</a:t>
+              <a:t>10/2/2015</a:t>
             </a:fld>
             <a:endParaRPr lang="en-US"/>
           </a:p>
@@ -1165,7 +1165,7 @@
           <a:p>
             <a:fld id="{C3A9A478-9E2E-4842-9E1D-95C5E13356D8}" type="datetime1">
               <a:rPr lang="en-US" smtClean="0"/>
-              <a:t>9/27/2015</a:t>
+              <a:t>10/2/2015</a:t>
             </a:fld>
             <a:endParaRPr lang="en-US"/>
           </a:p>
@@ -1463,7 +1463,7 @@
           <a:p>
             <a:fld id="{D248CA02-C1C1-4368-BDD9-8AD0D4FB83DE}" type="datetime1">
               <a:rPr lang="en-US" smtClean="0"/>
-              <a:t>9/27/2015</a:t>
+              <a:t>10/2/2015</a:t>
             </a:fld>
             <a:endParaRPr lang="en-US"/>
           </a:p>
@@ -1741,7 +1741,7 @@
           <a:p>
             <a:fld id="{C6ED301A-2145-43E1-863D-C0977C11DAC4}" type="datetime1">
               <a:rPr lang="en-US" smtClean="0"/>
-              <a:t>9/27/2015</a:t>
+              <a:t>10/2/2015</a:t>
             </a:fld>
             <a:endParaRPr lang="en-US"/>
           </a:p>
@@ -1932,7 +1932,7 @@
           <a:p>
             <a:fld id="{CEECE4E9-A09C-4A3A-872A-60197681C0E8}" type="datetime1">
               <a:rPr lang="en-US" smtClean="0"/>
-              <a:t>9/27/2015</a:t>
+              <a:t>10/2/2015</a:t>
             </a:fld>
             <a:endParaRPr lang="en-US"/>
           </a:p>
@@ -2133,7 +2133,7 @@
           <a:p>
             <a:fld id="{6E9A05D7-B596-47AE-9553-3890A22995BF}" type="datetime1">
               <a:rPr lang="en-US" smtClean="0"/>
-              <a:t>9/27/2015</a:t>
+              <a:t>10/2/2015</a:t>
             </a:fld>
             <a:endParaRPr lang="en-US"/>
           </a:p>
@@ -2396,7 +2396,7 @@
           <a:p>
             <a:fld id="{625ADD71-1C5F-4F7E-8D78-15C68348C390}" type="datetime1">
               <a:rPr lang="en-US" smtClean="0"/>
-              <a:t>9/27/2015</a:t>
+              <a:t>10/2/2015</a:t>
             </a:fld>
             <a:endParaRPr lang="en-US"/>
           </a:p>
@@ -2587,7 +2587,7 @@
           <a:p>
             <a:fld id="{0B328EE6-6A9B-40B0-A5EF-990F53AEF9DA}" type="datetime1">
               <a:rPr lang="en-US" smtClean="0"/>
-              <a:t>9/27/2015</a:t>
+              <a:t>10/2/2015</a:t>
             </a:fld>
             <a:endParaRPr lang="en-US"/>
           </a:p>
@@ -2783,7 +2783,7 @@
           <a:p>
             <a:fld id="{B4AFEB28-E49B-464B-9FE0-FB4552046618}" type="datetime1">
               <a:rPr lang="en-US" smtClean="0"/>
-              <a:t>9/27/2015</a:t>
+              <a:t>10/2/2015</a:t>
             </a:fld>
             <a:endParaRPr lang="en-US"/>
           </a:p>
@@ -2982,7 +2982,7 @@
           <a:p>
             <a:fld id="{F605F17B-680A-48C5-ADAF-14CE0D16BB75}" type="datetime1">
               <a:rPr lang="en-US" smtClean="0"/>
-              <a:t>9/27/2015</a:t>
+              <a:t>10/2/2015</a:t>
             </a:fld>
             <a:endParaRPr lang="en-US"/>
           </a:p>
@@ -3173,7 +3173,7 @@
           <a:p>
             <a:fld id="{E754C7F4-4B95-4CDF-B24E-B5EE227E4593}" type="datetime1">
               <a:rPr lang="en-US" smtClean="0"/>
-              <a:t>9/27/2015</a:t>
+              <a:t>10/2/2015</a:t>
             </a:fld>
             <a:endParaRPr lang="en-US"/>
           </a:p>
@@ -3440,7 +3440,7 @@
           <a:p>
             <a:fld id="{522D90DD-3F1D-4333-B251-10030ABE1E45}" type="datetime1">
               <a:rPr lang="en-US" smtClean="0"/>
-              <a:t>9/27/2015</a:t>
+              <a:t>10/2/2015</a:t>
             </a:fld>
             <a:endParaRPr lang="en-US"/>
           </a:p>
@@ -3749,7 +3749,7 @@
           <a:p>
             <a:fld id="{0371234B-895E-41E6-ADE7-FEE13FC2EF30}" type="datetime1">
               <a:rPr lang="en-US" smtClean="0"/>
-              <a:t>9/27/2015</a:t>
+              <a:t>10/2/2015</a:t>
             </a:fld>
             <a:endParaRPr lang="en-US"/>
           </a:p>
@@ -4192,7 +4192,7 @@
           <a:p>
             <a:fld id="{CAE48979-8F5D-4C7E-B73F-F6B6BB499E94}" type="datetime1">
               <a:rPr lang="en-US" smtClean="0"/>
-              <a:t>9/27/2015</a:t>
+              <a:t>10/2/2015</a:t>
             </a:fld>
             <a:endParaRPr lang="en-US"/>
           </a:p>
@@ -4449,7 +4449,7 @@
           <a:p>
             <a:fld id="{C63F0295-AD35-4898-97C4-7954EC9DDE31}" type="datetime1">
               <a:rPr lang="en-US" smtClean="0"/>
-              <a:t>9/27/2015</a:t>
+              <a:t>10/2/2015</a:t>
             </a:fld>
             <a:endParaRPr lang="en-US"/>
           </a:p>
@@ -4977,24 +4977,8 @@
               <a:t>The </a:t>
             </a:r>
             <a:r>
-              <a:rPr lang="en-US" dirty="0" err="1" smtClean="0"/>
-              <a:t>ke</a:t>
-            </a:r>
-            <a:r>
-              <a:rPr lang="en-US" dirty="0" err="1"/>
-              <a:t>The</a:t>
-            </a:r>
-            <a:r>
-              <a:rPr lang="en-US" dirty="0"/>
-              <a:t> Linux </a:t>
-            </a:r>
-            <a:r>
-              <a:rPr lang="en-US" dirty="0" err="1"/>
-              <a:t>Kernel</a:t>
-            </a:r>
-            <a:r>
-              <a:rPr lang="en-US" dirty="0" err="1" smtClean="0"/>
-              <a:t>rnel</a:t>
+              <a:rPr lang="en-US" smtClean="0"/>
+              <a:t>Linux Kernel</a:t>
             </a:r>
             <a:endParaRPr lang="en-US" dirty="0"/>
           </a:p>

</xml_diff>